<commit_message>
update POC diagram #89
</commit_message>
<xml_diff>
--- a/docs/Sequence_Diagrams_Drafts.pptx
+++ b/docs/Sequence_Diagrams_Drafts.pptx
@@ -6,7 +6,7 @@
     <p:sldMasterId id="2147483660" r:id="rId2"/>
   </p:sldMasterIdLst>
   <p:notesMasterIdLst>
-    <p:notesMasterId r:id="rId10"/>
+    <p:notesMasterId r:id="rId11"/>
   </p:notesMasterIdLst>
   <p:sldIdLst>
     <p:sldId id="257" r:id="rId3"/>
@@ -16,6 +16,7 @@
     <p:sldId id="260" r:id="rId7"/>
     <p:sldId id="261" r:id="rId8"/>
     <p:sldId id="279" r:id="rId9"/>
+    <p:sldId id="280" r:id="rId10"/>
   </p:sldIdLst>
   <p:sldSz cx="12192000" cy="6858000"/>
   <p:notesSz cx="6858000" cy="9144000"/>
@@ -204,7 +205,7 @@
           <a:p>
             <a:fld id="{B55B58EC-A23A-7A46-8D96-AF627B341743}" type="datetimeFigureOut">
               <a:rPr lang="en-AT" smtClean="0"/>
-              <a:t>03.09.24</a:t>
+              <a:t>30.09.24</a:t>
             </a:fld>
             <a:endParaRPr lang="en-AT"/>
           </a:p>
@@ -17302,6 +17303,177 @@
 </p:notes>
 </file>
 
+<file path=ppt/notesSlides/notesSlide7.xml><?xml version="1.0" encoding="utf-8"?>
+<p:notes xmlns:a="http://schemas.openxmlformats.org/drawingml/2006/main" xmlns:r="http://schemas.openxmlformats.org/officeDocument/2006/relationships" xmlns:p="http://schemas.openxmlformats.org/presentationml/2006/main">
+  <p:cSld>
+    <p:spTree>
+      <p:nvGrpSpPr>
+        <p:cNvPr id="1" name="">
+          <a:extLst>
+            <a:ext uri="{FF2B5EF4-FFF2-40B4-BE49-F238E27FC236}">
+              <a16:creationId xmlns:a16="http://schemas.microsoft.com/office/drawing/2014/main" id="{FE3DAC48-6B3D-BF35-59FB-92A10B0A08C0}"/>
+            </a:ext>
+          </a:extLst>
+        </p:cNvPr>
+        <p:cNvGrpSpPr/>
+        <p:nvPr/>
+      </p:nvGrpSpPr>
+      <p:grpSpPr>
+        <a:xfrm>
+          <a:off x="0" y="0"/>
+          <a:ext cx="0" cy="0"/>
+          <a:chOff x="0" y="0"/>
+          <a:chExt cx="0" cy="0"/>
+        </a:xfrm>
+      </p:grpSpPr>
+      <p:sp>
+        <p:nvSpPr>
+          <p:cNvPr id="2" name="Slide Image Placeholder 1">
+            <a:extLst>
+              <a:ext uri="{FF2B5EF4-FFF2-40B4-BE49-F238E27FC236}">
+                <a16:creationId xmlns:a16="http://schemas.microsoft.com/office/drawing/2014/main" id="{1A61F277-58AC-0E32-6BB5-B96D6146A2C2}"/>
+              </a:ext>
+            </a:extLst>
+          </p:cNvPr>
+          <p:cNvSpPr>
+            <a:spLocks noGrp="1" noRot="1" noChangeAspect="1"/>
+          </p:cNvSpPr>
+          <p:nvPr>
+            <p:ph type="sldImg"/>
+          </p:nvPr>
+        </p:nvSpPr>
+        <p:spPr/>
+      </p:sp>
+      <p:sp>
+        <p:nvSpPr>
+          <p:cNvPr id="3" name="Notes Placeholder 2">
+            <a:extLst>
+              <a:ext uri="{FF2B5EF4-FFF2-40B4-BE49-F238E27FC236}">
+                <a16:creationId xmlns:a16="http://schemas.microsoft.com/office/drawing/2014/main" id="{B1C148D9-397C-183A-44B6-72CDBF6670D6}"/>
+              </a:ext>
+            </a:extLst>
+          </p:cNvPr>
+          <p:cNvSpPr>
+            <a:spLocks noGrp="1"/>
+          </p:cNvSpPr>
+          <p:nvPr>
+            <p:ph type="body" idx="1"/>
+          </p:nvPr>
+        </p:nvSpPr>
+        <p:spPr/>
+        <p:txBody>
+          <a:bodyPr/>
+          <a:lstStyle/>
+          <a:p>
+            <a:r>
+              <a:rPr lang="en-AT" dirty="0"/>
+              <a:t>BMSGPK Claim or ClaimResponse???</a:t>
+            </a:r>
+          </a:p>
+        </p:txBody>
+      </p:sp>
+      <p:sp>
+        <p:nvSpPr>
+          <p:cNvPr id="4" name="Slide Number Placeholder 3">
+            <a:extLst>
+              <a:ext uri="{FF2B5EF4-FFF2-40B4-BE49-F238E27FC236}">
+                <a16:creationId xmlns:a16="http://schemas.microsoft.com/office/drawing/2014/main" id="{D5E73D23-F228-CBEC-441A-7975C4D3811D}"/>
+              </a:ext>
+            </a:extLst>
+          </p:cNvPr>
+          <p:cNvSpPr>
+            <a:spLocks noGrp="1"/>
+          </p:cNvSpPr>
+          <p:nvPr>
+            <p:ph type="sldNum" sz="quarter" idx="5"/>
+          </p:nvPr>
+        </p:nvSpPr>
+        <p:spPr/>
+        <p:txBody>
+          <a:bodyPr/>
+          <a:lstStyle/>
+          <a:p>
+            <a:pPr marL="0" marR="0" lvl="0" indent="0" algn="r" defTabSz="457200" rtl="0" eaLnBrk="1" fontAlgn="auto" latinLnBrk="0" hangingPunct="1">
+              <a:lnSpc>
+                <a:spcPct val="100000"/>
+              </a:lnSpc>
+              <a:spcBef>
+                <a:spcPts val="0"/>
+              </a:spcBef>
+              <a:spcAft>
+                <a:spcPts val="0"/>
+              </a:spcAft>
+              <a:buClrTx/>
+              <a:buSzTx/>
+              <a:buFontTx/>
+              <a:buNone/>
+              <a:tabLst/>
+              <a:defRPr/>
+            </a:pPr>
+            <a:fld id="{7F63250E-8FFF-D04D-A45D-D1FB73421F0A}" type="slidenum">
+              <a:rPr kumimoji="0" lang="en-AT" sz="1200" b="0" i="0" u="none" strike="noStrike" kern="1200" cap="none" spc="0" normalizeH="0" baseline="0" noProof="0" smtClean="0">
+                <a:ln>
+                  <a:noFill/>
+                </a:ln>
+                <a:solidFill>
+                  <a:prstClr val="black"/>
+                </a:solidFill>
+                <a:effectLst/>
+                <a:uLnTx/>
+                <a:uFillTx/>
+                <a:latin typeface="Aptos" panose="02110004020202020204"/>
+                <a:ea typeface="+mn-ea"/>
+                <a:cs typeface="+mn-cs"/>
+              </a:rPr>
+              <a:pPr marL="0" marR="0" lvl="0" indent="0" algn="r" defTabSz="457200" rtl="0" eaLnBrk="1" fontAlgn="auto" latinLnBrk="0" hangingPunct="1">
+                <a:lnSpc>
+                  <a:spcPct val="100000"/>
+                </a:lnSpc>
+                <a:spcBef>
+                  <a:spcPts val="0"/>
+                </a:spcBef>
+                <a:spcAft>
+                  <a:spcPts val="0"/>
+                </a:spcAft>
+                <a:buClrTx/>
+                <a:buSzTx/>
+                <a:buFontTx/>
+                <a:buNone/>
+                <a:tabLst/>
+                <a:defRPr/>
+              </a:pPr>
+              <a:t>8</a:t>
+            </a:fld>
+            <a:endParaRPr kumimoji="0" lang="en-AT" sz="1200" b="0" i="0" u="none" strike="noStrike" kern="1200" cap="none" spc="0" normalizeH="0" baseline="0" noProof="0">
+              <a:ln>
+                <a:noFill/>
+              </a:ln>
+              <a:solidFill>
+                <a:prstClr val="black"/>
+              </a:solidFill>
+              <a:effectLst/>
+              <a:uLnTx/>
+              <a:uFillTx/>
+              <a:latin typeface="Aptos" panose="02110004020202020204"/>
+              <a:ea typeface="+mn-ea"/>
+              <a:cs typeface="+mn-cs"/>
+            </a:endParaRPr>
+          </a:p>
+        </p:txBody>
+      </p:sp>
+    </p:spTree>
+    <p:extLst>
+      <p:ext uri="{BB962C8B-B14F-4D97-AF65-F5344CB8AC3E}">
+        <p14:creationId xmlns:p14="http://schemas.microsoft.com/office/powerpoint/2010/main" val="324427207"/>
+      </p:ext>
+    </p:extLst>
+  </p:cSld>
+  <p:clrMapOvr>
+    <a:masterClrMapping/>
+  </p:clrMapOvr>
+</p:notes>
+</file>
+
 <file path=ppt/slideLayouts/slideLayout1.xml><?xml version="1.0" encoding="utf-8"?>
 <p:sldLayout xmlns:a="http://schemas.openxmlformats.org/drawingml/2006/main" xmlns:r="http://schemas.openxmlformats.org/officeDocument/2006/relationships" xmlns:p="http://schemas.openxmlformats.org/presentationml/2006/main" type="title" preserve="1">
   <p:cSld name="Title Slide">
@@ -17451,7 +17623,7 @@
           <a:p>
             <a:fld id="{12410864-9ED6-9F4B-86D6-36C367AD8FCE}" type="datetimeFigureOut">
               <a:rPr lang="en-AT" smtClean="0"/>
-              <a:t>03.09.24</a:t>
+              <a:t>30.09.24</a:t>
             </a:fld>
             <a:endParaRPr lang="en-AT"/>
           </a:p>
@@ -17651,7 +17823,7 @@
           <a:p>
             <a:fld id="{12410864-9ED6-9F4B-86D6-36C367AD8FCE}" type="datetimeFigureOut">
               <a:rPr lang="en-AT" smtClean="0"/>
-              <a:t>03.09.24</a:t>
+              <a:t>30.09.24</a:t>
             </a:fld>
             <a:endParaRPr lang="en-AT"/>
           </a:p>
@@ -17861,7 +18033,7 @@
           <a:p>
             <a:fld id="{12410864-9ED6-9F4B-86D6-36C367AD8FCE}" type="datetimeFigureOut">
               <a:rPr lang="en-AT" smtClean="0"/>
-              <a:t>03.09.24</a:t>
+              <a:t>30.09.24</a:t>
             </a:fld>
             <a:endParaRPr lang="en-AT"/>
           </a:p>
@@ -18158,7 +18330,7 @@
           <a:p>
             <a:fld id="{EED63164-EF39-0B4A-9007-67453961FB19}" type="datetimeFigureOut">
               <a:rPr lang="en-AT" smtClean="0"/>
-              <a:t>03.09.24</a:t>
+              <a:t>30.09.24</a:t>
             </a:fld>
             <a:endParaRPr lang="en-AT"/>
           </a:p>
@@ -18328,7 +18500,7 @@
           <a:p>
             <a:fld id="{EED63164-EF39-0B4A-9007-67453961FB19}" type="datetimeFigureOut">
               <a:rPr lang="en-AT" smtClean="0"/>
-              <a:t>03.09.24</a:t>
+              <a:t>30.09.24</a:t>
             </a:fld>
             <a:endParaRPr lang="en-AT"/>
           </a:p>
@@ -18586,7 +18758,7 @@
           <a:p>
             <a:fld id="{EED63164-EF39-0B4A-9007-67453961FB19}" type="datetimeFigureOut">
               <a:rPr lang="en-AT" smtClean="0"/>
-              <a:t>03.09.24</a:t>
+              <a:t>30.09.24</a:t>
             </a:fld>
             <a:endParaRPr lang="en-AT"/>
           </a:p>
@@ -18874,7 +19046,7 @@
           <a:p>
             <a:fld id="{EED63164-EF39-0B4A-9007-67453961FB19}" type="datetimeFigureOut">
               <a:rPr lang="en-AT" smtClean="0"/>
-              <a:t>03.09.24</a:t>
+              <a:t>30.09.24</a:t>
             </a:fld>
             <a:endParaRPr lang="en-AT"/>
           </a:p>
@@ -19316,7 +19488,7 @@
           <a:p>
             <a:fld id="{EED63164-EF39-0B4A-9007-67453961FB19}" type="datetimeFigureOut">
               <a:rPr lang="en-AT" smtClean="0"/>
-              <a:t>03.09.24</a:t>
+              <a:t>30.09.24</a:t>
             </a:fld>
             <a:endParaRPr lang="en-AT"/>
           </a:p>
@@ -19434,7 +19606,7 @@
           <a:p>
             <a:fld id="{EED63164-EF39-0B4A-9007-67453961FB19}" type="datetimeFigureOut">
               <a:rPr lang="en-AT" smtClean="0"/>
-              <a:t>03.09.24</a:t>
+              <a:t>30.09.24</a:t>
             </a:fld>
             <a:endParaRPr lang="en-AT"/>
           </a:p>
@@ -19529,7 +19701,7 @@
           <a:p>
             <a:fld id="{EED63164-EF39-0B4A-9007-67453961FB19}" type="datetimeFigureOut">
               <a:rPr lang="en-AT" smtClean="0"/>
-              <a:t>03.09.24</a:t>
+              <a:t>30.09.24</a:t>
             </a:fld>
             <a:endParaRPr lang="en-AT"/>
           </a:p>
@@ -19817,7 +19989,7 @@
           <a:p>
             <a:fld id="{EED63164-EF39-0B4A-9007-67453961FB19}" type="datetimeFigureOut">
               <a:rPr lang="en-AT" smtClean="0"/>
-              <a:t>03.09.24</a:t>
+              <a:t>30.09.24</a:t>
             </a:fld>
             <a:endParaRPr lang="en-AT"/>
           </a:p>
@@ -20005,7 +20177,7 @@
           <a:p>
             <a:fld id="{12410864-9ED6-9F4B-86D6-36C367AD8FCE}" type="datetimeFigureOut">
               <a:rPr lang="en-AT" smtClean="0"/>
-              <a:t>03.09.24</a:t>
+              <a:t>30.09.24</a:t>
             </a:fld>
             <a:endParaRPr lang="en-AT"/>
           </a:p>
@@ -20290,7 +20462,7 @@
           <a:p>
             <a:fld id="{EED63164-EF39-0B4A-9007-67453961FB19}" type="datetimeFigureOut">
               <a:rPr lang="en-AT" smtClean="0"/>
-              <a:t>03.09.24</a:t>
+              <a:t>30.09.24</a:t>
             </a:fld>
             <a:endParaRPr lang="en-AT"/>
           </a:p>
@@ -20465,7 +20637,7 @@
           <a:p>
             <a:fld id="{EED63164-EF39-0B4A-9007-67453961FB19}" type="datetimeFigureOut">
               <a:rPr lang="en-AT" smtClean="0"/>
-              <a:t>03.09.24</a:t>
+              <a:t>30.09.24</a:t>
             </a:fld>
             <a:endParaRPr lang="en-AT"/>
           </a:p>
@@ -20645,7 +20817,7 @@
           <a:p>
             <a:fld id="{EED63164-EF39-0B4A-9007-67453961FB19}" type="datetimeFigureOut">
               <a:rPr lang="en-AT" smtClean="0"/>
-              <a:t>03.09.24</a:t>
+              <a:t>30.09.24</a:t>
             </a:fld>
             <a:endParaRPr lang="en-AT"/>
           </a:p>
@@ -20909,7 +21081,7 @@
           <a:p>
             <a:fld id="{12410864-9ED6-9F4B-86D6-36C367AD8FCE}" type="datetimeFigureOut">
               <a:rPr lang="en-AT" smtClean="0"/>
-              <a:t>03.09.24</a:t>
+              <a:t>30.09.24</a:t>
             </a:fld>
             <a:endParaRPr lang="en-AT"/>
           </a:p>
@@ -21177,7 +21349,7 @@
           <a:p>
             <a:fld id="{12410864-9ED6-9F4B-86D6-36C367AD8FCE}" type="datetimeFigureOut">
               <a:rPr lang="en-AT" smtClean="0"/>
-              <a:t>03.09.24</a:t>
+              <a:t>30.09.24</a:t>
             </a:fld>
             <a:endParaRPr lang="en-AT"/>
           </a:p>
@@ -21592,7 +21764,7 @@
           <a:p>
             <a:fld id="{12410864-9ED6-9F4B-86D6-36C367AD8FCE}" type="datetimeFigureOut">
               <a:rPr lang="en-AT" smtClean="0"/>
-              <a:t>03.09.24</a:t>
+              <a:t>30.09.24</a:t>
             </a:fld>
             <a:endParaRPr lang="en-AT"/>
           </a:p>
@@ -21734,7 +21906,7 @@
           <a:p>
             <a:fld id="{12410864-9ED6-9F4B-86D6-36C367AD8FCE}" type="datetimeFigureOut">
               <a:rPr lang="en-AT" smtClean="0"/>
-              <a:t>03.09.24</a:t>
+              <a:t>30.09.24</a:t>
             </a:fld>
             <a:endParaRPr lang="en-AT"/>
           </a:p>
@@ -21847,7 +22019,7 @@
           <a:p>
             <a:fld id="{12410864-9ED6-9F4B-86D6-36C367AD8FCE}" type="datetimeFigureOut">
               <a:rPr lang="en-AT" smtClean="0"/>
-              <a:t>03.09.24</a:t>
+              <a:t>30.09.24</a:t>
             </a:fld>
             <a:endParaRPr lang="en-AT"/>
           </a:p>
@@ -22160,7 +22332,7 @@
           <a:p>
             <a:fld id="{12410864-9ED6-9F4B-86D6-36C367AD8FCE}" type="datetimeFigureOut">
               <a:rPr lang="en-AT" smtClean="0"/>
-              <a:t>03.09.24</a:t>
+              <a:t>30.09.24</a:t>
             </a:fld>
             <a:endParaRPr lang="en-AT"/>
           </a:p>
@@ -22449,7 +22621,7 @@
           <a:p>
             <a:fld id="{12410864-9ED6-9F4B-86D6-36C367AD8FCE}" type="datetimeFigureOut">
               <a:rPr lang="en-AT" smtClean="0"/>
-              <a:t>03.09.24</a:t>
+              <a:t>30.09.24</a:t>
             </a:fld>
             <a:endParaRPr lang="en-AT"/>
           </a:p>
@@ -22692,7 +22864,7 @@
           <a:p>
             <a:fld id="{12410864-9ED6-9F4B-86D6-36C367AD8FCE}" type="datetimeFigureOut">
               <a:rPr lang="en-AT" smtClean="0"/>
-              <a:t>03.09.24</a:t>
+              <a:t>30.09.24</a:t>
             </a:fld>
             <a:endParaRPr lang="en-AT"/>
           </a:p>
@@ -23323,7 +23495,7 @@
           <a:p>
             <a:fld id="{EED63164-EF39-0B4A-9007-67453961FB19}" type="datetimeFigureOut">
               <a:rPr lang="en-AT" smtClean="0"/>
-              <a:t>03.09.24</a:t>
+              <a:t>30.09.24</a:t>
             </a:fld>
             <a:endParaRPr lang="en-AT"/>
           </a:p>
@@ -25994,7 +26166,7 @@
               <a:defRPr/>
             </a:pPr>
             <a:r>
-              <a:rPr kumimoji="0" lang="en-AT" sz="1300" b="0" i="0" u="none" strike="noStrike" kern="1200" cap="none" spc="0" normalizeH="0" baseline="0" noProof="0" dirty="0">
+              <a:rPr kumimoji="0" lang="en-AT" sz="1500" b="0" i="0" u="none" strike="noStrike" kern="1200" cap="none" spc="0" normalizeH="0" baseline="0" noProof="0" dirty="0">
                 <a:ln>
                   <a:noFill/>
                 </a:ln>
@@ -26008,7 +26180,7 @@
                 <a:ea typeface="+mn-ea"/>
                 <a:cs typeface="+mn-cs"/>
               </a:rPr>
-              <a:t>POST MOPEDEncounter</a:t>
+              <a:t>$aufnehmen</a:t>
             </a:r>
           </a:p>
           <a:p>
@@ -26030,7 +26202,7 @@
               <a:defRPr/>
             </a:pPr>
             <a:r>
-              <a:rPr kumimoji="0" lang="en-AT" sz="1300" b="0" i="0" u="none" strike="noStrike" kern="1200" cap="none" spc="0" normalizeH="0" baseline="0" noProof="0" dirty="0">
+              <a:rPr kumimoji="0" lang="en-AT" sz="1500" b="0" i="0" u="none" strike="noStrike" kern="1200" cap="none" spc="0" normalizeH="0" baseline="0" noProof="0" dirty="0">
                 <a:ln>
                   <a:noFill/>
                 </a:ln>
@@ -26044,44 +26216,31 @@
                 <a:ea typeface="+mn-ea"/>
                 <a:cs typeface="+mn-cs"/>
               </a:rPr>
-              <a:t>(including Resources)</a:t>
-            </a:r>
-          </a:p>
-          <a:p>
-            <a:pPr marL="0" marR="0" lvl="0" indent="0" algn="ctr" defTabSz="457200" rtl="0" eaLnBrk="1" fontAlgn="auto" latinLnBrk="0" hangingPunct="1">
-              <a:lnSpc>
-                <a:spcPct val="100000"/>
-              </a:lnSpc>
-              <a:spcBef>
-                <a:spcPts val="0"/>
-              </a:spcBef>
-              <a:spcAft>
-                <a:spcPts val="0"/>
-              </a:spcAft>
-              <a:buClrTx/>
-              <a:buSzTx/>
-              <a:buFontTx/>
-              <a:buNone/>
-              <a:tabLst/>
-              <a:defRPr/>
-            </a:pPr>
-            <a:r>
-              <a:rPr kumimoji="0" lang="en-AT" sz="1300" b="0" i="0" u="none" strike="noStrike" kern="1200" cap="none" spc="0" normalizeH="0" baseline="0" noProof="0" dirty="0">
-                <a:ln>
-                  <a:noFill/>
-                </a:ln>
+              <a:t>2a. </a:t>
+            </a:r>
+            <a:r>
+              <a:rPr lang="en-AT" sz="1500" dirty="0">
                 <a:solidFill>
                   <a:srgbClr val="FFFFFF"/>
                 </a:solidFill>
-                <a:effectLst/>
-                <a:uLnTx/>
-                <a:uFillTx/>
                 <a:latin typeface="Corbel" panose="020B0503020204020204"/>
-                <a:ea typeface="+mn-ea"/>
-                <a:cs typeface="+mn-cs"/>
-              </a:rPr>
-              <a:t>2. POST CoverageEligibilityRequest</a:t>
-            </a:r>
+              </a:rPr>
+              <a:t>$anfragen</a:t>
+            </a:r>
+            <a:endParaRPr kumimoji="0" lang="en-AT" sz="1500" b="0" i="0" u="none" strike="noStrike" kern="1200" cap="none" spc="0" normalizeH="0" baseline="0" noProof="0" dirty="0">
+              <a:ln>
+                <a:noFill/>
+              </a:ln>
+              <a:solidFill>
+                <a:srgbClr val="FFFFFF"/>
+              </a:solidFill>
+              <a:effectLst/>
+              <a:uLnTx/>
+              <a:uFillTx/>
+              <a:latin typeface="Corbel" panose="020B0503020204020204"/>
+              <a:ea typeface="+mn-ea"/>
+              <a:cs typeface="+mn-cs"/>
+            </a:endParaRPr>
           </a:p>
         </p:txBody>
       </p:sp>
@@ -26144,7 +26303,7 @@
               <a:defRPr/>
             </a:pPr>
             <a:r>
-              <a:rPr kumimoji="0" lang="en-AT" sz="1300" b="0" i="0" u="none" strike="noStrike" kern="1200" cap="none" spc="0" normalizeH="0" baseline="0" noProof="0" dirty="0">
+              <a:rPr kumimoji="0" lang="en-AT" sz="1500" b="0" i="0" u="none" strike="noStrike" kern="1200" cap="none" spc="0" normalizeH="0" baseline="0" noProof="0" dirty="0">
                 <a:ln>
                   <a:noFill/>
                 </a:ln>
@@ -26158,7 +26317,7 @@
                 <a:ea typeface="+mn-ea"/>
                 <a:cs typeface="+mn-cs"/>
               </a:rPr>
-              <a:t>4. PUT MOPEDEncounter (update to include Discharge)</a:t>
+              <a:t>4. $entlassen (freigeben = false)</a:t>
             </a:r>
           </a:p>
         </p:txBody>
@@ -26222,7 +26381,7 @@
               <a:defRPr/>
             </a:pPr>
             <a:r>
-              <a:rPr kumimoji="0" lang="en-AT" sz="1300" b="0" i="0" u="none" strike="noStrike" kern="1200" cap="none" spc="0" normalizeH="0" baseline="0" noProof="0" dirty="0">
+              <a:rPr kumimoji="0" lang="en-AT" sz="1500" b="0" i="0" u="none" strike="noStrike" kern="1200" cap="none" spc="0" normalizeH="0" baseline="0" noProof="0" dirty="0">
                 <a:ln>
                   <a:noFill/>
                 </a:ln>
@@ -26236,43 +26395,7 @@
                 <a:ea typeface="+mn-ea"/>
                 <a:cs typeface="+mn-cs"/>
               </a:rPr>
-              <a:t>5. POST Claim </a:t>
-            </a:r>
-          </a:p>
-          <a:p>
-            <a:pPr marL="0" marR="0" lvl="0" indent="0" algn="ctr" defTabSz="457200" rtl="0" eaLnBrk="1" fontAlgn="auto" latinLnBrk="0" hangingPunct="1">
-              <a:lnSpc>
-                <a:spcPct val="100000"/>
-              </a:lnSpc>
-              <a:spcBef>
-                <a:spcPts val="0"/>
-              </a:spcBef>
-              <a:spcAft>
-                <a:spcPts val="0"/>
-              </a:spcAft>
-              <a:buClrTx/>
-              <a:buSzTx/>
-              <a:buFontTx/>
-              <a:buNone/>
-              <a:tabLst/>
-              <a:defRPr/>
-            </a:pPr>
-            <a:r>
-              <a:rPr kumimoji="0" lang="en-AT" sz="1300" b="0" i="0" u="none" strike="noStrike" kern="1200" cap="none" spc="0" normalizeH="0" baseline="0" noProof="0" dirty="0">
-                <a:ln>
-                  <a:noFill/>
-                </a:ln>
-                <a:solidFill>
-                  <a:srgbClr val="FFFFFF"/>
-                </a:solidFill>
-                <a:effectLst/>
-                <a:uLnTx/>
-                <a:uFillTx/>
-                <a:latin typeface="Corbel" panose="020B0503020204020204"/>
-                <a:ea typeface="+mn-ea"/>
-                <a:cs typeface="+mn-cs"/>
-              </a:rPr>
-              <a:t>(including Resources)</a:t>
+              <a:t>5. $entlassen (freigeben = true)</a:t>
             </a:r>
           </a:p>
         </p:txBody>
@@ -26336,7 +26459,7 @@
               <a:defRPr/>
             </a:pPr>
             <a:r>
-              <a:rPr kumimoji="0" lang="en-AT" sz="1300" b="0" i="0" u="none" strike="noStrike" kern="1200" cap="none" spc="0" normalizeH="0" baseline="0" noProof="0" dirty="0">
+              <a:rPr kumimoji="0" lang="en-AT" sz="1500" b="0" i="0" u="none" strike="noStrike" kern="1200" cap="none" spc="0" normalizeH="0" baseline="0" noProof="0" dirty="0">
                 <a:ln>
                   <a:noFill/>
                 </a:ln>
@@ -26414,7 +26537,7 @@
               <a:defRPr/>
             </a:pPr>
             <a:r>
-              <a:rPr kumimoji="0" lang="en-AT" sz="1300" b="0" i="0" u="none" strike="noStrike" kern="1200" cap="none" spc="0" normalizeH="0" baseline="0" noProof="0" dirty="0">
+              <a:rPr kumimoji="0" lang="en-AT" sz="1500" b="0" i="0" u="none" strike="noStrike" kern="1200" cap="none" spc="0" normalizeH="0" baseline="0" noProof="0" dirty="0">
                 <a:ln>
                   <a:noFill/>
                 </a:ln>
@@ -26422,13 +26545,16 @@
                   <a:srgbClr val="FFFFFF"/>
                 </a:solidFill>
                 <a:effectLst/>
+                <a:highlight>
+                  <a:srgbClr val="808080"/>
+                </a:highlight>
                 <a:uLnTx/>
                 <a:uFillTx/>
                 <a:latin typeface="Corbel" panose="020B0503020204020204"/>
                 <a:ea typeface="+mn-ea"/>
                 <a:cs typeface="+mn-cs"/>
               </a:rPr>
-              <a:t>2. GET CoverageEligibilityRequest</a:t>
+              <a:t>2b. $abholen</a:t>
             </a:r>
           </a:p>
           <a:p>
@@ -26450,43 +26576,7 @@
               <a:defRPr/>
             </a:pPr>
             <a:r>
-              <a:rPr kumimoji="0" lang="en-AT" sz="1300" b="0" i="0" u="none" strike="noStrike" kern="1200" cap="none" spc="0" normalizeH="0" baseline="0" noProof="0" dirty="0">
-                <a:ln>
-                  <a:noFill/>
-                </a:ln>
-                <a:solidFill>
-                  <a:srgbClr val="FFFFFF"/>
-                </a:solidFill>
-                <a:effectLst/>
-                <a:uLnTx/>
-                <a:uFillTx/>
-                <a:latin typeface="Corbel" panose="020B0503020204020204"/>
-                <a:ea typeface="+mn-ea"/>
-                <a:cs typeface="+mn-cs"/>
-              </a:rPr>
-              <a:t>4.Subscription Notify Discharge</a:t>
-            </a:r>
-          </a:p>
-          <a:p>
-            <a:pPr marL="0" marR="0" lvl="0" indent="0" algn="ctr" defTabSz="457200" rtl="0" eaLnBrk="1" fontAlgn="auto" latinLnBrk="0" hangingPunct="1">
-              <a:lnSpc>
-                <a:spcPct val="100000"/>
-              </a:lnSpc>
-              <a:spcBef>
-                <a:spcPts val="0"/>
-              </a:spcBef>
-              <a:spcAft>
-                <a:spcPts val="0"/>
-              </a:spcAft>
-              <a:buClrTx/>
-              <a:buSzTx/>
-              <a:buFontTx/>
-              <a:buNone/>
-              <a:tabLst/>
-              <a:defRPr/>
-            </a:pPr>
-            <a:r>
-              <a:rPr kumimoji="0" lang="en-AT" sz="1300" b="0" i="0" u="none" strike="noStrike" kern="1200" cap="none" spc="0" normalizeH="0" baseline="0" noProof="0" dirty="0">
+              <a:rPr kumimoji="0" lang="en-AT" sz="1500" b="0" i="0" u="none" strike="noStrike" kern="1200" cap="none" spc="0" normalizeH="0" baseline="0" noProof="0" dirty="0">
                 <a:ln>
                   <a:noFill/>
                 </a:ln>
@@ -26564,7 +26654,7 @@
               <a:defRPr/>
             </a:pPr>
             <a:r>
-              <a:rPr kumimoji="0" lang="en-AT" sz="1300" b="0" i="0" u="none" strike="noStrike" kern="1200" cap="none" spc="0" normalizeH="0" baseline="0" noProof="0" dirty="0">
+              <a:rPr kumimoji="0" lang="en-AT" sz="1500" b="0" i="0" u="none" strike="noStrike" kern="1200" cap="none" spc="0" normalizeH="0" baseline="0" noProof="0" dirty="0">
                 <a:ln>
                   <a:noFill/>
                 </a:ln>
@@ -26598,7 +26688,7 @@
         <p:spPr>
           <a:xfrm>
             <a:off x="9526061" y="4483179"/>
-            <a:ext cx="1880700" cy="414084"/>
+            <a:ext cx="2175402" cy="414084"/>
           </a:xfrm>
           <a:prstGeom prst="roundRect">
             <a:avLst/>
@@ -26642,7 +26732,7 @@
               <a:defRPr/>
             </a:pPr>
             <a:r>
-              <a:rPr kumimoji="0" lang="en-AT" sz="1300" b="0" i="0" u="none" strike="noStrike" kern="1200" cap="none" spc="0" normalizeH="0" baseline="0" noProof="0" dirty="0">
+              <a:rPr kumimoji="0" lang="en-AT" sz="1500" b="0" i="0" u="none" strike="noStrike" kern="1200" cap="none" spc="0" normalizeH="0" baseline="0" noProof="0" dirty="0">
                 <a:ln>
                   <a:noFill/>
                 </a:ln>
@@ -26720,7 +26810,7 @@
               <a:defRPr/>
             </a:pPr>
             <a:r>
-              <a:rPr kumimoji="0" lang="en-AT" sz="1300" b="0" i="0" u="none" strike="noStrike" kern="1200" cap="none" spc="0" normalizeH="0" baseline="0" noProof="0" dirty="0">
+              <a:rPr kumimoji="0" lang="en-AT" sz="1500" b="0" i="0" u="none" strike="noStrike" kern="1200" cap="none" spc="0" normalizeH="0" baseline="0" noProof="0" dirty="0">
                 <a:ln>
                   <a:noFill/>
                 </a:ln>
@@ -26728,13 +26818,16 @@
                   <a:srgbClr val="FFFFFF"/>
                 </a:solidFill>
                 <a:effectLst/>
+                <a:highlight>
+                  <a:srgbClr val="808080"/>
+                </a:highlight>
                 <a:uLnTx/>
                 <a:uFillTx/>
                 <a:latin typeface="Corbel" panose="020B0503020204020204"/>
                 <a:ea typeface="+mn-ea"/>
                 <a:cs typeface="+mn-cs"/>
               </a:rPr>
-              <a:t>3. GET CoverageEligibilityResponse</a:t>
+              <a:t>3. $checkStatus</a:t>
             </a:r>
           </a:p>
         </p:txBody>
@@ -26753,8 +26846,8 @@
         </p:nvSpPr>
         <p:spPr>
           <a:xfrm>
-            <a:off x="852735" y="4224271"/>
-            <a:ext cx="2457135" cy="698750"/>
+            <a:off x="785239" y="4224271"/>
+            <a:ext cx="2524631" cy="698750"/>
           </a:xfrm>
           <a:prstGeom prst="roundRect">
             <a:avLst/>
@@ -26798,7 +26891,7 @@
               <a:defRPr/>
             </a:pPr>
             <a:r>
-              <a:rPr kumimoji="0" lang="en-AT" sz="1300" b="0" i="0" u="none" strike="noStrike" kern="1200" cap="none" spc="0" normalizeH="0" baseline="0" noProof="0" dirty="0">
+              <a:rPr kumimoji="0" lang="en-AT" sz="1500" b="0" i="0" u="none" strike="noStrike" kern="1200" cap="none" spc="0" normalizeH="0" baseline="0" noProof="0" dirty="0">
                 <a:ln>
                   <a:noFill/>
                 </a:ln>
@@ -26815,7 +26908,7 @@
               <a:t>5. GET $</a:t>
             </a:r>
             <a:r>
-              <a:rPr kumimoji="0" lang="en-GB" sz="1300" b="0" i="0" u="none" strike="noStrike" kern="1200" cap="none" spc="0" normalizeH="0" baseline="0" noProof="0" dirty="0">
+              <a:rPr kumimoji="0" lang="en-GB" sz="1500" b="0" i="0" u="none" strike="noStrike" kern="1200" cap="none" spc="0" normalizeH="0" baseline="0" noProof="0" dirty="0">
                 <a:ln>
                   <a:noFill/>
                 </a:ln>
@@ -26832,7 +26925,7 @@
               <a:t>pseudonymize</a:t>
             </a:r>
             <a:r>
-              <a:rPr kumimoji="0" lang="en-AT" sz="1300" b="0" i="0" u="none" strike="noStrike" kern="1200" cap="none" spc="0" normalizeH="0" baseline="0" noProof="0" dirty="0">
+              <a:rPr kumimoji="0" lang="en-AT" sz="1500" b="0" i="0" u="none" strike="noStrike" kern="1200" cap="none" spc="0" normalizeH="0" baseline="0" noProof="0" dirty="0">
                 <a:ln>
                   <a:noFill/>
                 </a:ln>
@@ -26868,7 +26961,7 @@
               <a:defRPr/>
             </a:pPr>
             <a:r>
-              <a:rPr kumimoji="0" lang="en-AT" sz="1300" b="0" i="0" u="none" strike="noStrike" kern="1200" cap="none" spc="0" normalizeH="0" baseline="0" noProof="0" dirty="0">
+              <a:rPr kumimoji="0" lang="en-AT" sz="1500" b="0" i="0" u="none" strike="noStrike" kern="1200" cap="none" spc="0" normalizeH="0" baseline="0" noProof="0" dirty="0">
                 <a:ln>
                   <a:noFill/>
                 </a:ln>
@@ -26883,6 +26976,60 @@
                 <a:cs typeface="+mn-cs"/>
               </a:rPr>
               <a:t>(operation)</a:t>
+            </a:r>
+          </a:p>
+        </p:txBody>
+      </p:sp>
+      <p:sp>
+        <p:nvSpPr>
+          <p:cNvPr id="2" name="TextBox 1">
+            <a:extLst>
+              <a:ext uri="{FF2B5EF4-FFF2-40B4-BE49-F238E27FC236}">
+                <a16:creationId xmlns:a16="http://schemas.microsoft.com/office/drawing/2014/main" id="{AB1DDF10-848E-3F7B-906B-2DB447352C97}"/>
+              </a:ext>
+            </a:extLst>
+          </p:cNvPr>
+          <p:cNvSpPr txBox="1"/>
+          <p:nvPr/>
+        </p:nvSpPr>
+        <p:spPr>
+          <a:xfrm>
+            <a:off x="10256045" y="6412006"/>
+            <a:ext cx="1833562" cy="369332"/>
+          </a:xfrm>
+          <a:prstGeom prst="rect">
+            <a:avLst/>
+          </a:prstGeom>
+          <a:noFill/>
+        </p:spPr>
+        <p:txBody>
+          <a:bodyPr wrap="square" rtlCol="0">
+            <a:spAutoFit/>
+          </a:bodyPr>
+          <a:lstStyle/>
+          <a:p>
+            <a:r>
+              <a:rPr lang="en-AT" dirty="0">
+                <a:solidFill>
+                  <a:schemeClr val="bg1"/>
+                </a:solidFill>
+                <a:highlight>
+                  <a:srgbClr val="808080"/>
+                </a:highlight>
+              </a:rPr>
+              <a:t>out of POC scope</a:t>
+            </a:r>
+            <a:r>
+              <a:rPr lang="en-AT" dirty="0">
+                <a:highlight>
+                  <a:srgbClr val="808080"/>
+                </a:highlight>
+              </a:rPr>
+              <a:t>                  </a:t>
+            </a:r>
+            <a:r>
+              <a:rPr lang="en-AT" dirty="0"/>
+              <a:t> </a:t>
             </a:r>
           </a:p>
         </p:txBody>
@@ -26891,6 +27038,960 @@
     <p:extLst>
       <p:ext uri="{BB962C8B-B14F-4D97-AF65-F5344CB8AC3E}">
         <p14:creationId xmlns:p14="http://schemas.microsoft.com/office/powerpoint/2010/main" val="126831953"/>
+      </p:ext>
+    </p:extLst>
+  </p:cSld>
+  <p:clrMapOvr>
+    <a:masterClrMapping/>
+  </p:clrMapOvr>
+</p:sld>
+</file>
+
+<file path=ppt/slides/slide8.xml><?xml version="1.0" encoding="utf-8"?>
+<p:sld xmlns:a="http://schemas.openxmlformats.org/drawingml/2006/main" xmlns:r="http://schemas.openxmlformats.org/officeDocument/2006/relationships" xmlns:p="http://schemas.openxmlformats.org/presentationml/2006/main">
+  <p:cSld>
+    <p:spTree>
+      <p:nvGrpSpPr>
+        <p:cNvPr id="1" name="">
+          <a:extLst>
+            <a:ext uri="{FF2B5EF4-FFF2-40B4-BE49-F238E27FC236}">
+              <a16:creationId xmlns:a16="http://schemas.microsoft.com/office/drawing/2014/main" id="{42F8354B-4A98-B3C1-7AC8-2EB71B7F4CC9}"/>
+            </a:ext>
+          </a:extLst>
+        </p:cNvPr>
+        <p:cNvGrpSpPr/>
+        <p:nvPr/>
+      </p:nvGrpSpPr>
+      <p:grpSpPr>
+        <a:xfrm>
+          <a:off x="0" y="0"/>
+          <a:ext cx="0" cy="0"/>
+          <a:chOff x="0" y="0"/>
+          <a:chExt cx="0" cy="0"/>
+        </a:xfrm>
+      </p:grpSpPr>
+      <p:pic>
+        <p:nvPicPr>
+          <p:cNvPr id="5" name="Content Placeholder 4" descr="A diagram of a diagram&#10;&#10;Description automatically generated">
+            <a:extLst>
+              <a:ext uri="{FF2B5EF4-FFF2-40B4-BE49-F238E27FC236}">
+                <a16:creationId xmlns:a16="http://schemas.microsoft.com/office/drawing/2014/main" id="{DD01B601-E0A3-D5D5-D2C4-EE488C9BF2FA}"/>
+              </a:ext>
+            </a:extLst>
+          </p:cNvPr>
+          <p:cNvPicPr>
+            <a:picLocks noGrp="1" noChangeAspect="1"/>
+          </p:cNvPicPr>
+          <p:nvPr>
+            <p:ph idx="4294967295"/>
+          </p:nvPr>
+        </p:nvPicPr>
+        <p:blipFill rotWithShape="1">
+          <a:blip r:embed="rId3"/>
+          <a:srcRect b="4793"/>
+          <a:stretch/>
+        </p:blipFill>
+        <p:spPr>
+          <a:xfrm>
+            <a:off x="869678" y="0"/>
+            <a:ext cx="10452644" cy="6781338"/>
+          </a:xfrm>
+        </p:spPr>
+      </p:pic>
+      <p:sp>
+        <p:nvSpPr>
+          <p:cNvPr id="10" name="Rounded Rectangle 9">
+            <a:extLst>
+              <a:ext uri="{FF2B5EF4-FFF2-40B4-BE49-F238E27FC236}">
+                <a16:creationId xmlns:a16="http://schemas.microsoft.com/office/drawing/2014/main" id="{9398F678-9DD4-27FA-140E-95611CFAF02E}"/>
+              </a:ext>
+            </a:extLst>
+          </p:cNvPr>
+          <p:cNvSpPr/>
+          <p:nvPr/>
+        </p:nvSpPr>
+        <p:spPr>
+          <a:xfrm>
+            <a:off x="2694392" y="978795"/>
+            <a:ext cx="2722949" cy="657049"/>
+          </a:xfrm>
+          <a:prstGeom prst="roundRect">
+            <a:avLst/>
+          </a:prstGeom>
+        </p:spPr>
+        <p:style>
+          <a:lnRef idx="2">
+            <a:schemeClr val="accent1">
+              <a:shade val="15000"/>
+            </a:schemeClr>
+          </a:lnRef>
+          <a:fillRef idx="1">
+            <a:schemeClr val="accent1"/>
+          </a:fillRef>
+          <a:effectRef idx="0">
+            <a:schemeClr val="accent1"/>
+          </a:effectRef>
+          <a:fontRef idx="minor">
+            <a:schemeClr val="lt1"/>
+          </a:fontRef>
+        </p:style>
+        <p:txBody>
+          <a:bodyPr rtlCol="0" anchor="ctr"/>
+          <a:lstStyle/>
+          <a:p>
+            <a:pPr marL="228600" marR="0" lvl="0" indent="-228600" algn="ctr" defTabSz="457200" rtl="0" eaLnBrk="1" fontAlgn="auto" latinLnBrk="0" hangingPunct="1">
+              <a:lnSpc>
+                <a:spcPct val="100000"/>
+              </a:lnSpc>
+              <a:spcBef>
+                <a:spcPts val="0"/>
+              </a:spcBef>
+              <a:spcAft>
+                <a:spcPts val="0"/>
+              </a:spcAft>
+              <a:buClrTx/>
+              <a:buSzTx/>
+              <a:buFontTx/>
+              <a:buAutoNum type="arabicPeriod"/>
+              <a:tabLst/>
+              <a:defRPr/>
+            </a:pPr>
+            <a:r>
+              <a:rPr kumimoji="0" lang="en-AT" sz="1500" b="0" i="0" u="none" strike="noStrike" kern="1200" cap="none" spc="0" normalizeH="0" baseline="0" noProof="0" dirty="0">
+                <a:ln>
+                  <a:noFill/>
+                </a:ln>
+                <a:solidFill>
+                  <a:srgbClr val="FFFFFF"/>
+                </a:solidFill>
+                <a:effectLst/>
+                <a:uLnTx/>
+                <a:uFillTx/>
+                <a:latin typeface="Corbel" panose="020B0503020204020204"/>
+                <a:ea typeface="+mn-ea"/>
+                <a:cs typeface="+mn-cs"/>
+              </a:rPr>
+              <a:t>$aufnehmen</a:t>
+            </a:r>
+          </a:p>
+          <a:p>
+            <a:pPr marL="0" marR="0" lvl="0" indent="0" algn="ctr" defTabSz="457200" rtl="0" eaLnBrk="1" fontAlgn="auto" latinLnBrk="0" hangingPunct="1">
+              <a:lnSpc>
+                <a:spcPct val="100000"/>
+              </a:lnSpc>
+              <a:spcBef>
+                <a:spcPts val="0"/>
+              </a:spcBef>
+              <a:spcAft>
+                <a:spcPts val="0"/>
+              </a:spcAft>
+              <a:buClrTx/>
+              <a:buSzTx/>
+              <a:buFontTx/>
+              <a:buNone/>
+              <a:tabLst/>
+              <a:defRPr/>
+            </a:pPr>
+            <a:r>
+              <a:rPr kumimoji="0" lang="en-AT" sz="1500" b="0" i="0" u="none" strike="noStrike" kern="1200" cap="none" spc="0" normalizeH="0" baseline="0" noProof="0" dirty="0">
+                <a:ln>
+                  <a:noFill/>
+                </a:ln>
+                <a:solidFill>
+                  <a:srgbClr val="FFFFFF"/>
+                </a:solidFill>
+                <a:effectLst/>
+                <a:uLnTx/>
+                <a:uFillTx/>
+                <a:latin typeface="Corbel" panose="020B0503020204020204"/>
+                <a:ea typeface="+mn-ea"/>
+                <a:cs typeface="+mn-cs"/>
+              </a:rPr>
+              <a:t>2a. </a:t>
+            </a:r>
+            <a:r>
+              <a:rPr lang="en-AT" sz="1500" dirty="0">
+                <a:solidFill>
+                  <a:srgbClr val="FFFFFF"/>
+                </a:solidFill>
+                <a:latin typeface="Corbel" panose="020B0503020204020204"/>
+              </a:rPr>
+              <a:t>$anfragen</a:t>
+            </a:r>
+            <a:endParaRPr kumimoji="0" lang="en-AT" sz="1500" b="0" i="0" u="none" strike="noStrike" kern="1200" cap="none" spc="0" normalizeH="0" baseline="0" noProof="0" dirty="0">
+              <a:ln>
+                <a:noFill/>
+              </a:ln>
+              <a:solidFill>
+                <a:srgbClr val="FFFFFF"/>
+              </a:solidFill>
+              <a:effectLst/>
+              <a:uLnTx/>
+              <a:uFillTx/>
+              <a:latin typeface="Corbel" panose="020B0503020204020204"/>
+              <a:ea typeface="+mn-ea"/>
+              <a:cs typeface="+mn-cs"/>
+            </a:endParaRPr>
+          </a:p>
+        </p:txBody>
+      </p:sp>
+      <p:sp>
+        <p:nvSpPr>
+          <p:cNvPr id="11" name="Rounded Rectangle 10">
+            <a:extLst>
+              <a:ext uri="{FF2B5EF4-FFF2-40B4-BE49-F238E27FC236}">
+                <a16:creationId xmlns:a16="http://schemas.microsoft.com/office/drawing/2014/main" id="{37F0916C-23C6-4AB6-C095-24805F4D09CC}"/>
+              </a:ext>
+            </a:extLst>
+          </p:cNvPr>
+          <p:cNvSpPr/>
+          <p:nvPr/>
+        </p:nvSpPr>
+        <p:spPr>
+          <a:xfrm>
+            <a:off x="2694392" y="1635844"/>
+            <a:ext cx="2722949" cy="511696"/>
+          </a:xfrm>
+          <a:prstGeom prst="roundRect">
+            <a:avLst/>
+          </a:prstGeom>
+        </p:spPr>
+        <p:style>
+          <a:lnRef idx="2">
+            <a:schemeClr val="accent1">
+              <a:shade val="15000"/>
+            </a:schemeClr>
+          </a:lnRef>
+          <a:fillRef idx="1">
+            <a:schemeClr val="accent1"/>
+          </a:fillRef>
+          <a:effectRef idx="0">
+            <a:schemeClr val="accent1"/>
+          </a:effectRef>
+          <a:fontRef idx="minor">
+            <a:schemeClr val="lt1"/>
+          </a:fontRef>
+        </p:style>
+        <p:txBody>
+          <a:bodyPr rtlCol="0" anchor="ctr"/>
+          <a:lstStyle/>
+          <a:p>
+            <a:pPr marL="0" marR="0" lvl="0" indent="0" algn="ctr" defTabSz="457200" rtl="0" eaLnBrk="1" fontAlgn="auto" latinLnBrk="0" hangingPunct="1">
+              <a:lnSpc>
+                <a:spcPct val="100000"/>
+              </a:lnSpc>
+              <a:spcBef>
+                <a:spcPts val="0"/>
+              </a:spcBef>
+              <a:spcAft>
+                <a:spcPts val="0"/>
+              </a:spcAft>
+              <a:buClrTx/>
+              <a:buSzTx/>
+              <a:buFontTx/>
+              <a:buNone/>
+              <a:tabLst/>
+              <a:defRPr/>
+            </a:pPr>
+            <a:r>
+              <a:rPr kumimoji="0" lang="en-AT" sz="1500" b="0" i="0" u="none" strike="noStrike" kern="1200" cap="none" spc="0" normalizeH="0" baseline="0" noProof="0" dirty="0">
+                <a:ln>
+                  <a:noFill/>
+                </a:ln>
+                <a:solidFill>
+                  <a:srgbClr val="FFFFFF"/>
+                </a:solidFill>
+                <a:effectLst/>
+                <a:uLnTx/>
+                <a:uFillTx/>
+                <a:latin typeface="Corbel" panose="020B0503020204020204"/>
+                <a:ea typeface="+mn-ea"/>
+                <a:cs typeface="+mn-cs"/>
+              </a:rPr>
+              <a:t>4. $entlassen (freigeben = false)</a:t>
+            </a:r>
+          </a:p>
+        </p:txBody>
+      </p:sp>
+      <p:sp>
+        <p:nvSpPr>
+          <p:cNvPr id="12" name="Rounded Rectangle 11">
+            <a:extLst>
+              <a:ext uri="{FF2B5EF4-FFF2-40B4-BE49-F238E27FC236}">
+                <a16:creationId xmlns:a16="http://schemas.microsoft.com/office/drawing/2014/main" id="{875CA679-A8B7-5628-E31C-99EAAA7D8501}"/>
+              </a:ext>
+            </a:extLst>
+          </p:cNvPr>
+          <p:cNvSpPr/>
+          <p:nvPr/>
+        </p:nvSpPr>
+        <p:spPr>
+          <a:xfrm>
+            <a:off x="2694392" y="2123051"/>
+            <a:ext cx="2722949" cy="386942"/>
+          </a:xfrm>
+          <a:prstGeom prst="roundRect">
+            <a:avLst/>
+          </a:prstGeom>
+        </p:spPr>
+        <p:style>
+          <a:lnRef idx="2">
+            <a:schemeClr val="accent1">
+              <a:shade val="15000"/>
+            </a:schemeClr>
+          </a:lnRef>
+          <a:fillRef idx="1">
+            <a:schemeClr val="accent1"/>
+          </a:fillRef>
+          <a:effectRef idx="0">
+            <a:schemeClr val="accent1"/>
+          </a:effectRef>
+          <a:fontRef idx="minor">
+            <a:schemeClr val="lt1"/>
+          </a:fontRef>
+        </p:style>
+        <p:txBody>
+          <a:bodyPr rtlCol="0" anchor="ctr"/>
+          <a:lstStyle/>
+          <a:p>
+            <a:pPr marL="0" marR="0" lvl="0" indent="0" algn="ctr" defTabSz="457200" rtl="0" eaLnBrk="1" fontAlgn="auto" latinLnBrk="0" hangingPunct="1">
+              <a:lnSpc>
+                <a:spcPct val="100000"/>
+              </a:lnSpc>
+              <a:spcBef>
+                <a:spcPts val="0"/>
+              </a:spcBef>
+              <a:spcAft>
+                <a:spcPts val="0"/>
+              </a:spcAft>
+              <a:buClrTx/>
+              <a:buSzTx/>
+              <a:buFontTx/>
+              <a:buNone/>
+              <a:tabLst/>
+              <a:defRPr/>
+            </a:pPr>
+            <a:r>
+              <a:rPr kumimoji="0" lang="en-AT" sz="1500" b="0" i="0" u="none" strike="noStrike" kern="1200" cap="none" spc="0" normalizeH="0" baseline="0" noProof="0" dirty="0">
+                <a:ln>
+                  <a:noFill/>
+                </a:ln>
+                <a:solidFill>
+                  <a:srgbClr val="FFFFFF"/>
+                </a:solidFill>
+                <a:effectLst/>
+                <a:uLnTx/>
+                <a:uFillTx/>
+                <a:latin typeface="Corbel" panose="020B0503020204020204"/>
+                <a:ea typeface="+mn-ea"/>
+                <a:cs typeface="+mn-cs"/>
+              </a:rPr>
+              <a:t>5. $entlassen (freigeben = true)</a:t>
+            </a:r>
+          </a:p>
+        </p:txBody>
+      </p:sp>
+      <p:sp>
+        <p:nvSpPr>
+          <p:cNvPr id="13" name="Rounded Rectangle 12">
+            <a:extLst>
+              <a:ext uri="{FF2B5EF4-FFF2-40B4-BE49-F238E27FC236}">
+                <a16:creationId xmlns:a16="http://schemas.microsoft.com/office/drawing/2014/main" id="{44A53A27-1CBE-7E97-934E-4D352C7D92D2}"/>
+              </a:ext>
+            </a:extLst>
+          </p:cNvPr>
+          <p:cNvSpPr/>
+          <p:nvPr/>
+        </p:nvSpPr>
+        <p:spPr>
+          <a:xfrm>
+            <a:off x="6096000" y="1643275"/>
+            <a:ext cx="2722949" cy="505534"/>
+          </a:xfrm>
+          <a:prstGeom prst="roundRect">
+            <a:avLst/>
+          </a:prstGeom>
+        </p:spPr>
+        <p:style>
+          <a:lnRef idx="2">
+            <a:schemeClr val="accent1">
+              <a:shade val="15000"/>
+            </a:schemeClr>
+          </a:lnRef>
+          <a:fillRef idx="1">
+            <a:schemeClr val="accent1"/>
+          </a:fillRef>
+          <a:effectRef idx="0">
+            <a:schemeClr val="accent1"/>
+          </a:effectRef>
+          <a:fontRef idx="minor">
+            <a:schemeClr val="lt1"/>
+          </a:fontRef>
+        </p:style>
+        <p:txBody>
+          <a:bodyPr rtlCol="0" anchor="ctr"/>
+          <a:lstStyle/>
+          <a:p>
+            <a:pPr marL="0" marR="0" lvl="0" indent="0" algn="ctr" defTabSz="457200" rtl="0" eaLnBrk="1" fontAlgn="auto" latinLnBrk="0" hangingPunct="1">
+              <a:lnSpc>
+                <a:spcPct val="100000"/>
+              </a:lnSpc>
+              <a:spcBef>
+                <a:spcPts val="0"/>
+              </a:spcBef>
+              <a:spcAft>
+                <a:spcPts val="0"/>
+              </a:spcAft>
+              <a:buClrTx/>
+              <a:buSzTx/>
+              <a:buFontTx/>
+              <a:buNone/>
+              <a:tabLst/>
+              <a:defRPr/>
+            </a:pPr>
+            <a:r>
+              <a:rPr kumimoji="0" lang="en-AT" sz="1500" b="0" i="0" u="none" strike="noStrike" kern="1200" cap="none" spc="0" normalizeH="0" baseline="0" noProof="0" dirty="0">
+                <a:ln>
+                  <a:noFill/>
+                </a:ln>
+                <a:solidFill>
+                  <a:srgbClr val="FFFFFF"/>
+                </a:solidFill>
+                <a:effectLst/>
+                <a:uLnTx/>
+                <a:uFillTx/>
+                <a:latin typeface="Corbel" panose="020B0503020204020204"/>
+                <a:ea typeface="+mn-ea"/>
+                <a:cs typeface="+mn-cs"/>
+              </a:rPr>
+              <a:t>3. POST CoverageEligibilityResponse</a:t>
+            </a:r>
+          </a:p>
+        </p:txBody>
+      </p:sp>
+      <p:sp>
+        <p:nvSpPr>
+          <p:cNvPr id="14" name="Rounded Rectangle 13">
+            <a:extLst>
+              <a:ext uri="{FF2B5EF4-FFF2-40B4-BE49-F238E27FC236}">
+                <a16:creationId xmlns:a16="http://schemas.microsoft.com/office/drawing/2014/main" id="{87D365F4-D59E-089E-9AB0-E9EA940CC9B9}"/>
+              </a:ext>
+            </a:extLst>
+          </p:cNvPr>
+          <p:cNvSpPr/>
+          <p:nvPr/>
+        </p:nvSpPr>
+        <p:spPr>
+          <a:xfrm>
+            <a:off x="6401431" y="2509993"/>
+            <a:ext cx="2582365" cy="735775"/>
+          </a:xfrm>
+          <a:prstGeom prst="roundRect">
+            <a:avLst/>
+          </a:prstGeom>
+        </p:spPr>
+        <p:style>
+          <a:lnRef idx="2">
+            <a:schemeClr val="accent1">
+              <a:shade val="15000"/>
+            </a:schemeClr>
+          </a:lnRef>
+          <a:fillRef idx="1">
+            <a:schemeClr val="accent1"/>
+          </a:fillRef>
+          <a:effectRef idx="0">
+            <a:schemeClr val="accent1"/>
+          </a:effectRef>
+          <a:fontRef idx="minor">
+            <a:schemeClr val="lt1"/>
+          </a:fontRef>
+        </p:style>
+        <p:txBody>
+          <a:bodyPr rtlCol="0" anchor="ctr"/>
+          <a:lstStyle/>
+          <a:p>
+            <a:pPr marL="0" marR="0" lvl="0" indent="0" algn="ctr" defTabSz="457200" rtl="0" eaLnBrk="1" fontAlgn="auto" latinLnBrk="0" hangingPunct="1">
+              <a:lnSpc>
+                <a:spcPct val="100000"/>
+              </a:lnSpc>
+              <a:spcBef>
+                <a:spcPts val="0"/>
+              </a:spcBef>
+              <a:spcAft>
+                <a:spcPts val="0"/>
+              </a:spcAft>
+              <a:buClrTx/>
+              <a:buSzTx/>
+              <a:buFontTx/>
+              <a:buNone/>
+              <a:tabLst/>
+              <a:defRPr/>
+            </a:pPr>
+            <a:r>
+              <a:rPr kumimoji="0" lang="en-AT" sz="1500" b="0" i="0" u="none" strike="noStrike" kern="1200" cap="none" spc="0" normalizeH="0" baseline="0" noProof="0" dirty="0">
+                <a:ln>
+                  <a:noFill/>
+                </a:ln>
+                <a:solidFill>
+                  <a:srgbClr val="FFFFFF"/>
+                </a:solidFill>
+                <a:effectLst/>
+                <a:uLnTx/>
+                <a:uFillTx/>
+                <a:latin typeface="Corbel" panose="020B0503020204020204"/>
+                <a:ea typeface="+mn-ea"/>
+                <a:cs typeface="+mn-cs"/>
+              </a:rPr>
+              <a:t>2b. GET CoverageEligibilityRequest</a:t>
+            </a:r>
+          </a:p>
+          <a:p>
+            <a:pPr marL="0" marR="0" lvl="0" indent="0" algn="ctr" defTabSz="457200" rtl="0" eaLnBrk="1" fontAlgn="auto" latinLnBrk="0" hangingPunct="1">
+              <a:lnSpc>
+                <a:spcPct val="100000"/>
+              </a:lnSpc>
+              <a:spcBef>
+                <a:spcPts val="0"/>
+              </a:spcBef>
+              <a:spcAft>
+                <a:spcPts val="0"/>
+              </a:spcAft>
+              <a:buClrTx/>
+              <a:buSzTx/>
+              <a:buFontTx/>
+              <a:buNone/>
+              <a:tabLst/>
+              <a:defRPr/>
+            </a:pPr>
+            <a:r>
+              <a:rPr kumimoji="0" lang="en-AT" sz="1500" b="0" i="0" u="none" strike="noStrike" kern="1200" cap="none" spc="0" normalizeH="0" baseline="0" noProof="0" dirty="0">
+                <a:ln>
+                  <a:noFill/>
+                </a:ln>
+                <a:solidFill>
+                  <a:srgbClr val="FFFFFF"/>
+                </a:solidFill>
+                <a:effectLst/>
+                <a:uLnTx/>
+                <a:uFillTx/>
+                <a:latin typeface="Corbel" panose="020B0503020204020204"/>
+                <a:ea typeface="+mn-ea"/>
+                <a:cs typeface="+mn-cs"/>
+              </a:rPr>
+              <a:t>6. GET ClaimResponse</a:t>
+            </a:r>
+          </a:p>
+        </p:txBody>
+      </p:sp>
+      <p:sp>
+        <p:nvSpPr>
+          <p:cNvPr id="15" name="Rounded Rectangle 14">
+            <a:extLst>
+              <a:ext uri="{FF2B5EF4-FFF2-40B4-BE49-F238E27FC236}">
+                <a16:creationId xmlns:a16="http://schemas.microsoft.com/office/drawing/2014/main" id="{2A78CAF8-7D17-4094-7C88-89E180F13894}"/>
+              </a:ext>
+            </a:extLst>
+          </p:cNvPr>
+          <p:cNvSpPr/>
+          <p:nvPr/>
+        </p:nvSpPr>
+        <p:spPr>
+          <a:xfrm>
+            <a:off x="7689534" y="4470281"/>
+            <a:ext cx="1428662" cy="414083"/>
+          </a:xfrm>
+          <a:prstGeom prst="roundRect">
+            <a:avLst/>
+          </a:prstGeom>
+        </p:spPr>
+        <p:style>
+          <a:lnRef idx="2">
+            <a:schemeClr val="accent1">
+              <a:shade val="15000"/>
+            </a:schemeClr>
+          </a:lnRef>
+          <a:fillRef idx="1">
+            <a:schemeClr val="accent1"/>
+          </a:fillRef>
+          <a:effectRef idx="0">
+            <a:schemeClr val="accent1"/>
+          </a:effectRef>
+          <a:fontRef idx="minor">
+            <a:schemeClr val="lt1"/>
+          </a:fontRef>
+        </p:style>
+        <p:txBody>
+          <a:bodyPr rtlCol="0" anchor="ctr"/>
+          <a:lstStyle/>
+          <a:p>
+            <a:pPr marL="0" marR="0" lvl="0" indent="0" algn="ctr" defTabSz="457200" rtl="0" eaLnBrk="1" fontAlgn="auto" latinLnBrk="0" hangingPunct="1">
+              <a:lnSpc>
+                <a:spcPct val="100000"/>
+              </a:lnSpc>
+              <a:spcBef>
+                <a:spcPts val="0"/>
+              </a:spcBef>
+              <a:spcAft>
+                <a:spcPts val="0"/>
+              </a:spcAft>
+              <a:buClrTx/>
+              <a:buSzTx/>
+              <a:buFontTx/>
+              <a:buNone/>
+              <a:tabLst/>
+              <a:defRPr/>
+            </a:pPr>
+            <a:r>
+              <a:rPr kumimoji="0" lang="en-AT" sz="1500" b="0" i="0" u="none" strike="noStrike" kern="1200" cap="none" spc="0" normalizeH="0" baseline="0" noProof="0" dirty="0">
+                <a:ln>
+                  <a:noFill/>
+                </a:ln>
+                <a:solidFill>
+                  <a:srgbClr val="FFFFFF"/>
+                </a:solidFill>
+                <a:effectLst/>
+                <a:uLnTx/>
+                <a:uFillTx/>
+                <a:latin typeface="Corbel" panose="020B0503020204020204"/>
+                <a:ea typeface="+mn-ea"/>
+                <a:cs typeface="+mn-cs"/>
+              </a:rPr>
+              <a:t>5. GET Claim</a:t>
+            </a:r>
+          </a:p>
+        </p:txBody>
+      </p:sp>
+      <p:sp>
+        <p:nvSpPr>
+          <p:cNvPr id="16" name="Rounded Rectangle 15">
+            <a:extLst>
+              <a:ext uri="{FF2B5EF4-FFF2-40B4-BE49-F238E27FC236}">
+                <a16:creationId xmlns:a16="http://schemas.microsoft.com/office/drawing/2014/main" id="{2EB817FD-610F-D075-74D7-880D52ABBF5A}"/>
+              </a:ext>
+            </a:extLst>
+          </p:cNvPr>
+          <p:cNvSpPr/>
+          <p:nvPr/>
+        </p:nvSpPr>
+        <p:spPr>
+          <a:xfrm>
+            <a:off x="9526061" y="4483179"/>
+            <a:ext cx="2175402" cy="414084"/>
+          </a:xfrm>
+          <a:prstGeom prst="roundRect">
+            <a:avLst/>
+          </a:prstGeom>
+        </p:spPr>
+        <p:style>
+          <a:lnRef idx="2">
+            <a:schemeClr val="accent1">
+              <a:shade val="15000"/>
+            </a:schemeClr>
+          </a:lnRef>
+          <a:fillRef idx="1">
+            <a:schemeClr val="accent1"/>
+          </a:fillRef>
+          <a:effectRef idx="0">
+            <a:schemeClr val="accent1"/>
+          </a:effectRef>
+          <a:fontRef idx="minor">
+            <a:schemeClr val="lt1"/>
+          </a:fontRef>
+        </p:style>
+        <p:txBody>
+          <a:bodyPr rtlCol="0" anchor="ctr"/>
+          <a:lstStyle/>
+          <a:p>
+            <a:pPr marL="0" marR="0" lvl="0" indent="0" algn="ctr" defTabSz="457200" rtl="0" eaLnBrk="1" fontAlgn="auto" latinLnBrk="0" hangingPunct="1">
+              <a:lnSpc>
+                <a:spcPct val="100000"/>
+              </a:lnSpc>
+              <a:spcBef>
+                <a:spcPts val="0"/>
+              </a:spcBef>
+              <a:spcAft>
+                <a:spcPts val="0"/>
+              </a:spcAft>
+              <a:buClrTx/>
+              <a:buSzTx/>
+              <a:buFontTx/>
+              <a:buNone/>
+              <a:tabLst/>
+              <a:defRPr/>
+            </a:pPr>
+            <a:r>
+              <a:rPr kumimoji="0" lang="en-AT" sz="1500" b="0" i="0" u="none" strike="noStrike" kern="1200" cap="none" spc="0" normalizeH="0" baseline="0" noProof="0" dirty="0">
+                <a:ln>
+                  <a:noFill/>
+                </a:ln>
+                <a:solidFill>
+                  <a:srgbClr val="FFFFFF"/>
+                </a:solidFill>
+                <a:effectLst/>
+                <a:uLnTx/>
+                <a:uFillTx/>
+                <a:latin typeface="Corbel" panose="020B0503020204020204"/>
+                <a:ea typeface="+mn-ea"/>
+                <a:cs typeface="+mn-cs"/>
+              </a:rPr>
+              <a:t>6. POST ClaimResponse</a:t>
+            </a:r>
+          </a:p>
+        </p:txBody>
+      </p:sp>
+      <p:sp>
+        <p:nvSpPr>
+          <p:cNvPr id="17" name="Rounded Rectangle 16">
+            <a:extLst>
+              <a:ext uri="{FF2B5EF4-FFF2-40B4-BE49-F238E27FC236}">
+                <a16:creationId xmlns:a16="http://schemas.microsoft.com/office/drawing/2014/main" id="{3A553DB3-7A5D-BED0-390F-D931705E9161}"/>
+              </a:ext>
+            </a:extLst>
+          </p:cNvPr>
+          <p:cNvSpPr/>
+          <p:nvPr/>
+        </p:nvSpPr>
+        <p:spPr>
+          <a:xfrm>
+            <a:off x="2321344" y="2704189"/>
+            <a:ext cx="2524631" cy="491369"/>
+          </a:xfrm>
+          <a:prstGeom prst="roundRect">
+            <a:avLst/>
+          </a:prstGeom>
+        </p:spPr>
+        <p:style>
+          <a:lnRef idx="2">
+            <a:schemeClr val="accent1">
+              <a:shade val="15000"/>
+            </a:schemeClr>
+          </a:lnRef>
+          <a:fillRef idx="1">
+            <a:schemeClr val="accent1"/>
+          </a:fillRef>
+          <a:effectRef idx="0">
+            <a:schemeClr val="accent1"/>
+          </a:effectRef>
+          <a:fontRef idx="minor">
+            <a:schemeClr val="lt1"/>
+          </a:fontRef>
+        </p:style>
+        <p:txBody>
+          <a:bodyPr rtlCol="0" anchor="ctr"/>
+          <a:lstStyle/>
+          <a:p>
+            <a:pPr marL="0" marR="0" lvl="0" indent="0" algn="ctr" defTabSz="457200" rtl="0" eaLnBrk="1" fontAlgn="auto" latinLnBrk="0" hangingPunct="1">
+              <a:lnSpc>
+                <a:spcPct val="100000"/>
+              </a:lnSpc>
+              <a:spcBef>
+                <a:spcPts val="0"/>
+              </a:spcBef>
+              <a:spcAft>
+                <a:spcPts val="0"/>
+              </a:spcAft>
+              <a:buClrTx/>
+              <a:buSzTx/>
+              <a:buFontTx/>
+              <a:buNone/>
+              <a:tabLst/>
+              <a:defRPr/>
+            </a:pPr>
+            <a:r>
+              <a:rPr kumimoji="0" lang="en-AT" sz="1500" b="0" i="0" u="none" strike="noStrike" kern="1200" cap="none" spc="0" normalizeH="0" baseline="0" noProof="0" dirty="0">
+                <a:ln>
+                  <a:noFill/>
+                </a:ln>
+                <a:solidFill>
+                  <a:srgbClr val="FFFFFF"/>
+                </a:solidFill>
+                <a:effectLst/>
+                <a:uLnTx/>
+                <a:uFillTx/>
+                <a:latin typeface="Corbel" panose="020B0503020204020204"/>
+                <a:ea typeface="+mn-ea"/>
+                <a:cs typeface="+mn-cs"/>
+              </a:rPr>
+              <a:t>3. </a:t>
+            </a:r>
+            <a:r>
+              <a:rPr lang="en-AT" sz="1500" dirty="0">
+                <a:solidFill>
+                  <a:srgbClr val="FFFFFF"/>
+                </a:solidFill>
+                <a:latin typeface="Corbel" panose="020B0503020204020204"/>
+              </a:rPr>
+              <a:t>GET CoverageEligibilityResponse</a:t>
+            </a:r>
+            <a:endParaRPr kumimoji="0" lang="en-AT" sz="1500" b="0" i="0" u="none" strike="noStrike" kern="1200" cap="none" spc="0" normalizeH="0" baseline="0" noProof="0" dirty="0">
+              <a:ln>
+                <a:noFill/>
+              </a:ln>
+              <a:solidFill>
+                <a:srgbClr val="FFFFFF"/>
+              </a:solidFill>
+              <a:effectLst/>
+              <a:uLnTx/>
+              <a:uFillTx/>
+              <a:latin typeface="Corbel" panose="020B0503020204020204"/>
+              <a:ea typeface="+mn-ea"/>
+              <a:cs typeface="+mn-cs"/>
+            </a:endParaRPr>
+          </a:p>
+        </p:txBody>
+      </p:sp>
+      <p:sp>
+        <p:nvSpPr>
+          <p:cNvPr id="18" name="Rounded Rectangle 17">
+            <a:extLst>
+              <a:ext uri="{FF2B5EF4-FFF2-40B4-BE49-F238E27FC236}">
+                <a16:creationId xmlns:a16="http://schemas.microsoft.com/office/drawing/2014/main" id="{FFDD7A66-FAC8-F9B9-1526-2F71D35E7888}"/>
+              </a:ext>
+            </a:extLst>
+          </p:cNvPr>
+          <p:cNvSpPr/>
+          <p:nvPr/>
+        </p:nvSpPr>
+        <p:spPr>
+          <a:xfrm>
+            <a:off x="785239" y="4224271"/>
+            <a:ext cx="2524631" cy="698750"/>
+          </a:xfrm>
+          <a:prstGeom prst="roundRect">
+            <a:avLst/>
+          </a:prstGeom>
+        </p:spPr>
+        <p:style>
+          <a:lnRef idx="2">
+            <a:schemeClr val="accent1">
+              <a:shade val="15000"/>
+            </a:schemeClr>
+          </a:lnRef>
+          <a:fillRef idx="1">
+            <a:schemeClr val="accent1"/>
+          </a:fillRef>
+          <a:effectRef idx="0">
+            <a:schemeClr val="accent1"/>
+          </a:effectRef>
+          <a:fontRef idx="minor">
+            <a:schemeClr val="lt1"/>
+          </a:fontRef>
+        </p:style>
+        <p:txBody>
+          <a:bodyPr rtlCol="0" anchor="ctr"/>
+          <a:lstStyle/>
+          <a:p>
+            <a:pPr marL="0" marR="0" lvl="0" indent="0" algn="ctr" defTabSz="457200" rtl="0" eaLnBrk="1" fontAlgn="auto" latinLnBrk="0" hangingPunct="1">
+              <a:lnSpc>
+                <a:spcPct val="100000"/>
+              </a:lnSpc>
+              <a:spcBef>
+                <a:spcPts val="0"/>
+              </a:spcBef>
+              <a:spcAft>
+                <a:spcPts val="0"/>
+              </a:spcAft>
+              <a:buClrTx/>
+              <a:buSzTx/>
+              <a:buFontTx/>
+              <a:buNone/>
+              <a:tabLst/>
+              <a:defRPr/>
+            </a:pPr>
+            <a:r>
+              <a:rPr kumimoji="0" lang="en-AT" sz="1500" b="0" i="0" u="none" strike="noStrike" kern="1200" cap="none" spc="0" normalizeH="0" baseline="0" noProof="0" dirty="0">
+                <a:ln>
+                  <a:noFill/>
+                </a:ln>
+                <a:solidFill>
+                  <a:srgbClr val="FFFFFF"/>
+                </a:solidFill>
+                <a:effectLst/>
+                <a:uLnTx/>
+                <a:uFillTx/>
+                <a:latin typeface="Corbel" panose="020B0503020204020204"/>
+                <a:ea typeface="+mn-ea"/>
+                <a:cs typeface="+mn-cs"/>
+              </a:rPr>
+              <a:t>5. GET $</a:t>
+            </a:r>
+            <a:r>
+              <a:rPr kumimoji="0" lang="en-GB" sz="1500" b="0" i="0" u="none" strike="noStrike" kern="1200" cap="none" spc="0" normalizeH="0" baseline="0" noProof="0" dirty="0">
+                <a:ln>
+                  <a:noFill/>
+                </a:ln>
+                <a:solidFill>
+                  <a:srgbClr val="FFFFFF"/>
+                </a:solidFill>
+                <a:effectLst/>
+                <a:uLnTx/>
+                <a:uFillTx/>
+                <a:latin typeface="Corbel" panose="020B0503020204020204"/>
+                <a:ea typeface="+mn-ea"/>
+                <a:cs typeface="+mn-cs"/>
+              </a:rPr>
+              <a:t>pseudonymize</a:t>
+            </a:r>
+            <a:r>
+              <a:rPr kumimoji="0" lang="en-AT" sz="1500" b="0" i="0" u="none" strike="noStrike" kern="1200" cap="none" spc="0" normalizeH="0" baseline="0" noProof="0" dirty="0">
+                <a:ln>
+                  <a:noFill/>
+                </a:ln>
+                <a:solidFill>
+                  <a:srgbClr val="FFFFFF"/>
+                </a:solidFill>
+                <a:effectLst/>
+                <a:uLnTx/>
+                <a:uFillTx/>
+                <a:latin typeface="Corbel" panose="020B0503020204020204"/>
+                <a:ea typeface="+mn-ea"/>
+                <a:cs typeface="+mn-cs"/>
+              </a:rPr>
+              <a:t>Claim</a:t>
+            </a:r>
+          </a:p>
+          <a:p>
+            <a:pPr marL="0" marR="0" lvl="0" indent="0" algn="ctr" defTabSz="457200" rtl="0" eaLnBrk="1" fontAlgn="auto" latinLnBrk="0" hangingPunct="1">
+              <a:lnSpc>
+                <a:spcPct val="100000"/>
+              </a:lnSpc>
+              <a:spcBef>
+                <a:spcPts val="0"/>
+              </a:spcBef>
+              <a:spcAft>
+                <a:spcPts val="0"/>
+              </a:spcAft>
+              <a:buClrTx/>
+              <a:buSzTx/>
+              <a:buFontTx/>
+              <a:buNone/>
+              <a:tabLst/>
+              <a:defRPr/>
+            </a:pPr>
+            <a:r>
+              <a:rPr kumimoji="0" lang="en-AT" sz="1500" b="0" i="0" u="none" strike="noStrike" kern="1200" cap="none" spc="0" normalizeH="0" baseline="0" noProof="0" dirty="0">
+                <a:ln>
+                  <a:noFill/>
+                </a:ln>
+                <a:solidFill>
+                  <a:srgbClr val="FFFFFF"/>
+                </a:solidFill>
+                <a:effectLst/>
+                <a:uLnTx/>
+                <a:uFillTx/>
+                <a:latin typeface="Corbel" panose="020B0503020204020204"/>
+                <a:ea typeface="+mn-ea"/>
+                <a:cs typeface="+mn-cs"/>
+              </a:rPr>
+              <a:t>(operation)</a:t>
+            </a:r>
+          </a:p>
+        </p:txBody>
+      </p:sp>
+    </p:spTree>
+    <p:extLst>
+      <p:ext uri="{BB962C8B-B14F-4D97-AF65-F5344CB8AC3E}">
+        <p14:creationId xmlns:p14="http://schemas.microsoft.com/office/powerpoint/2010/main" val="902062130"/>
       </p:ext>
     </p:extLst>
   </p:cSld>

</xml_diff>

<commit_message>
remove poc tab from main IG
</commit_message>
<xml_diff>
--- a/docs/Sequence_Diagrams_Drafts.pptx
+++ b/docs/Sequence_Diagrams_Drafts.pptx
@@ -6,7 +6,7 @@
     <p:sldMasterId id="2147483660" r:id="rId2"/>
   </p:sldMasterIdLst>
   <p:notesMasterIdLst>
-    <p:notesMasterId r:id="rId10"/>
+    <p:notesMasterId r:id="rId11"/>
   </p:notesMasterIdLst>
   <p:sldIdLst>
     <p:sldId id="257" r:id="rId3"/>
@@ -16,6 +16,7 @@
     <p:sldId id="260" r:id="rId7"/>
     <p:sldId id="261" r:id="rId8"/>
     <p:sldId id="279" r:id="rId9"/>
+    <p:sldId id="280" r:id="rId10"/>
   </p:sldIdLst>
   <p:sldSz cx="12192000" cy="6858000"/>
   <p:notesSz cx="6858000" cy="9144000"/>
@@ -204,7 +205,7 @@
           <a:p>
             <a:fld id="{B55B58EC-A23A-7A46-8D96-AF627B341743}" type="datetimeFigureOut">
               <a:rPr lang="en-AT" smtClean="0"/>
-              <a:t>03.09.24</a:t>
+              <a:t>30.09.24</a:t>
             </a:fld>
             <a:endParaRPr lang="en-AT"/>
           </a:p>
@@ -17302,6 +17303,177 @@
 </p:notes>
 </file>
 
+<file path=ppt/notesSlides/notesSlide7.xml><?xml version="1.0" encoding="utf-8"?>
+<p:notes xmlns:a="http://schemas.openxmlformats.org/drawingml/2006/main" xmlns:r="http://schemas.openxmlformats.org/officeDocument/2006/relationships" xmlns:p="http://schemas.openxmlformats.org/presentationml/2006/main">
+  <p:cSld>
+    <p:spTree>
+      <p:nvGrpSpPr>
+        <p:cNvPr id="1" name="">
+          <a:extLst>
+            <a:ext uri="{FF2B5EF4-FFF2-40B4-BE49-F238E27FC236}">
+              <a16:creationId xmlns:a16="http://schemas.microsoft.com/office/drawing/2014/main" id="{FE3DAC48-6B3D-BF35-59FB-92A10B0A08C0}"/>
+            </a:ext>
+          </a:extLst>
+        </p:cNvPr>
+        <p:cNvGrpSpPr/>
+        <p:nvPr/>
+      </p:nvGrpSpPr>
+      <p:grpSpPr>
+        <a:xfrm>
+          <a:off x="0" y="0"/>
+          <a:ext cx="0" cy="0"/>
+          <a:chOff x="0" y="0"/>
+          <a:chExt cx="0" cy="0"/>
+        </a:xfrm>
+      </p:grpSpPr>
+      <p:sp>
+        <p:nvSpPr>
+          <p:cNvPr id="2" name="Slide Image Placeholder 1">
+            <a:extLst>
+              <a:ext uri="{FF2B5EF4-FFF2-40B4-BE49-F238E27FC236}">
+                <a16:creationId xmlns:a16="http://schemas.microsoft.com/office/drawing/2014/main" id="{1A61F277-58AC-0E32-6BB5-B96D6146A2C2}"/>
+              </a:ext>
+            </a:extLst>
+          </p:cNvPr>
+          <p:cNvSpPr>
+            <a:spLocks noGrp="1" noRot="1" noChangeAspect="1"/>
+          </p:cNvSpPr>
+          <p:nvPr>
+            <p:ph type="sldImg"/>
+          </p:nvPr>
+        </p:nvSpPr>
+        <p:spPr/>
+      </p:sp>
+      <p:sp>
+        <p:nvSpPr>
+          <p:cNvPr id="3" name="Notes Placeholder 2">
+            <a:extLst>
+              <a:ext uri="{FF2B5EF4-FFF2-40B4-BE49-F238E27FC236}">
+                <a16:creationId xmlns:a16="http://schemas.microsoft.com/office/drawing/2014/main" id="{B1C148D9-397C-183A-44B6-72CDBF6670D6}"/>
+              </a:ext>
+            </a:extLst>
+          </p:cNvPr>
+          <p:cNvSpPr>
+            <a:spLocks noGrp="1"/>
+          </p:cNvSpPr>
+          <p:nvPr>
+            <p:ph type="body" idx="1"/>
+          </p:nvPr>
+        </p:nvSpPr>
+        <p:spPr/>
+        <p:txBody>
+          <a:bodyPr/>
+          <a:lstStyle/>
+          <a:p>
+            <a:r>
+              <a:rPr lang="en-AT" dirty="0"/>
+              <a:t>BMSGPK Claim or ClaimResponse???</a:t>
+            </a:r>
+          </a:p>
+        </p:txBody>
+      </p:sp>
+      <p:sp>
+        <p:nvSpPr>
+          <p:cNvPr id="4" name="Slide Number Placeholder 3">
+            <a:extLst>
+              <a:ext uri="{FF2B5EF4-FFF2-40B4-BE49-F238E27FC236}">
+                <a16:creationId xmlns:a16="http://schemas.microsoft.com/office/drawing/2014/main" id="{D5E73D23-F228-CBEC-441A-7975C4D3811D}"/>
+              </a:ext>
+            </a:extLst>
+          </p:cNvPr>
+          <p:cNvSpPr>
+            <a:spLocks noGrp="1"/>
+          </p:cNvSpPr>
+          <p:nvPr>
+            <p:ph type="sldNum" sz="quarter" idx="5"/>
+          </p:nvPr>
+        </p:nvSpPr>
+        <p:spPr/>
+        <p:txBody>
+          <a:bodyPr/>
+          <a:lstStyle/>
+          <a:p>
+            <a:pPr marL="0" marR="0" lvl="0" indent="0" algn="r" defTabSz="457200" rtl="0" eaLnBrk="1" fontAlgn="auto" latinLnBrk="0" hangingPunct="1">
+              <a:lnSpc>
+                <a:spcPct val="100000"/>
+              </a:lnSpc>
+              <a:spcBef>
+                <a:spcPts val="0"/>
+              </a:spcBef>
+              <a:spcAft>
+                <a:spcPts val="0"/>
+              </a:spcAft>
+              <a:buClrTx/>
+              <a:buSzTx/>
+              <a:buFontTx/>
+              <a:buNone/>
+              <a:tabLst/>
+              <a:defRPr/>
+            </a:pPr>
+            <a:fld id="{7F63250E-8FFF-D04D-A45D-D1FB73421F0A}" type="slidenum">
+              <a:rPr kumimoji="0" lang="en-AT" sz="1200" b="0" i="0" u="none" strike="noStrike" kern="1200" cap="none" spc="0" normalizeH="0" baseline="0" noProof="0" smtClean="0">
+                <a:ln>
+                  <a:noFill/>
+                </a:ln>
+                <a:solidFill>
+                  <a:prstClr val="black"/>
+                </a:solidFill>
+                <a:effectLst/>
+                <a:uLnTx/>
+                <a:uFillTx/>
+                <a:latin typeface="Aptos" panose="02110004020202020204"/>
+                <a:ea typeface="+mn-ea"/>
+                <a:cs typeface="+mn-cs"/>
+              </a:rPr>
+              <a:pPr marL="0" marR="0" lvl="0" indent="0" algn="r" defTabSz="457200" rtl="0" eaLnBrk="1" fontAlgn="auto" latinLnBrk="0" hangingPunct="1">
+                <a:lnSpc>
+                  <a:spcPct val="100000"/>
+                </a:lnSpc>
+                <a:spcBef>
+                  <a:spcPts val="0"/>
+                </a:spcBef>
+                <a:spcAft>
+                  <a:spcPts val="0"/>
+                </a:spcAft>
+                <a:buClrTx/>
+                <a:buSzTx/>
+                <a:buFontTx/>
+                <a:buNone/>
+                <a:tabLst/>
+                <a:defRPr/>
+              </a:pPr>
+              <a:t>8</a:t>
+            </a:fld>
+            <a:endParaRPr kumimoji="0" lang="en-AT" sz="1200" b="0" i="0" u="none" strike="noStrike" kern="1200" cap="none" spc="0" normalizeH="0" baseline="0" noProof="0">
+              <a:ln>
+                <a:noFill/>
+              </a:ln>
+              <a:solidFill>
+                <a:prstClr val="black"/>
+              </a:solidFill>
+              <a:effectLst/>
+              <a:uLnTx/>
+              <a:uFillTx/>
+              <a:latin typeface="Aptos" panose="02110004020202020204"/>
+              <a:ea typeface="+mn-ea"/>
+              <a:cs typeface="+mn-cs"/>
+            </a:endParaRPr>
+          </a:p>
+        </p:txBody>
+      </p:sp>
+    </p:spTree>
+    <p:extLst>
+      <p:ext uri="{BB962C8B-B14F-4D97-AF65-F5344CB8AC3E}">
+        <p14:creationId xmlns:p14="http://schemas.microsoft.com/office/powerpoint/2010/main" val="324427207"/>
+      </p:ext>
+    </p:extLst>
+  </p:cSld>
+  <p:clrMapOvr>
+    <a:masterClrMapping/>
+  </p:clrMapOvr>
+</p:notes>
+</file>
+
 <file path=ppt/slideLayouts/slideLayout1.xml><?xml version="1.0" encoding="utf-8"?>
 <p:sldLayout xmlns:a="http://schemas.openxmlformats.org/drawingml/2006/main" xmlns:r="http://schemas.openxmlformats.org/officeDocument/2006/relationships" xmlns:p="http://schemas.openxmlformats.org/presentationml/2006/main" type="title" preserve="1">
   <p:cSld name="Title Slide">
@@ -17451,7 +17623,7 @@
           <a:p>
             <a:fld id="{12410864-9ED6-9F4B-86D6-36C367AD8FCE}" type="datetimeFigureOut">
               <a:rPr lang="en-AT" smtClean="0"/>
-              <a:t>03.09.24</a:t>
+              <a:t>30.09.24</a:t>
             </a:fld>
             <a:endParaRPr lang="en-AT"/>
           </a:p>
@@ -17651,7 +17823,7 @@
           <a:p>
             <a:fld id="{12410864-9ED6-9F4B-86D6-36C367AD8FCE}" type="datetimeFigureOut">
               <a:rPr lang="en-AT" smtClean="0"/>
-              <a:t>03.09.24</a:t>
+              <a:t>30.09.24</a:t>
             </a:fld>
             <a:endParaRPr lang="en-AT"/>
           </a:p>
@@ -17861,7 +18033,7 @@
           <a:p>
             <a:fld id="{12410864-9ED6-9F4B-86D6-36C367AD8FCE}" type="datetimeFigureOut">
               <a:rPr lang="en-AT" smtClean="0"/>
-              <a:t>03.09.24</a:t>
+              <a:t>30.09.24</a:t>
             </a:fld>
             <a:endParaRPr lang="en-AT"/>
           </a:p>
@@ -18158,7 +18330,7 @@
           <a:p>
             <a:fld id="{EED63164-EF39-0B4A-9007-67453961FB19}" type="datetimeFigureOut">
               <a:rPr lang="en-AT" smtClean="0"/>
-              <a:t>03.09.24</a:t>
+              <a:t>30.09.24</a:t>
             </a:fld>
             <a:endParaRPr lang="en-AT"/>
           </a:p>
@@ -18328,7 +18500,7 @@
           <a:p>
             <a:fld id="{EED63164-EF39-0B4A-9007-67453961FB19}" type="datetimeFigureOut">
               <a:rPr lang="en-AT" smtClean="0"/>
-              <a:t>03.09.24</a:t>
+              <a:t>30.09.24</a:t>
             </a:fld>
             <a:endParaRPr lang="en-AT"/>
           </a:p>
@@ -18586,7 +18758,7 @@
           <a:p>
             <a:fld id="{EED63164-EF39-0B4A-9007-67453961FB19}" type="datetimeFigureOut">
               <a:rPr lang="en-AT" smtClean="0"/>
-              <a:t>03.09.24</a:t>
+              <a:t>30.09.24</a:t>
             </a:fld>
             <a:endParaRPr lang="en-AT"/>
           </a:p>
@@ -18874,7 +19046,7 @@
           <a:p>
             <a:fld id="{EED63164-EF39-0B4A-9007-67453961FB19}" type="datetimeFigureOut">
               <a:rPr lang="en-AT" smtClean="0"/>
-              <a:t>03.09.24</a:t>
+              <a:t>30.09.24</a:t>
             </a:fld>
             <a:endParaRPr lang="en-AT"/>
           </a:p>
@@ -19316,7 +19488,7 @@
           <a:p>
             <a:fld id="{EED63164-EF39-0B4A-9007-67453961FB19}" type="datetimeFigureOut">
               <a:rPr lang="en-AT" smtClean="0"/>
-              <a:t>03.09.24</a:t>
+              <a:t>30.09.24</a:t>
             </a:fld>
             <a:endParaRPr lang="en-AT"/>
           </a:p>
@@ -19434,7 +19606,7 @@
           <a:p>
             <a:fld id="{EED63164-EF39-0B4A-9007-67453961FB19}" type="datetimeFigureOut">
               <a:rPr lang="en-AT" smtClean="0"/>
-              <a:t>03.09.24</a:t>
+              <a:t>30.09.24</a:t>
             </a:fld>
             <a:endParaRPr lang="en-AT"/>
           </a:p>
@@ -19529,7 +19701,7 @@
           <a:p>
             <a:fld id="{EED63164-EF39-0B4A-9007-67453961FB19}" type="datetimeFigureOut">
               <a:rPr lang="en-AT" smtClean="0"/>
-              <a:t>03.09.24</a:t>
+              <a:t>30.09.24</a:t>
             </a:fld>
             <a:endParaRPr lang="en-AT"/>
           </a:p>
@@ -19817,7 +19989,7 @@
           <a:p>
             <a:fld id="{EED63164-EF39-0B4A-9007-67453961FB19}" type="datetimeFigureOut">
               <a:rPr lang="en-AT" smtClean="0"/>
-              <a:t>03.09.24</a:t>
+              <a:t>30.09.24</a:t>
             </a:fld>
             <a:endParaRPr lang="en-AT"/>
           </a:p>
@@ -20005,7 +20177,7 @@
           <a:p>
             <a:fld id="{12410864-9ED6-9F4B-86D6-36C367AD8FCE}" type="datetimeFigureOut">
               <a:rPr lang="en-AT" smtClean="0"/>
-              <a:t>03.09.24</a:t>
+              <a:t>30.09.24</a:t>
             </a:fld>
             <a:endParaRPr lang="en-AT"/>
           </a:p>
@@ -20290,7 +20462,7 @@
           <a:p>
             <a:fld id="{EED63164-EF39-0B4A-9007-67453961FB19}" type="datetimeFigureOut">
               <a:rPr lang="en-AT" smtClean="0"/>
-              <a:t>03.09.24</a:t>
+              <a:t>30.09.24</a:t>
             </a:fld>
             <a:endParaRPr lang="en-AT"/>
           </a:p>
@@ -20465,7 +20637,7 @@
           <a:p>
             <a:fld id="{EED63164-EF39-0B4A-9007-67453961FB19}" type="datetimeFigureOut">
               <a:rPr lang="en-AT" smtClean="0"/>
-              <a:t>03.09.24</a:t>
+              <a:t>30.09.24</a:t>
             </a:fld>
             <a:endParaRPr lang="en-AT"/>
           </a:p>
@@ -20645,7 +20817,7 @@
           <a:p>
             <a:fld id="{EED63164-EF39-0B4A-9007-67453961FB19}" type="datetimeFigureOut">
               <a:rPr lang="en-AT" smtClean="0"/>
-              <a:t>03.09.24</a:t>
+              <a:t>30.09.24</a:t>
             </a:fld>
             <a:endParaRPr lang="en-AT"/>
           </a:p>
@@ -20909,7 +21081,7 @@
           <a:p>
             <a:fld id="{12410864-9ED6-9F4B-86D6-36C367AD8FCE}" type="datetimeFigureOut">
               <a:rPr lang="en-AT" smtClean="0"/>
-              <a:t>03.09.24</a:t>
+              <a:t>30.09.24</a:t>
             </a:fld>
             <a:endParaRPr lang="en-AT"/>
           </a:p>
@@ -21177,7 +21349,7 @@
           <a:p>
             <a:fld id="{12410864-9ED6-9F4B-86D6-36C367AD8FCE}" type="datetimeFigureOut">
               <a:rPr lang="en-AT" smtClean="0"/>
-              <a:t>03.09.24</a:t>
+              <a:t>30.09.24</a:t>
             </a:fld>
             <a:endParaRPr lang="en-AT"/>
           </a:p>
@@ -21592,7 +21764,7 @@
           <a:p>
             <a:fld id="{12410864-9ED6-9F4B-86D6-36C367AD8FCE}" type="datetimeFigureOut">
               <a:rPr lang="en-AT" smtClean="0"/>
-              <a:t>03.09.24</a:t>
+              <a:t>30.09.24</a:t>
             </a:fld>
             <a:endParaRPr lang="en-AT"/>
           </a:p>
@@ -21734,7 +21906,7 @@
           <a:p>
             <a:fld id="{12410864-9ED6-9F4B-86D6-36C367AD8FCE}" type="datetimeFigureOut">
               <a:rPr lang="en-AT" smtClean="0"/>
-              <a:t>03.09.24</a:t>
+              <a:t>30.09.24</a:t>
             </a:fld>
             <a:endParaRPr lang="en-AT"/>
           </a:p>
@@ -21847,7 +22019,7 @@
           <a:p>
             <a:fld id="{12410864-9ED6-9F4B-86D6-36C367AD8FCE}" type="datetimeFigureOut">
               <a:rPr lang="en-AT" smtClean="0"/>
-              <a:t>03.09.24</a:t>
+              <a:t>30.09.24</a:t>
             </a:fld>
             <a:endParaRPr lang="en-AT"/>
           </a:p>
@@ -22160,7 +22332,7 @@
           <a:p>
             <a:fld id="{12410864-9ED6-9F4B-86D6-36C367AD8FCE}" type="datetimeFigureOut">
               <a:rPr lang="en-AT" smtClean="0"/>
-              <a:t>03.09.24</a:t>
+              <a:t>30.09.24</a:t>
             </a:fld>
             <a:endParaRPr lang="en-AT"/>
           </a:p>
@@ -22449,7 +22621,7 @@
           <a:p>
             <a:fld id="{12410864-9ED6-9F4B-86D6-36C367AD8FCE}" type="datetimeFigureOut">
               <a:rPr lang="en-AT" smtClean="0"/>
-              <a:t>03.09.24</a:t>
+              <a:t>30.09.24</a:t>
             </a:fld>
             <a:endParaRPr lang="en-AT"/>
           </a:p>
@@ -22692,7 +22864,7 @@
           <a:p>
             <a:fld id="{12410864-9ED6-9F4B-86D6-36C367AD8FCE}" type="datetimeFigureOut">
               <a:rPr lang="en-AT" smtClean="0"/>
-              <a:t>03.09.24</a:t>
+              <a:t>30.09.24</a:t>
             </a:fld>
             <a:endParaRPr lang="en-AT"/>
           </a:p>
@@ -23323,7 +23495,7 @@
           <a:p>
             <a:fld id="{EED63164-EF39-0B4A-9007-67453961FB19}" type="datetimeFigureOut">
               <a:rPr lang="en-AT" smtClean="0"/>
-              <a:t>03.09.24</a:t>
+              <a:t>30.09.24</a:t>
             </a:fld>
             <a:endParaRPr lang="en-AT"/>
           </a:p>
@@ -25994,7 +26166,7 @@
               <a:defRPr/>
             </a:pPr>
             <a:r>
-              <a:rPr kumimoji="0" lang="en-AT" sz="1300" b="0" i="0" u="none" strike="noStrike" kern="1200" cap="none" spc="0" normalizeH="0" baseline="0" noProof="0" dirty="0">
+              <a:rPr kumimoji="0" lang="en-AT" sz="1500" b="0" i="0" u="none" strike="noStrike" kern="1200" cap="none" spc="0" normalizeH="0" baseline="0" noProof="0" dirty="0">
                 <a:ln>
                   <a:noFill/>
                 </a:ln>
@@ -26008,7 +26180,7 @@
                 <a:ea typeface="+mn-ea"/>
                 <a:cs typeface="+mn-cs"/>
               </a:rPr>
-              <a:t>POST MOPEDEncounter</a:t>
+              <a:t>$aufnehmen</a:t>
             </a:r>
           </a:p>
           <a:p>
@@ -26030,7 +26202,7 @@
               <a:defRPr/>
             </a:pPr>
             <a:r>
-              <a:rPr kumimoji="0" lang="en-AT" sz="1300" b="0" i="0" u="none" strike="noStrike" kern="1200" cap="none" spc="0" normalizeH="0" baseline="0" noProof="0" dirty="0">
+              <a:rPr kumimoji="0" lang="en-AT" sz="1500" b="0" i="0" u="none" strike="noStrike" kern="1200" cap="none" spc="0" normalizeH="0" baseline="0" noProof="0" dirty="0">
                 <a:ln>
                   <a:noFill/>
                 </a:ln>
@@ -26044,44 +26216,31 @@
                 <a:ea typeface="+mn-ea"/>
                 <a:cs typeface="+mn-cs"/>
               </a:rPr>
-              <a:t>(including Resources)</a:t>
-            </a:r>
-          </a:p>
-          <a:p>
-            <a:pPr marL="0" marR="0" lvl="0" indent="0" algn="ctr" defTabSz="457200" rtl="0" eaLnBrk="1" fontAlgn="auto" latinLnBrk="0" hangingPunct="1">
-              <a:lnSpc>
-                <a:spcPct val="100000"/>
-              </a:lnSpc>
-              <a:spcBef>
-                <a:spcPts val="0"/>
-              </a:spcBef>
-              <a:spcAft>
-                <a:spcPts val="0"/>
-              </a:spcAft>
-              <a:buClrTx/>
-              <a:buSzTx/>
-              <a:buFontTx/>
-              <a:buNone/>
-              <a:tabLst/>
-              <a:defRPr/>
-            </a:pPr>
-            <a:r>
-              <a:rPr kumimoji="0" lang="en-AT" sz="1300" b="0" i="0" u="none" strike="noStrike" kern="1200" cap="none" spc="0" normalizeH="0" baseline="0" noProof="0" dirty="0">
-                <a:ln>
-                  <a:noFill/>
-                </a:ln>
+              <a:t>2a. </a:t>
+            </a:r>
+            <a:r>
+              <a:rPr lang="en-AT" sz="1500" dirty="0">
                 <a:solidFill>
                   <a:srgbClr val="FFFFFF"/>
                 </a:solidFill>
-                <a:effectLst/>
-                <a:uLnTx/>
-                <a:uFillTx/>
                 <a:latin typeface="Corbel" panose="020B0503020204020204"/>
-                <a:ea typeface="+mn-ea"/>
-                <a:cs typeface="+mn-cs"/>
-              </a:rPr>
-              <a:t>2. POST CoverageEligibilityRequest</a:t>
-            </a:r>
+              </a:rPr>
+              <a:t>$anfragen</a:t>
+            </a:r>
+            <a:endParaRPr kumimoji="0" lang="en-AT" sz="1500" b="0" i="0" u="none" strike="noStrike" kern="1200" cap="none" spc="0" normalizeH="0" baseline="0" noProof="0" dirty="0">
+              <a:ln>
+                <a:noFill/>
+              </a:ln>
+              <a:solidFill>
+                <a:srgbClr val="FFFFFF"/>
+              </a:solidFill>
+              <a:effectLst/>
+              <a:uLnTx/>
+              <a:uFillTx/>
+              <a:latin typeface="Corbel" panose="020B0503020204020204"/>
+              <a:ea typeface="+mn-ea"/>
+              <a:cs typeface="+mn-cs"/>
+            </a:endParaRPr>
           </a:p>
         </p:txBody>
       </p:sp>
@@ -26144,7 +26303,7 @@
               <a:defRPr/>
             </a:pPr>
             <a:r>
-              <a:rPr kumimoji="0" lang="en-AT" sz="1300" b="0" i="0" u="none" strike="noStrike" kern="1200" cap="none" spc="0" normalizeH="0" baseline="0" noProof="0" dirty="0">
+              <a:rPr kumimoji="0" lang="en-AT" sz="1500" b="0" i="0" u="none" strike="noStrike" kern="1200" cap="none" spc="0" normalizeH="0" baseline="0" noProof="0" dirty="0">
                 <a:ln>
                   <a:noFill/>
                 </a:ln>
@@ -26158,7 +26317,7 @@
                 <a:ea typeface="+mn-ea"/>
                 <a:cs typeface="+mn-cs"/>
               </a:rPr>
-              <a:t>4. PUT MOPEDEncounter (update to include Discharge)</a:t>
+              <a:t>4. $entlassen (freigeben = false)</a:t>
             </a:r>
           </a:p>
         </p:txBody>
@@ -26222,7 +26381,7 @@
               <a:defRPr/>
             </a:pPr>
             <a:r>
-              <a:rPr kumimoji="0" lang="en-AT" sz="1300" b="0" i="0" u="none" strike="noStrike" kern="1200" cap="none" spc="0" normalizeH="0" baseline="0" noProof="0" dirty="0">
+              <a:rPr kumimoji="0" lang="en-AT" sz="1500" b="0" i="0" u="none" strike="noStrike" kern="1200" cap="none" spc="0" normalizeH="0" baseline="0" noProof="0" dirty="0">
                 <a:ln>
                   <a:noFill/>
                 </a:ln>
@@ -26236,43 +26395,7 @@
                 <a:ea typeface="+mn-ea"/>
                 <a:cs typeface="+mn-cs"/>
               </a:rPr>
-              <a:t>5. POST Claim </a:t>
-            </a:r>
-          </a:p>
-          <a:p>
-            <a:pPr marL="0" marR="0" lvl="0" indent="0" algn="ctr" defTabSz="457200" rtl="0" eaLnBrk="1" fontAlgn="auto" latinLnBrk="0" hangingPunct="1">
-              <a:lnSpc>
-                <a:spcPct val="100000"/>
-              </a:lnSpc>
-              <a:spcBef>
-                <a:spcPts val="0"/>
-              </a:spcBef>
-              <a:spcAft>
-                <a:spcPts val="0"/>
-              </a:spcAft>
-              <a:buClrTx/>
-              <a:buSzTx/>
-              <a:buFontTx/>
-              <a:buNone/>
-              <a:tabLst/>
-              <a:defRPr/>
-            </a:pPr>
-            <a:r>
-              <a:rPr kumimoji="0" lang="en-AT" sz="1300" b="0" i="0" u="none" strike="noStrike" kern="1200" cap="none" spc="0" normalizeH="0" baseline="0" noProof="0" dirty="0">
-                <a:ln>
-                  <a:noFill/>
-                </a:ln>
-                <a:solidFill>
-                  <a:srgbClr val="FFFFFF"/>
-                </a:solidFill>
-                <a:effectLst/>
-                <a:uLnTx/>
-                <a:uFillTx/>
-                <a:latin typeface="Corbel" panose="020B0503020204020204"/>
-                <a:ea typeface="+mn-ea"/>
-                <a:cs typeface="+mn-cs"/>
-              </a:rPr>
-              <a:t>(including Resources)</a:t>
+              <a:t>5. $entlassen (freigeben = true)</a:t>
             </a:r>
           </a:p>
         </p:txBody>
@@ -26336,7 +26459,7 @@
               <a:defRPr/>
             </a:pPr>
             <a:r>
-              <a:rPr kumimoji="0" lang="en-AT" sz="1300" b="0" i="0" u="none" strike="noStrike" kern="1200" cap="none" spc="0" normalizeH="0" baseline="0" noProof="0" dirty="0">
+              <a:rPr kumimoji="0" lang="en-AT" sz="1500" b="0" i="0" u="none" strike="noStrike" kern="1200" cap="none" spc="0" normalizeH="0" baseline="0" noProof="0" dirty="0">
                 <a:ln>
                   <a:noFill/>
                 </a:ln>
@@ -26414,7 +26537,7 @@
               <a:defRPr/>
             </a:pPr>
             <a:r>
-              <a:rPr kumimoji="0" lang="en-AT" sz="1300" b="0" i="0" u="none" strike="noStrike" kern="1200" cap="none" spc="0" normalizeH="0" baseline="0" noProof="0" dirty="0">
+              <a:rPr kumimoji="0" lang="en-AT" sz="1500" b="0" i="0" u="none" strike="noStrike" kern="1200" cap="none" spc="0" normalizeH="0" baseline="0" noProof="0" dirty="0">
                 <a:ln>
                   <a:noFill/>
                 </a:ln>
@@ -26422,13 +26545,16 @@
                   <a:srgbClr val="FFFFFF"/>
                 </a:solidFill>
                 <a:effectLst/>
+                <a:highlight>
+                  <a:srgbClr val="808080"/>
+                </a:highlight>
                 <a:uLnTx/>
                 <a:uFillTx/>
                 <a:latin typeface="Corbel" panose="020B0503020204020204"/>
                 <a:ea typeface="+mn-ea"/>
                 <a:cs typeface="+mn-cs"/>
               </a:rPr>
-              <a:t>2. GET CoverageEligibilityRequest</a:t>
+              <a:t>2b. $abholen</a:t>
             </a:r>
           </a:p>
           <a:p>
@@ -26450,43 +26576,7 @@
               <a:defRPr/>
             </a:pPr>
             <a:r>
-              <a:rPr kumimoji="0" lang="en-AT" sz="1300" b="0" i="0" u="none" strike="noStrike" kern="1200" cap="none" spc="0" normalizeH="0" baseline="0" noProof="0" dirty="0">
-                <a:ln>
-                  <a:noFill/>
-                </a:ln>
-                <a:solidFill>
-                  <a:srgbClr val="FFFFFF"/>
-                </a:solidFill>
-                <a:effectLst/>
-                <a:uLnTx/>
-                <a:uFillTx/>
-                <a:latin typeface="Corbel" panose="020B0503020204020204"/>
-                <a:ea typeface="+mn-ea"/>
-                <a:cs typeface="+mn-cs"/>
-              </a:rPr>
-              <a:t>4.Subscription Notify Discharge</a:t>
-            </a:r>
-          </a:p>
-          <a:p>
-            <a:pPr marL="0" marR="0" lvl="0" indent="0" algn="ctr" defTabSz="457200" rtl="0" eaLnBrk="1" fontAlgn="auto" latinLnBrk="0" hangingPunct="1">
-              <a:lnSpc>
-                <a:spcPct val="100000"/>
-              </a:lnSpc>
-              <a:spcBef>
-                <a:spcPts val="0"/>
-              </a:spcBef>
-              <a:spcAft>
-                <a:spcPts val="0"/>
-              </a:spcAft>
-              <a:buClrTx/>
-              <a:buSzTx/>
-              <a:buFontTx/>
-              <a:buNone/>
-              <a:tabLst/>
-              <a:defRPr/>
-            </a:pPr>
-            <a:r>
-              <a:rPr kumimoji="0" lang="en-AT" sz="1300" b="0" i="0" u="none" strike="noStrike" kern="1200" cap="none" spc="0" normalizeH="0" baseline="0" noProof="0" dirty="0">
+              <a:rPr kumimoji="0" lang="en-AT" sz="1500" b="0" i="0" u="none" strike="noStrike" kern="1200" cap="none" spc="0" normalizeH="0" baseline="0" noProof="0" dirty="0">
                 <a:ln>
                   <a:noFill/>
                 </a:ln>
@@ -26564,7 +26654,7 @@
               <a:defRPr/>
             </a:pPr>
             <a:r>
-              <a:rPr kumimoji="0" lang="en-AT" sz="1300" b="0" i="0" u="none" strike="noStrike" kern="1200" cap="none" spc="0" normalizeH="0" baseline="0" noProof="0" dirty="0">
+              <a:rPr kumimoji="0" lang="en-AT" sz="1500" b="0" i="0" u="none" strike="noStrike" kern="1200" cap="none" spc="0" normalizeH="0" baseline="0" noProof="0" dirty="0">
                 <a:ln>
                   <a:noFill/>
                 </a:ln>
@@ -26598,7 +26688,7 @@
         <p:spPr>
           <a:xfrm>
             <a:off x="9526061" y="4483179"/>
-            <a:ext cx="1880700" cy="414084"/>
+            <a:ext cx="2175402" cy="414084"/>
           </a:xfrm>
           <a:prstGeom prst="roundRect">
             <a:avLst/>
@@ -26642,7 +26732,7 @@
               <a:defRPr/>
             </a:pPr>
             <a:r>
-              <a:rPr kumimoji="0" lang="en-AT" sz="1300" b="0" i="0" u="none" strike="noStrike" kern="1200" cap="none" spc="0" normalizeH="0" baseline="0" noProof="0" dirty="0">
+              <a:rPr kumimoji="0" lang="en-AT" sz="1500" b="0" i="0" u="none" strike="noStrike" kern="1200" cap="none" spc="0" normalizeH="0" baseline="0" noProof="0" dirty="0">
                 <a:ln>
                   <a:noFill/>
                 </a:ln>
@@ -26720,7 +26810,7 @@
               <a:defRPr/>
             </a:pPr>
             <a:r>
-              <a:rPr kumimoji="0" lang="en-AT" sz="1300" b="0" i="0" u="none" strike="noStrike" kern="1200" cap="none" spc="0" normalizeH="0" baseline="0" noProof="0" dirty="0">
+              <a:rPr kumimoji="0" lang="en-AT" sz="1500" b="0" i="0" u="none" strike="noStrike" kern="1200" cap="none" spc="0" normalizeH="0" baseline="0" noProof="0" dirty="0">
                 <a:ln>
                   <a:noFill/>
                 </a:ln>
@@ -26728,13 +26818,16 @@
                   <a:srgbClr val="FFFFFF"/>
                 </a:solidFill>
                 <a:effectLst/>
+                <a:highlight>
+                  <a:srgbClr val="808080"/>
+                </a:highlight>
                 <a:uLnTx/>
                 <a:uFillTx/>
                 <a:latin typeface="Corbel" panose="020B0503020204020204"/>
                 <a:ea typeface="+mn-ea"/>
                 <a:cs typeface="+mn-cs"/>
               </a:rPr>
-              <a:t>3. GET CoverageEligibilityResponse</a:t>
+              <a:t>3. $checkStatus</a:t>
             </a:r>
           </a:p>
         </p:txBody>
@@ -26753,8 +26846,8 @@
         </p:nvSpPr>
         <p:spPr>
           <a:xfrm>
-            <a:off x="852735" y="4224271"/>
-            <a:ext cx="2457135" cy="698750"/>
+            <a:off x="785239" y="4224271"/>
+            <a:ext cx="2524631" cy="698750"/>
           </a:xfrm>
           <a:prstGeom prst="roundRect">
             <a:avLst/>
@@ -26798,7 +26891,7 @@
               <a:defRPr/>
             </a:pPr>
             <a:r>
-              <a:rPr kumimoji="0" lang="en-AT" sz="1300" b="0" i="0" u="none" strike="noStrike" kern="1200" cap="none" spc="0" normalizeH="0" baseline="0" noProof="0" dirty="0">
+              <a:rPr kumimoji="0" lang="en-AT" sz="1500" b="0" i="0" u="none" strike="noStrike" kern="1200" cap="none" spc="0" normalizeH="0" baseline="0" noProof="0" dirty="0">
                 <a:ln>
                   <a:noFill/>
                 </a:ln>
@@ -26815,7 +26908,7 @@
               <a:t>5. GET $</a:t>
             </a:r>
             <a:r>
-              <a:rPr kumimoji="0" lang="en-GB" sz="1300" b="0" i="0" u="none" strike="noStrike" kern="1200" cap="none" spc="0" normalizeH="0" baseline="0" noProof="0" dirty="0">
+              <a:rPr kumimoji="0" lang="en-GB" sz="1500" b="0" i="0" u="none" strike="noStrike" kern="1200" cap="none" spc="0" normalizeH="0" baseline="0" noProof="0" dirty="0">
                 <a:ln>
                   <a:noFill/>
                 </a:ln>
@@ -26832,7 +26925,7 @@
               <a:t>pseudonymize</a:t>
             </a:r>
             <a:r>
-              <a:rPr kumimoji="0" lang="en-AT" sz="1300" b="0" i="0" u="none" strike="noStrike" kern="1200" cap="none" spc="0" normalizeH="0" baseline="0" noProof="0" dirty="0">
+              <a:rPr kumimoji="0" lang="en-AT" sz="1500" b="0" i="0" u="none" strike="noStrike" kern="1200" cap="none" spc="0" normalizeH="0" baseline="0" noProof="0" dirty="0">
                 <a:ln>
                   <a:noFill/>
                 </a:ln>
@@ -26868,7 +26961,7 @@
               <a:defRPr/>
             </a:pPr>
             <a:r>
-              <a:rPr kumimoji="0" lang="en-AT" sz="1300" b="0" i="0" u="none" strike="noStrike" kern="1200" cap="none" spc="0" normalizeH="0" baseline="0" noProof="0" dirty="0">
+              <a:rPr kumimoji="0" lang="en-AT" sz="1500" b="0" i="0" u="none" strike="noStrike" kern="1200" cap="none" spc="0" normalizeH="0" baseline="0" noProof="0" dirty="0">
                 <a:ln>
                   <a:noFill/>
                 </a:ln>
@@ -26883,6 +26976,60 @@
                 <a:cs typeface="+mn-cs"/>
               </a:rPr>
               <a:t>(operation)</a:t>
+            </a:r>
+          </a:p>
+        </p:txBody>
+      </p:sp>
+      <p:sp>
+        <p:nvSpPr>
+          <p:cNvPr id="2" name="TextBox 1">
+            <a:extLst>
+              <a:ext uri="{FF2B5EF4-FFF2-40B4-BE49-F238E27FC236}">
+                <a16:creationId xmlns:a16="http://schemas.microsoft.com/office/drawing/2014/main" id="{AB1DDF10-848E-3F7B-906B-2DB447352C97}"/>
+              </a:ext>
+            </a:extLst>
+          </p:cNvPr>
+          <p:cNvSpPr txBox="1"/>
+          <p:nvPr/>
+        </p:nvSpPr>
+        <p:spPr>
+          <a:xfrm>
+            <a:off x="10256045" y="6412006"/>
+            <a:ext cx="1833562" cy="369332"/>
+          </a:xfrm>
+          <a:prstGeom prst="rect">
+            <a:avLst/>
+          </a:prstGeom>
+          <a:noFill/>
+        </p:spPr>
+        <p:txBody>
+          <a:bodyPr wrap="square" rtlCol="0">
+            <a:spAutoFit/>
+          </a:bodyPr>
+          <a:lstStyle/>
+          <a:p>
+            <a:r>
+              <a:rPr lang="en-AT" dirty="0">
+                <a:solidFill>
+                  <a:schemeClr val="bg1"/>
+                </a:solidFill>
+                <a:highlight>
+                  <a:srgbClr val="808080"/>
+                </a:highlight>
+              </a:rPr>
+              <a:t>out of POC scope</a:t>
+            </a:r>
+            <a:r>
+              <a:rPr lang="en-AT" dirty="0">
+                <a:highlight>
+                  <a:srgbClr val="808080"/>
+                </a:highlight>
+              </a:rPr>
+              <a:t>                  </a:t>
+            </a:r>
+            <a:r>
+              <a:rPr lang="en-AT" dirty="0"/>
+              <a:t> </a:t>
             </a:r>
           </a:p>
         </p:txBody>
@@ -26891,6 +27038,960 @@
     <p:extLst>
       <p:ext uri="{BB962C8B-B14F-4D97-AF65-F5344CB8AC3E}">
         <p14:creationId xmlns:p14="http://schemas.microsoft.com/office/powerpoint/2010/main" val="126831953"/>
+      </p:ext>
+    </p:extLst>
+  </p:cSld>
+  <p:clrMapOvr>
+    <a:masterClrMapping/>
+  </p:clrMapOvr>
+</p:sld>
+</file>
+
+<file path=ppt/slides/slide8.xml><?xml version="1.0" encoding="utf-8"?>
+<p:sld xmlns:a="http://schemas.openxmlformats.org/drawingml/2006/main" xmlns:r="http://schemas.openxmlformats.org/officeDocument/2006/relationships" xmlns:p="http://schemas.openxmlformats.org/presentationml/2006/main">
+  <p:cSld>
+    <p:spTree>
+      <p:nvGrpSpPr>
+        <p:cNvPr id="1" name="">
+          <a:extLst>
+            <a:ext uri="{FF2B5EF4-FFF2-40B4-BE49-F238E27FC236}">
+              <a16:creationId xmlns:a16="http://schemas.microsoft.com/office/drawing/2014/main" id="{42F8354B-4A98-B3C1-7AC8-2EB71B7F4CC9}"/>
+            </a:ext>
+          </a:extLst>
+        </p:cNvPr>
+        <p:cNvGrpSpPr/>
+        <p:nvPr/>
+      </p:nvGrpSpPr>
+      <p:grpSpPr>
+        <a:xfrm>
+          <a:off x="0" y="0"/>
+          <a:ext cx="0" cy="0"/>
+          <a:chOff x="0" y="0"/>
+          <a:chExt cx="0" cy="0"/>
+        </a:xfrm>
+      </p:grpSpPr>
+      <p:pic>
+        <p:nvPicPr>
+          <p:cNvPr id="5" name="Content Placeholder 4" descr="A diagram of a diagram&#10;&#10;Description automatically generated">
+            <a:extLst>
+              <a:ext uri="{FF2B5EF4-FFF2-40B4-BE49-F238E27FC236}">
+                <a16:creationId xmlns:a16="http://schemas.microsoft.com/office/drawing/2014/main" id="{DD01B601-E0A3-D5D5-D2C4-EE488C9BF2FA}"/>
+              </a:ext>
+            </a:extLst>
+          </p:cNvPr>
+          <p:cNvPicPr>
+            <a:picLocks noGrp="1" noChangeAspect="1"/>
+          </p:cNvPicPr>
+          <p:nvPr>
+            <p:ph idx="4294967295"/>
+          </p:nvPr>
+        </p:nvPicPr>
+        <p:blipFill rotWithShape="1">
+          <a:blip r:embed="rId3"/>
+          <a:srcRect b="4793"/>
+          <a:stretch/>
+        </p:blipFill>
+        <p:spPr>
+          <a:xfrm>
+            <a:off x="869678" y="0"/>
+            <a:ext cx="10452644" cy="6781338"/>
+          </a:xfrm>
+        </p:spPr>
+      </p:pic>
+      <p:sp>
+        <p:nvSpPr>
+          <p:cNvPr id="10" name="Rounded Rectangle 9">
+            <a:extLst>
+              <a:ext uri="{FF2B5EF4-FFF2-40B4-BE49-F238E27FC236}">
+                <a16:creationId xmlns:a16="http://schemas.microsoft.com/office/drawing/2014/main" id="{9398F678-9DD4-27FA-140E-95611CFAF02E}"/>
+              </a:ext>
+            </a:extLst>
+          </p:cNvPr>
+          <p:cNvSpPr/>
+          <p:nvPr/>
+        </p:nvSpPr>
+        <p:spPr>
+          <a:xfrm>
+            <a:off x="2694392" y="978795"/>
+            <a:ext cx="2722949" cy="657049"/>
+          </a:xfrm>
+          <a:prstGeom prst="roundRect">
+            <a:avLst/>
+          </a:prstGeom>
+        </p:spPr>
+        <p:style>
+          <a:lnRef idx="2">
+            <a:schemeClr val="accent1">
+              <a:shade val="15000"/>
+            </a:schemeClr>
+          </a:lnRef>
+          <a:fillRef idx="1">
+            <a:schemeClr val="accent1"/>
+          </a:fillRef>
+          <a:effectRef idx="0">
+            <a:schemeClr val="accent1"/>
+          </a:effectRef>
+          <a:fontRef idx="minor">
+            <a:schemeClr val="lt1"/>
+          </a:fontRef>
+        </p:style>
+        <p:txBody>
+          <a:bodyPr rtlCol="0" anchor="ctr"/>
+          <a:lstStyle/>
+          <a:p>
+            <a:pPr marL="228600" marR="0" lvl="0" indent="-228600" algn="ctr" defTabSz="457200" rtl="0" eaLnBrk="1" fontAlgn="auto" latinLnBrk="0" hangingPunct="1">
+              <a:lnSpc>
+                <a:spcPct val="100000"/>
+              </a:lnSpc>
+              <a:spcBef>
+                <a:spcPts val="0"/>
+              </a:spcBef>
+              <a:spcAft>
+                <a:spcPts val="0"/>
+              </a:spcAft>
+              <a:buClrTx/>
+              <a:buSzTx/>
+              <a:buFontTx/>
+              <a:buAutoNum type="arabicPeriod"/>
+              <a:tabLst/>
+              <a:defRPr/>
+            </a:pPr>
+            <a:r>
+              <a:rPr kumimoji="0" lang="en-AT" sz="1500" b="0" i="0" u="none" strike="noStrike" kern="1200" cap="none" spc="0" normalizeH="0" baseline="0" noProof="0" dirty="0">
+                <a:ln>
+                  <a:noFill/>
+                </a:ln>
+                <a:solidFill>
+                  <a:srgbClr val="FFFFFF"/>
+                </a:solidFill>
+                <a:effectLst/>
+                <a:uLnTx/>
+                <a:uFillTx/>
+                <a:latin typeface="Corbel" panose="020B0503020204020204"/>
+                <a:ea typeface="+mn-ea"/>
+                <a:cs typeface="+mn-cs"/>
+              </a:rPr>
+              <a:t>$aufnehmen</a:t>
+            </a:r>
+          </a:p>
+          <a:p>
+            <a:pPr marL="0" marR="0" lvl="0" indent="0" algn="ctr" defTabSz="457200" rtl="0" eaLnBrk="1" fontAlgn="auto" latinLnBrk="0" hangingPunct="1">
+              <a:lnSpc>
+                <a:spcPct val="100000"/>
+              </a:lnSpc>
+              <a:spcBef>
+                <a:spcPts val="0"/>
+              </a:spcBef>
+              <a:spcAft>
+                <a:spcPts val="0"/>
+              </a:spcAft>
+              <a:buClrTx/>
+              <a:buSzTx/>
+              <a:buFontTx/>
+              <a:buNone/>
+              <a:tabLst/>
+              <a:defRPr/>
+            </a:pPr>
+            <a:r>
+              <a:rPr kumimoji="0" lang="en-AT" sz="1500" b="0" i="0" u="none" strike="noStrike" kern="1200" cap="none" spc="0" normalizeH="0" baseline="0" noProof="0" dirty="0">
+                <a:ln>
+                  <a:noFill/>
+                </a:ln>
+                <a:solidFill>
+                  <a:srgbClr val="FFFFFF"/>
+                </a:solidFill>
+                <a:effectLst/>
+                <a:uLnTx/>
+                <a:uFillTx/>
+                <a:latin typeface="Corbel" panose="020B0503020204020204"/>
+                <a:ea typeface="+mn-ea"/>
+                <a:cs typeface="+mn-cs"/>
+              </a:rPr>
+              <a:t>2a. </a:t>
+            </a:r>
+            <a:r>
+              <a:rPr lang="en-AT" sz="1500" dirty="0">
+                <a:solidFill>
+                  <a:srgbClr val="FFFFFF"/>
+                </a:solidFill>
+                <a:latin typeface="Corbel" panose="020B0503020204020204"/>
+              </a:rPr>
+              <a:t>$anfragen</a:t>
+            </a:r>
+            <a:endParaRPr kumimoji="0" lang="en-AT" sz="1500" b="0" i="0" u="none" strike="noStrike" kern="1200" cap="none" spc="0" normalizeH="0" baseline="0" noProof="0" dirty="0">
+              <a:ln>
+                <a:noFill/>
+              </a:ln>
+              <a:solidFill>
+                <a:srgbClr val="FFFFFF"/>
+              </a:solidFill>
+              <a:effectLst/>
+              <a:uLnTx/>
+              <a:uFillTx/>
+              <a:latin typeface="Corbel" panose="020B0503020204020204"/>
+              <a:ea typeface="+mn-ea"/>
+              <a:cs typeface="+mn-cs"/>
+            </a:endParaRPr>
+          </a:p>
+        </p:txBody>
+      </p:sp>
+      <p:sp>
+        <p:nvSpPr>
+          <p:cNvPr id="11" name="Rounded Rectangle 10">
+            <a:extLst>
+              <a:ext uri="{FF2B5EF4-FFF2-40B4-BE49-F238E27FC236}">
+                <a16:creationId xmlns:a16="http://schemas.microsoft.com/office/drawing/2014/main" id="{37F0916C-23C6-4AB6-C095-24805F4D09CC}"/>
+              </a:ext>
+            </a:extLst>
+          </p:cNvPr>
+          <p:cNvSpPr/>
+          <p:nvPr/>
+        </p:nvSpPr>
+        <p:spPr>
+          <a:xfrm>
+            <a:off x="2694392" y="1635844"/>
+            <a:ext cx="2722949" cy="511696"/>
+          </a:xfrm>
+          <a:prstGeom prst="roundRect">
+            <a:avLst/>
+          </a:prstGeom>
+        </p:spPr>
+        <p:style>
+          <a:lnRef idx="2">
+            <a:schemeClr val="accent1">
+              <a:shade val="15000"/>
+            </a:schemeClr>
+          </a:lnRef>
+          <a:fillRef idx="1">
+            <a:schemeClr val="accent1"/>
+          </a:fillRef>
+          <a:effectRef idx="0">
+            <a:schemeClr val="accent1"/>
+          </a:effectRef>
+          <a:fontRef idx="minor">
+            <a:schemeClr val="lt1"/>
+          </a:fontRef>
+        </p:style>
+        <p:txBody>
+          <a:bodyPr rtlCol="0" anchor="ctr"/>
+          <a:lstStyle/>
+          <a:p>
+            <a:pPr marL="0" marR="0" lvl="0" indent="0" algn="ctr" defTabSz="457200" rtl="0" eaLnBrk="1" fontAlgn="auto" latinLnBrk="0" hangingPunct="1">
+              <a:lnSpc>
+                <a:spcPct val="100000"/>
+              </a:lnSpc>
+              <a:spcBef>
+                <a:spcPts val="0"/>
+              </a:spcBef>
+              <a:spcAft>
+                <a:spcPts val="0"/>
+              </a:spcAft>
+              <a:buClrTx/>
+              <a:buSzTx/>
+              <a:buFontTx/>
+              <a:buNone/>
+              <a:tabLst/>
+              <a:defRPr/>
+            </a:pPr>
+            <a:r>
+              <a:rPr kumimoji="0" lang="en-AT" sz="1500" b="0" i="0" u="none" strike="noStrike" kern="1200" cap="none" spc="0" normalizeH="0" baseline="0" noProof="0" dirty="0">
+                <a:ln>
+                  <a:noFill/>
+                </a:ln>
+                <a:solidFill>
+                  <a:srgbClr val="FFFFFF"/>
+                </a:solidFill>
+                <a:effectLst/>
+                <a:uLnTx/>
+                <a:uFillTx/>
+                <a:latin typeface="Corbel" panose="020B0503020204020204"/>
+                <a:ea typeface="+mn-ea"/>
+                <a:cs typeface="+mn-cs"/>
+              </a:rPr>
+              <a:t>4. $entlassen (freigeben = false)</a:t>
+            </a:r>
+          </a:p>
+        </p:txBody>
+      </p:sp>
+      <p:sp>
+        <p:nvSpPr>
+          <p:cNvPr id="12" name="Rounded Rectangle 11">
+            <a:extLst>
+              <a:ext uri="{FF2B5EF4-FFF2-40B4-BE49-F238E27FC236}">
+                <a16:creationId xmlns:a16="http://schemas.microsoft.com/office/drawing/2014/main" id="{875CA679-A8B7-5628-E31C-99EAAA7D8501}"/>
+              </a:ext>
+            </a:extLst>
+          </p:cNvPr>
+          <p:cNvSpPr/>
+          <p:nvPr/>
+        </p:nvSpPr>
+        <p:spPr>
+          <a:xfrm>
+            <a:off x="2694392" y="2123051"/>
+            <a:ext cx="2722949" cy="386942"/>
+          </a:xfrm>
+          <a:prstGeom prst="roundRect">
+            <a:avLst/>
+          </a:prstGeom>
+        </p:spPr>
+        <p:style>
+          <a:lnRef idx="2">
+            <a:schemeClr val="accent1">
+              <a:shade val="15000"/>
+            </a:schemeClr>
+          </a:lnRef>
+          <a:fillRef idx="1">
+            <a:schemeClr val="accent1"/>
+          </a:fillRef>
+          <a:effectRef idx="0">
+            <a:schemeClr val="accent1"/>
+          </a:effectRef>
+          <a:fontRef idx="minor">
+            <a:schemeClr val="lt1"/>
+          </a:fontRef>
+        </p:style>
+        <p:txBody>
+          <a:bodyPr rtlCol="0" anchor="ctr"/>
+          <a:lstStyle/>
+          <a:p>
+            <a:pPr marL="0" marR="0" lvl="0" indent="0" algn="ctr" defTabSz="457200" rtl="0" eaLnBrk="1" fontAlgn="auto" latinLnBrk="0" hangingPunct="1">
+              <a:lnSpc>
+                <a:spcPct val="100000"/>
+              </a:lnSpc>
+              <a:spcBef>
+                <a:spcPts val="0"/>
+              </a:spcBef>
+              <a:spcAft>
+                <a:spcPts val="0"/>
+              </a:spcAft>
+              <a:buClrTx/>
+              <a:buSzTx/>
+              <a:buFontTx/>
+              <a:buNone/>
+              <a:tabLst/>
+              <a:defRPr/>
+            </a:pPr>
+            <a:r>
+              <a:rPr kumimoji="0" lang="en-AT" sz="1500" b="0" i="0" u="none" strike="noStrike" kern="1200" cap="none" spc="0" normalizeH="0" baseline="0" noProof="0" dirty="0">
+                <a:ln>
+                  <a:noFill/>
+                </a:ln>
+                <a:solidFill>
+                  <a:srgbClr val="FFFFFF"/>
+                </a:solidFill>
+                <a:effectLst/>
+                <a:uLnTx/>
+                <a:uFillTx/>
+                <a:latin typeface="Corbel" panose="020B0503020204020204"/>
+                <a:ea typeface="+mn-ea"/>
+                <a:cs typeface="+mn-cs"/>
+              </a:rPr>
+              <a:t>5. $entlassen (freigeben = true)</a:t>
+            </a:r>
+          </a:p>
+        </p:txBody>
+      </p:sp>
+      <p:sp>
+        <p:nvSpPr>
+          <p:cNvPr id="13" name="Rounded Rectangle 12">
+            <a:extLst>
+              <a:ext uri="{FF2B5EF4-FFF2-40B4-BE49-F238E27FC236}">
+                <a16:creationId xmlns:a16="http://schemas.microsoft.com/office/drawing/2014/main" id="{44A53A27-1CBE-7E97-934E-4D352C7D92D2}"/>
+              </a:ext>
+            </a:extLst>
+          </p:cNvPr>
+          <p:cNvSpPr/>
+          <p:nvPr/>
+        </p:nvSpPr>
+        <p:spPr>
+          <a:xfrm>
+            <a:off x="6096000" y="1643275"/>
+            <a:ext cx="2722949" cy="505534"/>
+          </a:xfrm>
+          <a:prstGeom prst="roundRect">
+            <a:avLst/>
+          </a:prstGeom>
+        </p:spPr>
+        <p:style>
+          <a:lnRef idx="2">
+            <a:schemeClr val="accent1">
+              <a:shade val="15000"/>
+            </a:schemeClr>
+          </a:lnRef>
+          <a:fillRef idx="1">
+            <a:schemeClr val="accent1"/>
+          </a:fillRef>
+          <a:effectRef idx="0">
+            <a:schemeClr val="accent1"/>
+          </a:effectRef>
+          <a:fontRef idx="minor">
+            <a:schemeClr val="lt1"/>
+          </a:fontRef>
+        </p:style>
+        <p:txBody>
+          <a:bodyPr rtlCol="0" anchor="ctr"/>
+          <a:lstStyle/>
+          <a:p>
+            <a:pPr marL="0" marR="0" lvl="0" indent="0" algn="ctr" defTabSz="457200" rtl="0" eaLnBrk="1" fontAlgn="auto" latinLnBrk="0" hangingPunct="1">
+              <a:lnSpc>
+                <a:spcPct val="100000"/>
+              </a:lnSpc>
+              <a:spcBef>
+                <a:spcPts val="0"/>
+              </a:spcBef>
+              <a:spcAft>
+                <a:spcPts val="0"/>
+              </a:spcAft>
+              <a:buClrTx/>
+              <a:buSzTx/>
+              <a:buFontTx/>
+              <a:buNone/>
+              <a:tabLst/>
+              <a:defRPr/>
+            </a:pPr>
+            <a:r>
+              <a:rPr kumimoji="0" lang="en-AT" sz="1500" b="0" i="0" u="none" strike="noStrike" kern="1200" cap="none" spc="0" normalizeH="0" baseline="0" noProof="0" dirty="0">
+                <a:ln>
+                  <a:noFill/>
+                </a:ln>
+                <a:solidFill>
+                  <a:srgbClr val="FFFFFF"/>
+                </a:solidFill>
+                <a:effectLst/>
+                <a:uLnTx/>
+                <a:uFillTx/>
+                <a:latin typeface="Corbel" panose="020B0503020204020204"/>
+                <a:ea typeface="+mn-ea"/>
+                <a:cs typeface="+mn-cs"/>
+              </a:rPr>
+              <a:t>3. POST CoverageEligibilityResponse</a:t>
+            </a:r>
+          </a:p>
+        </p:txBody>
+      </p:sp>
+      <p:sp>
+        <p:nvSpPr>
+          <p:cNvPr id="14" name="Rounded Rectangle 13">
+            <a:extLst>
+              <a:ext uri="{FF2B5EF4-FFF2-40B4-BE49-F238E27FC236}">
+                <a16:creationId xmlns:a16="http://schemas.microsoft.com/office/drawing/2014/main" id="{87D365F4-D59E-089E-9AB0-E9EA940CC9B9}"/>
+              </a:ext>
+            </a:extLst>
+          </p:cNvPr>
+          <p:cNvSpPr/>
+          <p:nvPr/>
+        </p:nvSpPr>
+        <p:spPr>
+          <a:xfrm>
+            <a:off x="6401431" y="2509993"/>
+            <a:ext cx="2582365" cy="735775"/>
+          </a:xfrm>
+          <a:prstGeom prst="roundRect">
+            <a:avLst/>
+          </a:prstGeom>
+        </p:spPr>
+        <p:style>
+          <a:lnRef idx="2">
+            <a:schemeClr val="accent1">
+              <a:shade val="15000"/>
+            </a:schemeClr>
+          </a:lnRef>
+          <a:fillRef idx="1">
+            <a:schemeClr val="accent1"/>
+          </a:fillRef>
+          <a:effectRef idx="0">
+            <a:schemeClr val="accent1"/>
+          </a:effectRef>
+          <a:fontRef idx="minor">
+            <a:schemeClr val="lt1"/>
+          </a:fontRef>
+        </p:style>
+        <p:txBody>
+          <a:bodyPr rtlCol="0" anchor="ctr"/>
+          <a:lstStyle/>
+          <a:p>
+            <a:pPr marL="0" marR="0" lvl="0" indent="0" algn="ctr" defTabSz="457200" rtl="0" eaLnBrk="1" fontAlgn="auto" latinLnBrk="0" hangingPunct="1">
+              <a:lnSpc>
+                <a:spcPct val="100000"/>
+              </a:lnSpc>
+              <a:spcBef>
+                <a:spcPts val="0"/>
+              </a:spcBef>
+              <a:spcAft>
+                <a:spcPts val="0"/>
+              </a:spcAft>
+              <a:buClrTx/>
+              <a:buSzTx/>
+              <a:buFontTx/>
+              <a:buNone/>
+              <a:tabLst/>
+              <a:defRPr/>
+            </a:pPr>
+            <a:r>
+              <a:rPr kumimoji="0" lang="en-AT" sz="1500" b="0" i="0" u="none" strike="noStrike" kern="1200" cap="none" spc="0" normalizeH="0" baseline="0" noProof="0" dirty="0">
+                <a:ln>
+                  <a:noFill/>
+                </a:ln>
+                <a:solidFill>
+                  <a:srgbClr val="FFFFFF"/>
+                </a:solidFill>
+                <a:effectLst/>
+                <a:uLnTx/>
+                <a:uFillTx/>
+                <a:latin typeface="Corbel" panose="020B0503020204020204"/>
+                <a:ea typeface="+mn-ea"/>
+                <a:cs typeface="+mn-cs"/>
+              </a:rPr>
+              <a:t>2b. GET CoverageEligibilityRequest</a:t>
+            </a:r>
+          </a:p>
+          <a:p>
+            <a:pPr marL="0" marR="0" lvl="0" indent="0" algn="ctr" defTabSz="457200" rtl="0" eaLnBrk="1" fontAlgn="auto" latinLnBrk="0" hangingPunct="1">
+              <a:lnSpc>
+                <a:spcPct val="100000"/>
+              </a:lnSpc>
+              <a:spcBef>
+                <a:spcPts val="0"/>
+              </a:spcBef>
+              <a:spcAft>
+                <a:spcPts val="0"/>
+              </a:spcAft>
+              <a:buClrTx/>
+              <a:buSzTx/>
+              <a:buFontTx/>
+              <a:buNone/>
+              <a:tabLst/>
+              <a:defRPr/>
+            </a:pPr>
+            <a:r>
+              <a:rPr kumimoji="0" lang="en-AT" sz="1500" b="0" i="0" u="none" strike="noStrike" kern="1200" cap="none" spc="0" normalizeH="0" baseline="0" noProof="0" dirty="0">
+                <a:ln>
+                  <a:noFill/>
+                </a:ln>
+                <a:solidFill>
+                  <a:srgbClr val="FFFFFF"/>
+                </a:solidFill>
+                <a:effectLst/>
+                <a:uLnTx/>
+                <a:uFillTx/>
+                <a:latin typeface="Corbel" panose="020B0503020204020204"/>
+                <a:ea typeface="+mn-ea"/>
+                <a:cs typeface="+mn-cs"/>
+              </a:rPr>
+              <a:t>6. GET ClaimResponse</a:t>
+            </a:r>
+          </a:p>
+        </p:txBody>
+      </p:sp>
+      <p:sp>
+        <p:nvSpPr>
+          <p:cNvPr id="15" name="Rounded Rectangle 14">
+            <a:extLst>
+              <a:ext uri="{FF2B5EF4-FFF2-40B4-BE49-F238E27FC236}">
+                <a16:creationId xmlns:a16="http://schemas.microsoft.com/office/drawing/2014/main" id="{2A78CAF8-7D17-4094-7C88-89E180F13894}"/>
+              </a:ext>
+            </a:extLst>
+          </p:cNvPr>
+          <p:cNvSpPr/>
+          <p:nvPr/>
+        </p:nvSpPr>
+        <p:spPr>
+          <a:xfrm>
+            <a:off x="7689534" y="4470281"/>
+            <a:ext cx="1428662" cy="414083"/>
+          </a:xfrm>
+          <a:prstGeom prst="roundRect">
+            <a:avLst/>
+          </a:prstGeom>
+        </p:spPr>
+        <p:style>
+          <a:lnRef idx="2">
+            <a:schemeClr val="accent1">
+              <a:shade val="15000"/>
+            </a:schemeClr>
+          </a:lnRef>
+          <a:fillRef idx="1">
+            <a:schemeClr val="accent1"/>
+          </a:fillRef>
+          <a:effectRef idx="0">
+            <a:schemeClr val="accent1"/>
+          </a:effectRef>
+          <a:fontRef idx="minor">
+            <a:schemeClr val="lt1"/>
+          </a:fontRef>
+        </p:style>
+        <p:txBody>
+          <a:bodyPr rtlCol="0" anchor="ctr"/>
+          <a:lstStyle/>
+          <a:p>
+            <a:pPr marL="0" marR="0" lvl="0" indent="0" algn="ctr" defTabSz="457200" rtl="0" eaLnBrk="1" fontAlgn="auto" latinLnBrk="0" hangingPunct="1">
+              <a:lnSpc>
+                <a:spcPct val="100000"/>
+              </a:lnSpc>
+              <a:spcBef>
+                <a:spcPts val="0"/>
+              </a:spcBef>
+              <a:spcAft>
+                <a:spcPts val="0"/>
+              </a:spcAft>
+              <a:buClrTx/>
+              <a:buSzTx/>
+              <a:buFontTx/>
+              <a:buNone/>
+              <a:tabLst/>
+              <a:defRPr/>
+            </a:pPr>
+            <a:r>
+              <a:rPr kumimoji="0" lang="en-AT" sz="1500" b="0" i="0" u="none" strike="noStrike" kern="1200" cap="none" spc="0" normalizeH="0" baseline="0" noProof="0" dirty="0">
+                <a:ln>
+                  <a:noFill/>
+                </a:ln>
+                <a:solidFill>
+                  <a:srgbClr val="FFFFFF"/>
+                </a:solidFill>
+                <a:effectLst/>
+                <a:uLnTx/>
+                <a:uFillTx/>
+                <a:latin typeface="Corbel" panose="020B0503020204020204"/>
+                <a:ea typeface="+mn-ea"/>
+                <a:cs typeface="+mn-cs"/>
+              </a:rPr>
+              <a:t>5. GET Claim</a:t>
+            </a:r>
+          </a:p>
+        </p:txBody>
+      </p:sp>
+      <p:sp>
+        <p:nvSpPr>
+          <p:cNvPr id="16" name="Rounded Rectangle 15">
+            <a:extLst>
+              <a:ext uri="{FF2B5EF4-FFF2-40B4-BE49-F238E27FC236}">
+                <a16:creationId xmlns:a16="http://schemas.microsoft.com/office/drawing/2014/main" id="{2EB817FD-610F-D075-74D7-880D52ABBF5A}"/>
+              </a:ext>
+            </a:extLst>
+          </p:cNvPr>
+          <p:cNvSpPr/>
+          <p:nvPr/>
+        </p:nvSpPr>
+        <p:spPr>
+          <a:xfrm>
+            <a:off x="9526061" y="4483179"/>
+            <a:ext cx="2175402" cy="414084"/>
+          </a:xfrm>
+          <a:prstGeom prst="roundRect">
+            <a:avLst/>
+          </a:prstGeom>
+        </p:spPr>
+        <p:style>
+          <a:lnRef idx="2">
+            <a:schemeClr val="accent1">
+              <a:shade val="15000"/>
+            </a:schemeClr>
+          </a:lnRef>
+          <a:fillRef idx="1">
+            <a:schemeClr val="accent1"/>
+          </a:fillRef>
+          <a:effectRef idx="0">
+            <a:schemeClr val="accent1"/>
+          </a:effectRef>
+          <a:fontRef idx="minor">
+            <a:schemeClr val="lt1"/>
+          </a:fontRef>
+        </p:style>
+        <p:txBody>
+          <a:bodyPr rtlCol="0" anchor="ctr"/>
+          <a:lstStyle/>
+          <a:p>
+            <a:pPr marL="0" marR="0" lvl="0" indent="0" algn="ctr" defTabSz="457200" rtl="0" eaLnBrk="1" fontAlgn="auto" latinLnBrk="0" hangingPunct="1">
+              <a:lnSpc>
+                <a:spcPct val="100000"/>
+              </a:lnSpc>
+              <a:spcBef>
+                <a:spcPts val="0"/>
+              </a:spcBef>
+              <a:spcAft>
+                <a:spcPts val="0"/>
+              </a:spcAft>
+              <a:buClrTx/>
+              <a:buSzTx/>
+              <a:buFontTx/>
+              <a:buNone/>
+              <a:tabLst/>
+              <a:defRPr/>
+            </a:pPr>
+            <a:r>
+              <a:rPr kumimoji="0" lang="en-AT" sz="1500" b="0" i="0" u="none" strike="noStrike" kern="1200" cap="none" spc="0" normalizeH="0" baseline="0" noProof="0" dirty="0">
+                <a:ln>
+                  <a:noFill/>
+                </a:ln>
+                <a:solidFill>
+                  <a:srgbClr val="FFFFFF"/>
+                </a:solidFill>
+                <a:effectLst/>
+                <a:uLnTx/>
+                <a:uFillTx/>
+                <a:latin typeface="Corbel" panose="020B0503020204020204"/>
+                <a:ea typeface="+mn-ea"/>
+                <a:cs typeface="+mn-cs"/>
+              </a:rPr>
+              <a:t>6. POST ClaimResponse</a:t>
+            </a:r>
+          </a:p>
+        </p:txBody>
+      </p:sp>
+      <p:sp>
+        <p:nvSpPr>
+          <p:cNvPr id="17" name="Rounded Rectangle 16">
+            <a:extLst>
+              <a:ext uri="{FF2B5EF4-FFF2-40B4-BE49-F238E27FC236}">
+                <a16:creationId xmlns:a16="http://schemas.microsoft.com/office/drawing/2014/main" id="{3A553DB3-7A5D-BED0-390F-D931705E9161}"/>
+              </a:ext>
+            </a:extLst>
+          </p:cNvPr>
+          <p:cNvSpPr/>
+          <p:nvPr/>
+        </p:nvSpPr>
+        <p:spPr>
+          <a:xfrm>
+            <a:off x="2321344" y="2704189"/>
+            <a:ext cx="2524631" cy="491369"/>
+          </a:xfrm>
+          <a:prstGeom prst="roundRect">
+            <a:avLst/>
+          </a:prstGeom>
+        </p:spPr>
+        <p:style>
+          <a:lnRef idx="2">
+            <a:schemeClr val="accent1">
+              <a:shade val="15000"/>
+            </a:schemeClr>
+          </a:lnRef>
+          <a:fillRef idx="1">
+            <a:schemeClr val="accent1"/>
+          </a:fillRef>
+          <a:effectRef idx="0">
+            <a:schemeClr val="accent1"/>
+          </a:effectRef>
+          <a:fontRef idx="minor">
+            <a:schemeClr val="lt1"/>
+          </a:fontRef>
+        </p:style>
+        <p:txBody>
+          <a:bodyPr rtlCol="0" anchor="ctr"/>
+          <a:lstStyle/>
+          <a:p>
+            <a:pPr marL="0" marR="0" lvl="0" indent="0" algn="ctr" defTabSz="457200" rtl="0" eaLnBrk="1" fontAlgn="auto" latinLnBrk="0" hangingPunct="1">
+              <a:lnSpc>
+                <a:spcPct val="100000"/>
+              </a:lnSpc>
+              <a:spcBef>
+                <a:spcPts val="0"/>
+              </a:spcBef>
+              <a:spcAft>
+                <a:spcPts val="0"/>
+              </a:spcAft>
+              <a:buClrTx/>
+              <a:buSzTx/>
+              <a:buFontTx/>
+              <a:buNone/>
+              <a:tabLst/>
+              <a:defRPr/>
+            </a:pPr>
+            <a:r>
+              <a:rPr kumimoji="0" lang="en-AT" sz="1500" b="0" i="0" u="none" strike="noStrike" kern="1200" cap="none" spc="0" normalizeH="0" baseline="0" noProof="0" dirty="0">
+                <a:ln>
+                  <a:noFill/>
+                </a:ln>
+                <a:solidFill>
+                  <a:srgbClr val="FFFFFF"/>
+                </a:solidFill>
+                <a:effectLst/>
+                <a:uLnTx/>
+                <a:uFillTx/>
+                <a:latin typeface="Corbel" panose="020B0503020204020204"/>
+                <a:ea typeface="+mn-ea"/>
+                <a:cs typeface="+mn-cs"/>
+              </a:rPr>
+              <a:t>3. </a:t>
+            </a:r>
+            <a:r>
+              <a:rPr lang="en-AT" sz="1500" dirty="0">
+                <a:solidFill>
+                  <a:srgbClr val="FFFFFF"/>
+                </a:solidFill>
+                <a:latin typeface="Corbel" panose="020B0503020204020204"/>
+              </a:rPr>
+              <a:t>GET CoverageEligibilityResponse</a:t>
+            </a:r>
+            <a:endParaRPr kumimoji="0" lang="en-AT" sz="1500" b="0" i="0" u="none" strike="noStrike" kern="1200" cap="none" spc="0" normalizeH="0" baseline="0" noProof="0" dirty="0">
+              <a:ln>
+                <a:noFill/>
+              </a:ln>
+              <a:solidFill>
+                <a:srgbClr val="FFFFFF"/>
+              </a:solidFill>
+              <a:effectLst/>
+              <a:uLnTx/>
+              <a:uFillTx/>
+              <a:latin typeface="Corbel" panose="020B0503020204020204"/>
+              <a:ea typeface="+mn-ea"/>
+              <a:cs typeface="+mn-cs"/>
+            </a:endParaRPr>
+          </a:p>
+        </p:txBody>
+      </p:sp>
+      <p:sp>
+        <p:nvSpPr>
+          <p:cNvPr id="18" name="Rounded Rectangle 17">
+            <a:extLst>
+              <a:ext uri="{FF2B5EF4-FFF2-40B4-BE49-F238E27FC236}">
+                <a16:creationId xmlns:a16="http://schemas.microsoft.com/office/drawing/2014/main" id="{FFDD7A66-FAC8-F9B9-1526-2F71D35E7888}"/>
+              </a:ext>
+            </a:extLst>
+          </p:cNvPr>
+          <p:cNvSpPr/>
+          <p:nvPr/>
+        </p:nvSpPr>
+        <p:spPr>
+          <a:xfrm>
+            <a:off x="785239" y="4224271"/>
+            <a:ext cx="2524631" cy="698750"/>
+          </a:xfrm>
+          <a:prstGeom prst="roundRect">
+            <a:avLst/>
+          </a:prstGeom>
+        </p:spPr>
+        <p:style>
+          <a:lnRef idx="2">
+            <a:schemeClr val="accent1">
+              <a:shade val="15000"/>
+            </a:schemeClr>
+          </a:lnRef>
+          <a:fillRef idx="1">
+            <a:schemeClr val="accent1"/>
+          </a:fillRef>
+          <a:effectRef idx="0">
+            <a:schemeClr val="accent1"/>
+          </a:effectRef>
+          <a:fontRef idx="minor">
+            <a:schemeClr val="lt1"/>
+          </a:fontRef>
+        </p:style>
+        <p:txBody>
+          <a:bodyPr rtlCol="0" anchor="ctr"/>
+          <a:lstStyle/>
+          <a:p>
+            <a:pPr marL="0" marR="0" lvl="0" indent="0" algn="ctr" defTabSz="457200" rtl="0" eaLnBrk="1" fontAlgn="auto" latinLnBrk="0" hangingPunct="1">
+              <a:lnSpc>
+                <a:spcPct val="100000"/>
+              </a:lnSpc>
+              <a:spcBef>
+                <a:spcPts val="0"/>
+              </a:spcBef>
+              <a:spcAft>
+                <a:spcPts val="0"/>
+              </a:spcAft>
+              <a:buClrTx/>
+              <a:buSzTx/>
+              <a:buFontTx/>
+              <a:buNone/>
+              <a:tabLst/>
+              <a:defRPr/>
+            </a:pPr>
+            <a:r>
+              <a:rPr kumimoji="0" lang="en-AT" sz="1500" b="0" i="0" u="none" strike="noStrike" kern="1200" cap="none" spc="0" normalizeH="0" baseline="0" noProof="0" dirty="0">
+                <a:ln>
+                  <a:noFill/>
+                </a:ln>
+                <a:solidFill>
+                  <a:srgbClr val="FFFFFF"/>
+                </a:solidFill>
+                <a:effectLst/>
+                <a:uLnTx/>
+                <a:uFillTx/>
+                <a:latin typeface="Corbel" panose="020B0503020204020204"/>
+                <a:ea typeface="+mn-ea"/>
+                <a:cs typeface="+mn-cs"/>
+              </a:rPr>
+              <a:t>5. GET $</a:t>
+            </a:r>
+            <a:r>
+              <a:rPr kumimoji="0" lang="en-GB" sz="1500" b="0" i="0" u="none" strike="noStrike" kern="1200" cap="none" spc="0" normalizeH="0" baseline="0" noProof="0" dirty="0">
+                <a:ln>
+                  <a:noFill/>
+                </a:ln>
+                <a:solidFill>
+                  <a:srgbClr val="FFFFFF"/>
+                </a:solidFill>
+                <a:effectLst/>
+                <a:uLnTx/>
+                <a:uFillTx/>
+                <a:latin typeface="Corbel" panose="020B0503020204020204"/>
+                <a:ea typeface="+mn-ea"/>
+                <a:cs typeface="+mn-cs"/>
+              </a:rPr>
+              <a:t>pseudonymize</a:t>
+            </a:r>
+            <a:r>
+              <a:rPr kumimoji="0" lang="en-AT" sz="1500" b="0" i="0" u="none" strike="noStrike" kern="1200" cap="none" spc="0" normalizeH="0" baseline="0" noProof="0" dirty="0">
+                <a:ln>
+                  <a:noFill/>
+                </a:ln>
+                <a:solidFill>
+                  <a:srgbClr val="FFFFFF"/>
+                </a:solidFill>
+                <a:effectLst/>
+                <a:uLnTx/>
+                <a:uFillTx/>
+                <a:latin typeface="Corbel" panose="020B0503020204020204"/>
+                <a:ea typeface="+mn-ea"/>
+                <a:cs typeface="+mn-cs"/>
+              </a:rPr>
+              <a:t>Claim</a:t>
+            </a:r>
+          </a:p>
+          <a:p>
+            <a:pPr marL="0" marR="0" lvl="0" indent="0" algn="ctr" defTabSz="457200" rtl="0" eaLnBrk="1" fontAlgn="auto" latinLnBrk="0" hangingPunct="1">
+              <a:lnSpc>
+                <a:spcPct val="100000"/>
+              </a:lnSpc>
+              <a:spcBef>
+                <a:spcPts val="0"/>
+              </a:spcBef>
+              <a:spcAft>
+                <a:spcPts val="0"/>
+              </a:spcAft>
+              <a:buClrTx/>
+              <a:buSzTx/>
+              <a:buFontTx/>
+              <a:buNone/>
+              <a:tabLst/>
+              <a:defRPr/>
+            </a:pPr>
+            <a:r>
+              <a:rPr kumimoji="0" lang="en-AT" sz="1500" b="0" i="0" u="none" strike="noStrike" kern="1200" cap="none" spc="0" normalizeH="0" baseline="0" noProof="0" dirty="0">
+                <a:ln>
+                  <a:noFill/>
+                </a:ln>
+                <a:solidFill>
+                  <a:srgbClr val="FFFFFF"/>
+                </a:solidFill>
+                <a:effectLst/>
+                <a:uLnTx/>
+                <a:uFillTx/>
+                <a:latin typeface="Corbel" panose="020B0503020204020204"/>
+                <a:ea typeface="+mn-ea"/>
+                <a:cs typeface="+mn-cs"/>
+              </a:rPr>
+              <a:t>(operation)</a:t>
+            </a:r>
+          </a:p>
+        </p:txBody>
+      </p:sp>
+    </p:spTree>
+    <p:extLst>
+      <p:ext uri="{BB962C8B-B14F-4D97-AF65-F5344CB8AC3E}">
+        <p14:creationId xmlns:p14="http://schemas.microsoft.com/office/powerpoint/2010/main" val="902062130"/>
       </p:ext>
     </p:extLst>
   </p:cSld>

</xml_diff>

<commit_message>
#213 update poc image
</commit_message>
<xml_diff>
--- a/docs/Sequence_Diagrams_Drafts.pptx
+++ b/docs/Sequence_Diagrams_Drafts.pptx
@@ -205,7 +205,7 @@
           <a:p>
             <a:fld id="{B55B58EC-A23A-7A46-8D96-AF627B341743}" type="datetimeFigureOut">
               <a:rPr lang="en-AT" smtClean="0"/>
-              <a:t>30.09.24</a:t>
+              <a:t>10/28/2024</a:t>
             </a:fld>
             <a:endParaRPr lang="en-AT"/>
           </a:p>
@@ -364,7 +364,7 @@
           <a:p>
             <a:fld id="{BD224F56-3D96-BA4D-A2A7-3410DF0FE848}" type="slidenum">
               <a:rPr lang="en-AT" smtClean="0"/>
-              <a:t>‹#›</a:t>
+              <a:t>‹Nr.›</a:t>
             </a:fld>
             <a:endParaRPr lang="en-AT"/>
           </a:p>
@@ -17623,7 +17623,7 @@
           <a:p>
             <a:fld id="{12410864-9ED6-9F4B-86D6-36C367AD8FCE}" type="datetimeFigureOut">
               <a:rPr lang="en-AT" smtClean="0"/>
-              <a:t>30.09.24</a:t>
+              <a:t>10/28/2024</a:t>
             </a:fld>
             <a:endParaRPr lang="en-AT"/>
           </a:p>
@@ -17677,7 +17677,7 @@
           <a:p>
             <a:fld id="{9557C137-C0B0-7D4D-AA91-4F8B58FF17F6}" type="slidenum">
               <a:rPr lang="en-AT" smtClean="0"/>
-              <a:t>‹#›</a:t>
+              <a:t>‹Nr.›</a:t>
             </a:fld>
             <a:endParaRPr lang="en-AT"/>
           </a:p>
@@ -17823,7 +17823,7 @@
           <a:p>
             <a:fld id="{12410864-9ED6-9F4B-86D6-36C367AD8FCE}" type="datetimeFigureOut">
               <a:rPr lang="en-AT" smtClean="0"/>
-              <a:t>30.09.24</a:t>
+              <a:t>10/28/2024</a:t>
             </a:fld>
             <a:endParaRPr lang="en-AT"/>
           </a:p>
@@ -17877,7 +17877,7 @@
           <a:p>
             <a:fld id="{9557C137-C0B0-7D4D-AA91-4F8B58FF17F6}" type="slidenum">
               <a:rPr lang="en-AT" smtClean="0"/>
-              <a:t>‹#›</a:t>
+              <a:t>‹Nr.›</a:t>
             </a:fld>
             <a:endParaRPr lang="en-AT"/>
           </a:p>
@@ -18033,7 +18033,7 @@
           <a:p>
             <a:fld id="{12410864-9ED6-9F4B-86D6-36C367AD8FCE}" type="datetimeFigureOut">
               <a:rPr lang="en-AT" smtClean="0"/>
-              <a:t>30.09.24</a:t>
+              <a:t>10/28/2024</a:t>
             </a:fld>
             <a:endParaRPr lang="en-AT"/>
           </a:p>
@@ -18087,7 +18087,7 @@
           <a:p>
             <a:fld id="{9557C137-C0B0-7D4D-AA91-4F8B58FF17F6}" type="slidenum">
               <a:rPr lang="en-AT" smtClean="0"/>
-              <a:t>‹#›</a:t>
+              <a:t>‹Nr.›</a:t>
             </a:fld>
             <a:endParaRPr lang="en-AT"/>
           </a:p>
@@ -18330,7 +18330,7 @@
           <a:p>
             <a:fld id="{EED63164-EF39-0B4A-9007-67453961FB19}" type="datetimeFigureOut">
               <a:rPr lang="en-AT" smtClean="0"/>
-              <a:t>30.09.24</a:t>
+              <a:t>10/28/2024</a:t>
             </a:fld>
             <a:endParaRPr lang="en-AT"/>
           </a:p>
@@ -18372,7 +18372,7 @@
           <a:p>
             <a:fld id="{ECA3666E-A10F-D548-AB0D-F83D6E5B55B3}" type="slidenum">
               <a:rPr lang="en-AT" smtClean="0"/>
-              <a:t>‹#›</a:t>
+              <a:t>‹Nr.›</a:t>
             </a:fld>
             <a:endParaRPr lang="en-AT"/>
           </a:p>
@@ -18500,7 +18500,7 @@
           <a:p>
             <a:fld id="{EED63164-EF39-0B4A-9007-67453961FB19}" type="datetimeFigureOut">
               <a:rPr lang="en-AT" smtClean="0"/>
-              <a:t>30.09.24</a:t>
+              <a:t>10/28/2024</a:t>
             </a:fld>
             <a:endParaRPr lang="en-AT"/>
           </a:p>
@@ -18542,7 +18542,7 @@
           <a:p>
             <a:fld id="{ECA3666E-A10F-D548-AB0D-F83D6E5B55B3}" type="slidenum">
               <a:rPr lang="en-AT" smtClean="0"/>
-              <a:t>‹#›</a:t>
+              <a:t>‹Nr.›</a:t>
             </a:fld>
             <a:endParaRPr lang="en-AT"/>
           </a:p>
@@ -18758,7 +18758,7 @@
           <a:p>
             <a:fld id="{EED63164-EF39-0B4A-9007-67453961FB19}" type="datetimeFigureOut">
               <a:rPr lang="en-AT" smtClean="0"/>
-              <a:t>30.09.24</a:t>
+              <a:t>10/28/2024</a:t>
             </a:fld>
             <a:endParaRPr lang="en-AT"/>
           </a:p>
@@ -18800,7 +18800,7 @@
           <a:p>
             <a:fld id="{ECA3666E-A10F-D548-AB0D-F83D6E5B55B3}" type="slidenum">
               <a:rPr lang="en-AT" smtClean="0"/>
-              <a:t>‹#›</a:t>
+              <a:t>‹Nr.›</a:t>
             </a:fld>
             <a:endParaRPr lang="en-AT"/>
           </a:p>
@@ -19046,7 +19046,7 @@
           <a:p>
             <a:fld id="{EED63164-EF39-0B4A-9007-67453961FB19}" type="datetimeFigureOut">
               <a:rPr lang="en-AT" smtClean="0"/>
-              <a:t>30.09.24</a:t>
+              <a:t>10/28/2024</a:t>
             </a:fld>
             <a:endParaRPr lang="en-AT"/>
           </a:p>
@@ -19088,7 +19088,7 @@
           <a:p>
             <a:fld id="{ECA3666E-A10F-D548-AB0D-F83D6E5B55B3}" type="slidenum">
               <a:rPr lang="en-AT" smtClean="0"/>
-              <a:t>‹#›</a:t>
+              <a:t>‹Nr.›</a:t>
             </a:fld>
             <a:endParaRPr lang="en-AT"/>
           </a:p>
@@ -19488,7 +19488,7 @@
           <a:p>
             <a:fld id="{EED63164-EF39-0B4A-9007-67453961FB19}" type="datetimeFigureOut">
               <a:rPr lang="en-AT" smtClean="0"/>
-              <a:t>30.09.24</a:t>
+              <a:t>10/28/2024</a:t>
             </a:fld>
             <a:endParaRPr lang="en-AT"/>
           </a:p>
@@ -19530,7 +19530,7 @@
           <a:p>
             <a:fld id="{ECA3666E-A10F-D548-AB0D-F83D6E5B55B3}" type="slidenum">
               <a:rPr lang="en-AT" smtClean="0"/>
-              <a:t>‹#›</a:t>
+              <a:t>‹Nr.›</a:t>
             </a:fld>
             <a:endParaRPr lang="en-AT"/>
           </a:p>
@@ -19606,7 +19606,7 @@
           <a:p>
             <a:fld id="{EED63164-EF39-0B4A-9007-67453961FB19}" type="datetimeFigureOut">
               <a:rPr lang="en-AT" smtClean="0"/>
-              <a:t>30.09.24</a:t>
+              <a:t>10/28/2024</a:t>
             </a:fld>
             <a:endParaRPr lang="en-AT"/>
           </a:p>
@@ -19648,7 +19648,7 @@
           <a:p>
             <a:fld id="{ECA3666E-A10F-D548-AB0D-F83D6E5B55B3}" type="slidenum">
               <a:rPr lang="en-AT" smtClean="0"/>
-              <a:t>‹#›</a:t>
+              <a:t>‹Nr.›</a:t>
             </a:fld>
             <a:endParaRPr lang="en-AT"/>
           </a:p>
@@ -19701,7 +19701,7 @@
           <a:p>
             <a:fld id="{EED63164-EF39-0B4A-9007-67453961FB19}" type="datetimeFigureOut">
               <a:rPr lang="en-AT" smtClean="0"/>
-              <a:t>30.09.24</a:t>
+              <a:t>10/28/2024</a:t>
             </a:fld>
             <a:endParaRPr lang="en-AT"/>
           </a:p>
@@ -19743,7 +19743,7 @@
           <a:p>
             <a:fld id="{ECA3666E-A10F-D548-AB0D-F83D6E5B55B3}" type="slidenum">
               <a:rPr lang="en-AT" smtClean="0"/>
-              <a:t>‹#›</a:t>
+              <a:t>‹Nr.›</a:t>
             </a:fld>
             <a:endParaRPr lang="en-AT"/>
           </a:p>
@@ -19989,7 +19989,7 @@
           <a:p>
             <a:fld id="{EED63164-EF39-0B4A-9007-67453961FB19}" type="datetimeFigureOut">
               <a:rPr lang="en-AT" smtClean="0"/>
-              <a:t>30.09.24</a:t>
+              <a:t>10/28/2024</a:t>
             </a:fld>
             <a:endParaRPr lang="en-AT"/>
           </a:p>
@@ -20031,7 +20031,7 @@
           <a:p>
             <a:fld id="{ECA3666E-A10F-D548-AB0D-F83D6E5B55B3}" type="slidenum">
               <a:rPr lang="en-AT" smtClean="0"/>
-              <a:t>‹#›</a:t>
+              <a:t>‹Nr.›</a:t>
             </a:fld>
             <a:endParaRPr lang="en-AT"/>
           </a:p>
@@ -20177,7 +20177,7 @@
           <a:p>
             <a:fld id="{12410864-9ED6-9F4B-86D6-36C367AD8FCE}" type="datetimeFigureOut">
               <a:rPr lang="en-AT" smtClean="0"/>
-              <a:t>30.09.24</a:t>
+              <a:t>10/28/2024</a:t>
             </a:fld>
             <a:endParaRPr lang="en-AT"/>
           </a:p>
@@ -20231,7 +20231,7 @@
           <a:p>
             <a:fld id="{9557C137-C0B0-7D4D-AA91-4F8B58FF17F6}" type="slidenum">
               <a:rPr lang="en-AT" smtClean="0"/>
-              <a:t>‹#›</a:t>
+              <a:t>‹Nr.›</a:t>
             </a:fld>
             <a:endParaRPr lang="en-AT"/>
           </a:p>
@@ -20462,7 +20462,7 @@
           <a:p>
             <a:fld id="{EED63164-EF39-0B4A-9007-67453961FB19}" type="datetimeFigureOut">
               <a:rPr lang="en-AT" smtClean="0"/>
-              <a:t>30.09.24</a:t>
+              <a:t>10/28/2024</a:t>
             </a:fld>
             <a:endParaRPr lang="en-AT"/>
           </a:p>
@@ -20509,7 +20509,7 @@
           <a:p>
             <a:fld id="{ECA3666E-A10F-D548-AB0D-F83D6E5B55B3}" type="slidenum">
               <a:rPr lang="en-AT" smtClean="0"/>
-              <a:t>‹#›</a:t>
+              <a:t>‹Nr.›</a:t>
             </a:fld>
             <a:endParaRPr lang="en-AT"/>
           </a:p>
@@ -20637,7 +20637,7 @@
           <a:p>
             <a:fld id="{EED63164-EF39-0B4A-9007-67453961FB19}" type="datetimeFigureOut">
               <a:rPr lang="en-AT" smtClean="0"/>
-              <a:t>30.09.24</a:t>
+              <a:t>10/28/2024</a:t>
             </a:fld>
             <a:endParaRPr lang="en-AT"/>
           </a:p>
@@ -20679,7 +20679,7 @@
           <a:p>
             <a:fld id="{ECA3666E-A10F-D548-AB0D-F83D6E5B55B3}" type="slidenum">
               <a:rPr lang="en-AT" smtClean="0"/>
-              <a:t>‹#›</a:t>
+              <a:t>‹Nr.›</a:t>
             </a:fld>
             <a:endParaRPr lang="en-AT"/>
           </a:p>
@@ -20817,7 +20817,7 @@
           <a:p>
             <a:fld id="{EED63164-EF39-0B4A-9007-67453961FB19}" type="datetimeFigureOut">
               <a:rPr lang="en-AT" smtClean="0"/>
-              <a:t>30.09.24</a:t>
+              <a:t>10/28/2024</a:t>
             </a:fld>
             <a:endParaRPr lang="en-AT"/>
           </a:p>
@@ -20859,7 +20859,7 @@
           <a:p>
             <a:fld id="{ECA3666E-A10F-D548-AB0D-F83D6E5B55B3}" type="slidenum">
               <a:rPr lang="en-AT" smtClean="0"/>
-              <a:t>‹#›</a:t>
+              <a:t>‹Nr.›</a:t>
             </a:fld>
             <a:endParaRPr lang="en-AT"/>
           </a:p>
@@ -21081,7 +21081,7 @@
           <a:p>
             <a:fld id="{12410864-9ED6-9F4B-86D6-36C367AD8FCE}" type="datetimeFigureOut">
               <a:rPr lang="en-AT" smtClean="0"/>
-              <a:t>30.09.24</a:t>
+              <a:t>10/28/2024</a:t>
             </a:fld>
             <a:endParaRPr lang="en-AT"/>
           </a:p>
@@ -21135,7 +21135,7 @@
           <a:p>
             <a:fld id="{9557C137-C0B0-7D4D-AA91-4F8B58FF17F6}" type="slidenum">
               <a:rPr lang="en-AT" smtClean="0"/>
-              <a:t>‹#›</a:t>
+              <a:t>‹Nr.›</a:t>
             </a:fld>
             <a:endParaRPr lang="en-AT"/>
           </a:p>
@@ -21349,7 +21349,7 @@
           <a:p>
             <a:fld id="{12410864-9ED6-9F4B-86D6-36C367AD8FCE}" type="datetimeFigureOut">
               <a:rPr lang="en-AT" smtClean="0"/>
-              <a:t>30.09.24</a:t>
+              <a:t>10/28/2024</a:t>
             </a:fld>
             <a:endParaRPr lang="en-AT"/>
           </a:p>
@@ -21403,7 +21403,7 @@
           <a:p>
             <a:fld id="{9557C137-C0B0-7D4D-AA91-4F8B58FF17F6}" type="slidenum">
               <a:rPr lang="en-AT" smtClean="0"/>
-              <a:t>‹#›</a:t>
+              <a:t>‹Nr.›</a:t>
             </a:fld>
             <a:endParaRPr lang="en-AT"/>
           </a:p>
@@ -21764,7 +21764,7 @@
           <a:p>
             <a:fld id="{12410864-9ED6-9F4B-86D6-36C367AD8FCE}" type="datetimeFigureOut">
               <a:rPr lang="en-AT" smtClean="0"/>
-              <a:t>30.09.24</a:t>
+              <a:t>10/28/2024</a:t>
             </a:fld>
             <a:endParaRPr lang="en-AT"/>
           </a:p>
@@ -21818,7 +21818,7 @@
           <a:p>
             <a:fld id="{9557C137-C0B0-7D4D-AA91-4F8B58FF17F6}" type="slidenum">
               <a:rPr lang="en-AT" smtClean="0"/>
-              <a:t>‹#›</a:t>
+              <a:t>‹Nr.›</a:t>
             </a:fld>
             <a:endParaRPr lang="en-AT"/>
           </a:p>
@@ -21906,7 +21906,7 @@
           <a:p>
             <a:fld id="{12410864-9ED6-9F4B-86D6-36C367AD8FCE}" type="datetimeFigureOut">
               <a:rPr lang="en-AT" smtClean="0"/>
-              <a:t>30.09.24</a:t>
+              <a:t>10/28/2024</a:t>
             </a:fld>
             <a:endParaRPr lang="en-AT"/>
           </a:p>
@@ -21960,7 +21960,7 @@
           <a:p>
             <a:fld id="{9557C137-C0B0-7D4D-AA91-4F8B58FF17F6}" type="slidenum">
               <a:rPr lang="en-AT" smtClean="0"/>
-              <a:t>‹#›</a:t>
+              <a:t>‹Nr.›</a:t>
             </a:fld>
             <a:endParaRPr lang="en-AT"/>
           </a:p>
@@ -22019,7 +22019,7 @@
           <a:p>
             <a:fld id="{12410864-9ED6-9F4B-86D6-36C367AD8FCE}" type="datetimeFigureOut">
               <a:rPr lang="en-AT" smtClean="0"/>
-              <a:t>30.09.24</a:t>
+              <a:t>10/28/2024</a:t>
             </a:fld>
             <a:endParaRPr lang="en-AT"/>
           </a:p>
@@ -22073,7 +22073,7 @@
           <a:p>
             <a:fld id="{9557C137-C0B0-7D4D-AA91-4F8B58FF17F6}" type="slidenum">
               <a:rPr lang="en-AT" smtClean="0"/>
-              <a:t>‹#›</a:t>
+              <a:t>‹Nr.›</a:t>
             </a:fld>
             <a:endParaRPr lang="en-AT"/>
           </a:p>
@@ -22332,7 +22332,7 @@
           <a:p>
             <a:fld id="{12410864-9ED6-9F4B-86D6-36C367AD8FCE}" type="datetimeFigureOut">
               <a:rPr lang="en-AT" smtClean="0"/>
-              <a:t>30.09.24</a:t>
+              <a:t>10/28/2024</a:t>
             </a:fld>
             <a:endParaRPr lang="en-AT"/>
           </a:p>
@@ -22386,7 +22386,7 @@
           <a:p>
             <a:fld id="{9557C137-C0B0-7D4D-AA91-4F8B58FF17F6}" type="slidenum">
               <a:rPr lang="en-AT" smtClean="0"/>
-              <a:t>‹#›</a:t>
+              <a:t>‹Nr.›</a:t>
             </a:fld>
             <a:endParaRPr lang="en-AT"/>
           </a:p>
@@ -22621,7 +22621,7 @@
           <a:p>
             <a:fld id="{12410864-9ED6-9F4B-86D6-36C367AD8FCE}" type="datetimeFigureOut">
               <a:rPr lang="en-AT" smtClean="0"/>
-              <a:t>30.09.24</a:t>
+              <a:t>10/28/2024</a:t>
             </a:fld>
             <a:endParaRPr lang="en-AT"/>
           </a:p>
@@ -22675,7 +22675,7 @@
           <a:p>
             <a:fld id="{9557C137-C0B0-7D4D-AA91-4F8B58FF17F6}" type="slidenum">
               <a:rPr lang="en-AT" smtClean="0"/>
-              <a:t>‹#›</a:t>
+              <a:t>‹Nr.›</a:t>
             </a:fld>
             <a:endParaRPr lang="en-AT"/>
           </a:p>
@@ -22864,7 +22864,7 @@
           <a:p>
             <a:fld id="{12410864-9ED6-9F4B-86D6-36C367AD8FCE}" type="datetimeFigureOut">
               <a:rPr lang="en-AT" smtClean="0"/>
-              <a:t>30.09.24</a:t>
+              <a:t>10/28/2024</a:t>
             </a:fld>
             <a:endParaRPr lang="en-AT"/>
           </a:p>
@@ -22954,7 +22954,7 @@
           <a:p>
             <a:fld id="{9557C137-C0B0-7D4D-AA91-4F8B58FF17F6}" type="slidenum">
               <a:rPr lang="en-AT" smtClean="0"/>
-              <a:t>‹#›</a:t>
+              <a:t>‹Nr.›</a:t>
             </a:fld>
             <a:endParaRPr lang="en-AT"/>
           </a:p>
@@ -23495,7 +23495,7 @@
           <a:p>
             <a:fld id="{EED63164-EF39-0B4A-9007-67453961FB19}" type="datetimeFigureOut">
               <a:rPr lang="en-AT" smtClean="0"/>
-              <a:t>30.09.24</a:t>
+              <a:t>10/28/2024</a:t>
             </a:fld>
             <a:endParaRPr lang="en-AT"/>
           </a:p>
@@ -23572,7 +23572,7 @@
           <a:p>
             <a:fld id="{ECA3666E-A10F-D548-AB0D-F83D6E5B55B3}" type="slidenum">
               <a:rPr lang="en-AT" smtClean="0"/>
-              <a:t>‹#›</a:t>
+              <a:t>‹Nr.›</a:t>
             </a:fld>
             <a:endParaRPr lang="en-AT"/>
           </a:p>
@@ -27088,13 +27088,13 @@
         </p:nvPicPr>
         <p:blipFill rotWithShape="1">
           <a:blip r:embed="rId3"/>
-          <a:srcRect b="4793"/>
+          <a:srcRect t="2357" b="4793"/>
           <a:stretch/>
         </p:blipFill>
         <p:spPr>
           <a:xfrm>
-            <a:off x="869678" y="0"/>
-            <a:ext cx="10452644" cy="6781338"/>
+            <a:off x="869678" y="167860"/>
+            <a:ext cx="10452644" cy="6613477"/>
           </a:xfrm>
         </p:spPr>
       </p:pic>
@@ -27112,8 +27112,8 @@
         </p:nvSpPr>
         <p:spPr>
           <a:xfrm>
-            <a:off x="2694392" y="978795"/>
-            <a:ext cx="2722949" cy="657049"/>
+            <a:off x="2676723" y="1064591"/>
+            <a:ext cx="2722950" cy="1356139"/>
           </a:xfrm>
           <a:prstGeom prst="roundRect">
             <a:avLst/>
@@ -27136,10 +27136,10 @@
           </a:fontRef>
         </p:style>
         <p:txBody>
-          <a:bodyPr rtlCol="0" anchor="ctr"/>
+          <a:bodyPr lIns="36000" tIns="36000" rIns="36000" bIns="36000" rtlCol="0" anchor="ctr"/>
           <a:lstStyle/>
           <a:p>
-            <a:pPr marL="228600" marR="0" lvl="0" indent="-228600" algn="ctr" defTabSz="457200" rtl="0" eaLnBrk="1" fontAlgn="auto" latinLnBrk="0" hangingPunct="1">
+            <a:pPr marR="0" lvl="0" algn="ctr" defTabSz="457200" rtl="0" eaLnBrk="1" fontAlgn="auto" latinLnBrk="0" hangingPunct="1">
               <a:lnSpc>
                 <a:spcPct val="100000"/>
               </a:lnSpc>
@@ -27151,11 +27151,26 @@
               </a:spcAft>
               <a:buClrTx/>
               <a:buSzTx/>
-              <a:buFontTx/>
-              <a:buAutoNum type="arabicPeriod"/>
               <a:tabLst/>
               <a:defRPr/>
             </a:pPr>
+            <a:r>
+              <a:rPr kumimoji="0" lang="de-DE" sz="1500" b="0" i="0" u="none" strike="noStrike" kern="1200" cap="none" spc="0" normalizeH="0" baseline="0" noProof="0" dirty="0">
+                <a:ln>
+                  <a:noFill/>
+                </a:ln>
+                <a:solidFill>
+                  <a:srgbClr val="FFFFFF"/>
+                </a:solidFill>
+                <a:effectLst/>
+                <a:uLnTx/>
+                <a:uFillTx/>
+                <a:latin typeface="Corbel" panose="020B0503020204020204"/>
+                <a:ea typeface="+mn-ea"/>
+                <a:cs typeface="+mn-cs"/>
+              </a:rPr>
+              <a:t>1. </a:t>
+            </a:r>
             <a:r>
               <a:rPr kumimoji="0" lang="en-AT" sz="1500" b="0" i="0" u="none" strike="noStrike" kern="1200" cap="none" spc="0" normalizeH="0" baseline="0" noProof="0" dirty="0">
                 <a:ln>
@@ -27207,7 +27222,7 @@
                 <a:ea typeface="+mn-ea"/>
                 <a:cs typeface="+mn-cs"/>
               </a:rPr>
-              <a:t>2a. </a:t>
+              <a:t>2. </a:t>
             </a:r>
             <a:r>
               <a:rPr lang="en-AT" sz="1500" dirty="0">
@@ -27217,6 +27232,108 @@
                 <a:latin typeface="Corbel" panose="020B0503020204020204"/>
               </a:rPr>
               <a:t>$anfragen</a:t>
+            </a:r>
+            <a:endParaRPr lang="de-DE" sz="1500" dirty="0">
+              <a:solidFill>
+                <a:srgbClr val="FFFFFF"/>
+              </a:solidFill>
+              <a:latin typeface="Corbel" panose="020B0503020204020204"/>
+            </a:endParaRPr>
+          </a:p>
+          <a:p>
+            <a:pPr algn="ctr" defTabSz="457200">
+              <a:defRPr/>
+            </a:pPr>
+            <a:r>
+              <a:rPr lang="de-DE" sz="1500" dirty="0">
+                <a:solidFill>
+                  <a:srgbClr val="FFFFFF"/>
+                </a:solidFill>
+                <a:latin typeface="Corbel" panose="020B0503020204020204"/>
+              </a:rPr>
+              <a:t>6. </a:t>
+            </a:r>
+            <a:r>
+              <a:rPr kumimoji="0" lang="en-AT" sz="1500" b="0" i="0" u="none" strike="noStrike" kern="1200" cap="none" spc="0" normalizeH="0" baseline="0" noProof="0" dirty="0">
+                <a:ln>
+                  <a:noFill/>
+                </a:ln>
+                <a:solidFill>
+                  <a:srgbClr val="FFFFFF"/>
+                </a:solidFill>
+                <a:effectLst/>
+                <a:uLnTx/>
+                <a:uFillTx/>
+                <a:latin typeface="Corbel" panose="020B0503020204020204"/>
+                <a:ea typeface="+mn-ea"/>
+                <a:cs typeface="+mn-cs"/>
+              </a:rPr>
+              <a:t>$entlassen </a:t>
+            </a:r>
+            <a:endParaRPr kumimoji="0" lang="de-DE" sz="1500" b="0" i="0" u="none" strike="noStrike" kern="1200" cap="none" spc="0" normalizeH="0" baseline="0" noProof="0" dirty="0">
+              <a:ln>
+                <a:noFill/>
+              </a:ln>
+              <a:solidFill>
+                <a:srgbClr val="FFFFFF"/>
+              </a:solidFill>
+              <a:effectLst/>
+              <a:uLnTx/>
+              <a:uFillTx/>
+              <a:latin typeface="Corbel" panose="020B0503020204020204"/>
+              <a:ea typeface="+mn-ea"/>
+              <a:cs typeface="+mn-cs"/>
+            </a:endParaRPr>
+          </a:p>
+          <a:p>
+            <a:pPr algn="ctr" defTabSz="457200">
+              <a:defRPr/>
+            </a:pPr>
+            <a:r>
+              <a:rPr lang="de-DE" sz="1500" dirty="0">
+                <a:solidFill>
+                  <a:srgbClr val="FFFFFF"/>
+                </a:solidFill>
+                <a:latin typeface="Corbel" panose="020B0503020204020204"/>
+              </a:rPr>
+              <a:t>7. $</a:t>
+            </a:r>
+            <a:r>
+              <a:rPr lang="de-DE" sz="1500" dirty="0" err="1">
+                <a:solidFill>
+                  <a:srgbClr val="FFFFFF"/>
+                </a:solidFill>
+                <a:latin typeface="Corbel" panose="020B0503020204020204"/>
+              </a:rPr>
+              <a:t>einmelden</a:t>
+            </a:r>
+            <a:endParaRPr lang="de-DE" sz="1500" dirty="0">
+              <a:solidFill>
+                <a:srgbClr val="FFFFFF"/>
+              </a:solidFill>
+              <a:latin typeface="Corbel" panose="020B0503020204020204"/>
+            </a:endParaRPr>
+          </a:p>
+          <a:p>
+            <a:pPr algn="ctr" defTabSz="457200">
+              <a:defRPr/>
+            </a:pPr>
+            <a:r>
+              <a:rPr kumimoji="0" lang="de-DE" sz="1500" b="0" i="0" u="none" strike="noStrike" kern="1200" cap="none" spc="0" normalizeH="0" baseline="0" noProof="0" dirty="0">
+                <a:ln>
+                  <a:noFill/>
+                </a:ln>
+                <a:solidFill>
+                  <a:srgbClr val="FFFFFF"/>
+                </a:solidFill>
+                <a:effectLst/>
+                <a:uLnTx/>
+                <a:uFillTx/>
+                <a:latin typeface="Corbel" panose="020B0503020204020204"/>
+                <a:ea typeface="+mn-ea"/>
+                <a:cs typeface="+mn-cs"/>
+              </a:rPr>
+              <a:t>8. $abrechnen</a:t>
             </a:r>
             <a:endParaRPr kumimoji="0" lang="en-AT" sz="1500" b="0" i="0" u="none" strike="noStrike" kern="1200" cap="none" spc="0" normalizeH="0" baseline="0" noProof="0" dirty="0">
               <a:ln>
@@ -27232,162 +27349,6 @@
               <a:ea typeface="+mn-ea"/>
               <a:cs typeface="+mn-cs"/>
             </a:endParaRPr>
-          </a:p>
-        </p:txBody>
-      </p:sp>
-      <p:sp>
-        <p:nvSpPr>
-          <p:cNvPr id="11" name="Rounded Rectangle 10">
-            <a:extLst>
-              <a:ext uri="{FF2B5EF4-FFF2-40B4-BE49-F238E27FC236}">
-                <a16:creationId xmlns:a16="http://schemas.microsoft.com/office/drawing/2014/main" id="{37F0916C-23C6-4AB6-C095-24805F4D09CC}"/>
-              </a:ext>
-            </a:extLst>
-          </p:cNvPr>
-          <p:cNvSpPr/>
-          <p:nvPr/>
-        </p:nvSpPr>
-        <p:spPr>
-          <a:xfrm>
-            <a:off x="2694392" y="1635844"/>
-            <a:ext cx="2722949" cy="511696"/>
-          </a:xfrm>
-          <a:prstGeom prst="roundRect">
-            <a:avLst/>
-          </a:prstGeom>
-        </p:spPr>
-        <p:style>
-          <a:lnRef idx="2">
-            <a:schemeClr val="accent1">
-              <a:shade val="15000"/>
-            </a:schemeClr>
-          </a:lnRef>
-          <a:fillRef idx="1">
-            <a:schemeClr val="accent1"/>
-          </a:fillRef>
-          <a:effectRef idx="0">
-            <a:schemeClr val="accent1"/>
-          </a:effectRef>
-          <a:fontRef idx="minor">
-            <a:schemeClr val="lt1"/>
-          </a:fontRef>
-        </p:style>
-        <p:txBody>
-          <a:bodyPr rtlCol="0" anchor="ctr"/>
-          <a:lstStyle/>
-          <a:p>
-            <a:pPr marL="0" marR="0" lvl="0" indent="0" algn="ctr" defTabSz="457200" rtl="0" eaLnBrk="1" fontAlgn="auto" latinLnBrk="0" hangingPunct="1">
-              <a:lnSpc>
-                <a:spcPct val="100000"/>
-              </a:lnSpc>
-              <a:spcBef>
-                <a:spcPts val="0"/>
-              </a:spcBef>
-              <a:spcAft>
-                <a:spcPts val="0"/>
-              </a:spcAft>
-              <a:buClrTx/>
-              <a:buSzTx/>
-              <a:buFontTx/>
-              <a:buNone/>
-              <a:tabLst/>
-              <a:defRPr/>
-            </a:pPr>
-            <a:r>
-              <a:rPr kumimoji="0" lang="en-AT" sz="1500" b="0" i="0" u="none" strike="noStrike" kern="1200" cap="none" spc="0" normalizeH="0" baseline="0" noProof="0" dirty="0">
-                <a:ln>
-                  <a:noFill/>
-                </a:ln>
-                <a:solidFill>
-                  <a:srgbClr val="FFFFFF"/>
-                </a:solidFill>
-                <a:effectLst/>
-                <a:uLnTx/>
-                <a:uFillTx/>
-                <a:latin typeface="Corbel" panose="020B0503020204020204"/>
-                <a:ea typeface="+mn-ea"/>
-                <a:cs typeface="+mn-cs"/>
-              </a:rPr>
-              <a:t>4. $entlassen (freigeben = false)</a:t>
-            </a:r>
-          </a:p>
-        </p:txBody>
-      </p:sp>
-      <p:sp>
-        <p:nvSpPr>
-          <p:cNvPr id="12" name="Rounded Rectangle 11">
-            <a:extLst>
-              <a:ext uri="{FF2B5EF4-FFF2-40B4-BE49-F238E27FC236}">
-                <a16:creationId xmlns:a16="http://schemas.microsoft.com/office/drawing/2014/main" id="{875CA679-A8B7-5628-E31C-99EAAA7D8501}"/>
-              </a:ext>
-            </a:extLst>
-          </p:cNvPr>
-          <p:cNvSpPr/>
-          <p:nvPr/>
-        </p:nvSpPr>
-        <p:spPr>
-          <a:xfrm>
-            <a:off x="2694392" y="2123051"/>
-            <a:ext cx="2722949" cy="386942"/>
-          </a:xfrm>
-          <a:prstGeom prst="roundRect">
-            <a:avLst/>
-          </a:prstGeom>
-        </p:spPr>
-        <p:style>
-          <a:lnRef idx="2">
-            <a:schemeClr val="accent1">
-              <a:shade val="15000"/>
-            </a:schemeClr>
-          </a:lnRef>
-          <a:fillRef idx="1">
-            <a:schemeClr val="accent1"/>
-          </a:fillRef>
-          <a:effectRef idx="0">
-            <a:schemeClr val="accent1"/>
-          </a:effectRef>
-          <a:fontRef idx="minor">
-            <a:schemeClr val="lt1"/>
-          </a:fontRef>
-        </p:style>
-        <p:txBody>
-          <a:bodyPr rtlCol="0" anchor="ctr"/>
-          <a:lstStyle/>
-          <a:p>
-            <a:pPr marL="0" marR="0" lvl="0" indent="0" algn="ctr" defTabSz="457200" rtl="0" eaLnBrk="1" fontAlgn="auto" latinLnBrk="0" hangingPunct="1">
-              <a:lnSpc>
-                <a:spcPct val="100000"/>
-              </a:lnSpc>
-              <a:spcBef>
-                <a:spcPts val="0"/>
-              </a:spcBef>
-              <a:spcAft>
-                <a:spcPts val="0"/>
-              </a:spcAft>
-              <a:buClrTx/>
-              <a:buSzTx/>
-              <a:buFontTx/>
-              <a:buNone/>
-              <a:tabLst/>
-              <a:defRPr/>
-            </a:pPr>
-            <a:r>
-              <a:rPr kumimoji="0" lang="en-AT" sz="1500" b="0" i="0" u="none" strike="noStrike" kern="1200" cap="none" spc="0" normalizeH="0" baseline="0" noProof="0" dirty="0">
-                <a:ln>
-                  <a:noFill/>
-                </a:ln>
-                <a:solidFill>
-                  <a:srgbClr val="FFFFFF"/>
-                </a:solidFill>
-                <a:effectLst/>
-                <a:uLnTx/>
-                <a:uFillTx/>
-                <a:latin typeface="Corbel" panose="020B0503020204020204"/>
-                <a:ea typeface="+mn-ea"/>
-                <a:cs typeface="+mn-cs"/>
-              </a:rPr>
-              <a:t>5. $entlassen (freigeben = true)</a:t>
-            </a:r>
           </a:p>
         </p:txBody>
       </p:sp>
@@ -27450,6 +27411,15 @@
               <a:defRPr/>
             </a:pPr>
             <a:r>
+              <a:rPr lang="de-DE" sz="1500" dirty="0">
+                <a:solidFill>
+                  <a:srgbClr val="FFFFFF"/>
+                </a:solidFill>
+                <a:latin typeface="Corbel" panose="020B0503020204020204"/>
+              </a:rPr>
+              <a:t>4</a:t>
+            </a:r>
+            <a:r>
               <a:rPr kumimoji="0" lang="en-AT" sz="1500" b="0" i="0" u="none" strike="noStrike" kern="1200" cap="none" spc="0" normalizeH="0" baseline="0" noProof="0" dirty="0">
                 <a:ln>
                   <a:noFill/>
@@ -27464,7 +27434,7 @@
                 <a:ea typeface="+mn-ea"/>
                 <a:cs typeface="+mn-cs"/>
               </a:rPr>
-              <a:t>3. POST CoverageEligibilityResponse</a:t>
+              <a:t>. POST CoverageEligibilityResponse</a:t>
             </a:r>
           </a:p>
         </p:txBody>
@@ -27483,8 +27453,8 @@
         </p:nvSpPr>
         <p:spPr>
           <a:xfrm>
-            <a:off x="6401431" y="2509993"/>
-            <a:ext cx="2582365" cy="735775"/>
+            <a:off x="6398351" y="2573308"/>
+            <a:ext cx="2582365" cy="672460"/>
           </a:xfrm>
           <a:prstGeom prst="roundRect">
             <a:avLst/>
@@ -27528,6 +27498,15 @@
               <a:defRPr/>
             </a:pPr>
             <a:r>
+              <a:rPr lang="de-DE" sz="1500" dirty="0">
+                <a:solidFill>
+                  <a:srgbClr val="FFFFFF"/>
+                </a:solidFill>
+                <a:latin typeface="Corbel" panose="020B0503020204020204"/>
+              </a:rPr>
+              <a:t>3</a:t>
+            </a:r>
+            <a:r>
               <a:rPr kumimoji="0" lang="en-AT" sz="1500" b="0" i="0" u="none" strike="noStrike" kern="1200" cap="none" spc="0" normalizeH="0" baseline="0" noProof="0" dirty="0">
                 <a:ln>
                   <a:noFill/>
@@ -27542,29 +27521,29 @@
                 <a:ea typeface="+mn-ea"/>
                 <a:cs typeface="+mn-cs"/>
               </a:rPr>
-              <a:t>2b. GET CoverageEligibilityRequest</a:t>
-            </a:r>
-          </a:p>
-          <a:p>
-            <a:pPr marL="0" marR="0" lvl="0" indent="0" algn="ctr" defTabSz="457200" rtl="0" eaLnBrk="1" fontAlgn="auto" latinLnBrk="0" hangingPunct="1">
-              <a:lnSpc>
-                <a:spcPct val="100000"/>
-              </a:lnSpc>
-              <a:spcBef>
-                <a:spcPts val="0"/>
-              </a:spcBef>
-              <a:spcAft>
-                <a:spcPts val="0"/>
-              </a:spcAft>
-              <a:buClrTx/>
-              <a:buSzTx/>
-              <a:buFontTx/>
-              <a:buNone/>
-              <a:tabLst/>
+              <a:t>. GET CoverageEligibilityRequest</a:t>
+            </a:r>
+            <a:endParaRPr kumimoji="0" lang="de-DE" sz="1500" b="0" i="0" u="none" strike="noStrike" kern="1200" cap="none" spc="0" normalizeH="0" baseline="0" noProof="0" dirty="0">
+              <a:ln>
+                <a:noFill/>
+              </a:ln>
+              <a:solidFill>
+                <a:srgbClr val="FFFFFF"/>
+              </a:solidFill>
+              <a:effectLst/>
+              <a:uLnTx/>
+              <a:uFillTx/>
+              <a:latin typeface="Corbel" panose="020B0503020204020204"/>
+              <a:ea typeface="+mn-ea"/>
+              <a:cs typeface="+mn-cs"/>
+            </a:endParaRPr>
+          </a:p>
+          <a:p>
+            <a:pPr algn="ctr" defTabSz="457200">
               <a:defRPr/>
             </a:pPr>
             <a:r>
-              <a:rPr kumimoji="0" lang="en-AT" sz="1500" b="0" i="0" u="none" strike="noStrike" kern="1200" cap="none" spc="0" normalizeH="0" baseline="0" noProof="0" dirty="0">
+              <a:rPr kumimoji="0" lang="de-DE" sz="1500" b="0" i="0" u="none" strike="noStrike" kern="1200" cap="none" spc="0" normalizeH="0" baseline="0" noProof="0" dirty="0">
                 <a:ln>
                   <a:noFill/>
                 </a:ln>
@@ -27578,7 +27557,24 @@
                 <a:ea typeface="+mn-ea"/>
                 <a:cs typeface="+mn-cs"/>
               </a:rPr>
-              <a:t>6. GET ClaimResponse</a:t>
+              <a:t>11</a:t>
+            </a:r>
+            <a:r>
+              <a:rPr kumimoji="0" lang="en-AT" sz="1500" b="0" i="0" u="none" strike="noStrike" kern="1200" cap="none" spc="0" normalizeH="0" baseline="0" noProof="0" dirty="0">
+                <a:ln>
+                  <a:noFill/>
+                </a:ln>
+                <a:solidFill>
+                  <a:srgbClr val="FFFFFF"/>
+                </a:solidFill>
+                <a:effectLst/>
+                <a:uLnTx/>
+                <a:uFillTx/>
+                <a:latin typeface="Corbel" panose="020B0503020204020204"/>
+                <a:ea typeface="+mn-ea"/>
+                <a:cs typeface="+mn-cs"/>
+              </a:rPr>
+              <a:t>. GET ClaimResponse</a:t>
             </a:r>
           </a:p>
         </p:txBody>
@@ -27598,7 +27594,7 @@
         <p:spPr>
           <a:xfrm>
             <a:off x="7689534" y="4470281"/>
-            <a:ext cx="1428662" cy="414083"/>
+            <a:ext cx="1457386" cy="414083"/>
           </a:xfrm>
           <a:prstGeom prst="roundRect">
             <a:avLst/>
@@ -27642,6 +27638,15 @@
               <a:defRPr/>
             </a:pPr>
             <a:r>
+              <a:rPr lang="de-DE" sz="1500" dirty="0">
+                <a:solidFill>
+                  <a:srgbClr val="FFFFFF"/>
+                </a:solidFill>
+                <a:latin typeface="Corbel" panose="020B0503020204020204"/>
+              </a:rPr>
+              <a:t>9</a:t>
+            </a:r>
+            <a:r>
               <a:rPr kumimoji="0" lang="en-AT" sz="1500" b="0" i="0" u="none" strike="noStrike" kern="1200" cap="none" spc="0" normalizeH="0" baseline="0" noProof="0" dirty="0">
                 <a:ln>
                   <a:noFill/>
@@ -27656,7 +27661,7 @@
                 <a:ea typeface="+mn-ea"/>
                 <a:cs typeface="+mn-cs"/>
               </a:rPr>
-              <a:t>5. GET Claim</a:t>
+              <a:t>. GET Claim</a:t>
             </a:r>
           </a:p>
         </p:txBody>
@@ -27720,7 +27725,7 @@
               <a:defRPr/>
             </a:pPr>
             <a:r>
-              <a:rPr kumimoji="0" lang="en-AT" sz="1500" b="0" i="0" u="none" strike="noStrike" kern="1200" cap="none" spc="0" normalizeH="0" baseline="0" noProof="0" dirty="0">
+              <a:rPr kumimoji="0" lang="de-DE" sz="1500" b="0" i="0" u="none" strike="noStrike" kern="1200" cap="none" spc="0" normalizeH="0" baseline="0" noProof="0" dirty="0">
                 <a:ln>
                   <a:noFill/>
                 </a:ln>
@@ -27734,8 +27739,22 @@
                 <a:ea typeface="+mn-ea"/>
                 <a:cs typeface="+mn-cs"/>
               </a:rPr>
-              <a:t>6. POST ClaimResponse</a:t>
-            </a:r>
+              <a:t>10. $freigeben / $auffordern</a:t>
+            </a:r>
+            <a:endParaRPr kumimoji="0" lang="en-AT" sz="1500" b="0" i="0" u="none" strike="noStrike" kern="1200" cap="none" spc="0" normalizeH="0" baseline="0" noProof="0" dirty="0">
+              <a:ln>
+                <a:noFill/>
+              </a:ln>
+              <a:solidFill>
+                <a:srgbClr val="FFFFFF"/>
+              </a:solidFill>
+              <a:effectLst/>
+              <a:uLnTx/>
+              <a:uFillTx/>
+              <a:latin typeface="Corbel" panose="020B0503020204020204"/>
+              <a:ea typeface="+mn-ea"/>
+              <a:cs typeface="+mn-cs"/>
+            </a:endParaRPr>
           </a:p>
         </p:txBody>
       </p:sp>
@@ -27753,8 +27772,8 @@
         </p:nvSpPr>
         <p:spPr>
           <a:xfrm>
-            <a:off x="2321344" y="2704189"/>
-            <a:ext cx="2524631" cy="491369"/>
+            <a:off x="2308092" y="2668105"/>
+            <a:ext cx="2524631" cy="494748"/>
           </a:xfrm>
           <a:prstGeom prst="roundRect">
             <a:avLst/>
@@ -27798,6 +27817,15 @@
               <a:defRPr/>
             </a:pPr>
             <a:r>
+              <a:rPr lang="de-DE" sz="1500" dirty="0">
+                <a:solidFill>
+                  <a:srgbClr val="FFFFFF"/>
+                </a:solidFill>
+                <a:latin typeface="Corbel" panose="020B0503020204020204"/>
+              </a:rPr>
+              <a:t>5</a:t>
+            </a:r>
+            <a:r>
               <a:rPr kumimoji="0" lang="en-AT" sz="1500" b="0" i="0" u="none" strike="noStrike" kern="1200" cap="none" spc="0" normalizeH="0" baseline="0" noProof="0" dirty="0">
                 <a:ln>
                   <a:noFill/>
@@ -27812,7 +27840,7 @@
                 <a:ea typeface="+mn-ea"/>
                 <a:cs typeface="+mn-cs"/>
               </a:rPr>
-              <a:t>3. </a:t>
+              <a:t>. </a:t>
             </a:r>
             <a:r>
               <a:rPr lang="en-AT" sz="1500" dirty="0">
@@ -27823,19 +27851,11 @@
               </a:rPr>
               <a:t>GET CoverageEligibilityResponse</a:t>
             </a:r>
-            <a:endParaRPr kumimoji="0" lang="en-AT" sz="1500" b="0" i="0" u="none" strike="noStrike" kern="1200" cap="none" spc="0" normalizeH="0" baseline="0" noProof="0" dirty="0">
-              <a:ln>
-                <a:noFill/>
-              </a:ln>
+            <a:endParaRPr lang="de-DE" sz="1500" dirty="0">
               <a:solidFill>
                 <a:srgbClr val="FFFFFF"/>
               </a:solidFill>
-              <a:effectLst/>
-              <a:uLnTx/>
-              <a:uFillTx/>
               <a:latin typeface="Corbel" panose="020B0503020204020204"/>
-              <a:ea typeface="+mn-ea"/>
-              <a:cs typeface="+mn-cs"/>
             </a:endParaRPr>
           </a:p>
         </p:txBody>
@@ -27854,8 +27874,8 @@
         </p:nvSpPr>
         <p:spPr>
           <a:xfrm>
-            <a:off x="785239" y="4224271"/>
-            <a:ext cx="2524631" cy="698750"/>
+            <a:off x="737703" y="4240695"/>
+            <a:ext cx="2491409" cy="643669"/>
           </a:xfrm>
           <a:prstGeom prst="roundRect">
             <a:avLst/>
@@ -27899,6 +27919,15 @@
               <a:defRPr/>
             </a:pPr>
             <a:r>
+              <a:rPr lang="de-DE" sz="1500" dirty="0">
+                <a:solidFill>
+                  <a:srgbClr val="FFFFFF"/>
+                </a:solidFill>
+                <a:latin typeface="Corbel" panose="020B0503020204020204"/>
+              </a:rPr>
+              <a:t>12</a:t>
+            </a:r>
+            <a:r>
               <a:rPr kumimoji="0" lang="en-AT" sz="1500" b="0" i="0" u="none" strike="noStrike" kern="1200" cap="none" spc="0" normalizeH="0" baseline="0" noProof="0" dirty="0">
                 <a:ln>
                   <a:noFill/>
@@ -27913,7 +27942,7 @@
                 <a:ea typeface="+mn-ea"/>
                 <a:cs typeface="+mn-cs"/>
               </a:rPr>
-              <a:t>5. GET $</a:t>
+              <a:t>. GET $</a:t>
             </a:r>
             <a:r>
               <a:rPr kumimoji="0" lang="en-GB" sz="1500" b="0" i="0" u="none" strike="noStrike" kern="1200" cap="none" spc="0" normalizeH="0" baseline="0" noProof="0" dirty="0">
@@ -27930,7 +27959,7 @@
                 <a:ea typeface="+mn-ea"/>
                 <a:cs typeface="+mn-cs"/>
               </a:rPr>
-              <a:t>pseudonymize</a:t>
+              <a:t>pseudonymized </a:t>
             </a:r>
             <a:r>
               <a:rPr kumimoji="0" lang="en-AT" sz="1500" b="0" i="0" u="none" strike="noStrike" kern="1200" cap="none" spc="0" normalizeH="0" baseline="0" noProof="0" dirty="0">
@@ -27949,25 +27978,23 @@
               </a:rPr>
               <a:t>Claim</a:t>
             </a:r>
-          </a:p>
-          <a:p>
-            <a:pPr marL="0" marR="0" lvl="0" indent="0" algn="ctr" defTabSz="457200" rtl="0" eaLnBrk="1" fontAlgn="auto" latinLnBrk="0" hangingPunct="1">
-              <a:lnSpc>
-                <a:spcPct val="100000"/>
-              </a:lnSpc>
-              <a:spcBef>
-                <a:spcPts val="0"/>
-              </a:spcBef>
-              <a:spcAft>
-                <a:spcPts val="0"/>
-              </a:spcAft>
-              <a:buClrTx/>
-              <a:buSzTx/>
-              <a:buFontTx/>
-              <a:buNone/>
-              <a:tabLst/>
-              <a:defRPr/>
-            </a:pPr>
+            <a:r>
+              <a:rPr kumimoji="0" lang="de-DE" sz="1500" b="0" i="0" u="none" strike="noStrike" kern="1200" cap="none" spc="0" normalizeH="0" baseline="0" noProof="0" dirty="0">
+                <a:ln>
+                  <a:noFill/>
+                </a:ln>
+                <a:solidFill>
+                  <a:srgbClr val="FFFFFF"/>
+                </a:solidFill>
+                <a:effectLst/>
+                <a:uLnTx/>
+                <a:uFillTx/>
+                <a:latin typeface="Corbel" panose="020B0503020204020204"/>
+                <a:ea typeface="+mn-ea"/>
+                <a:cs typeface="+mn-cs"/>
+              </a:rPr>
+              <a:t>Response </a:t>
+            </a:r>
             <a:r>
               <a:rPr kumimoji="0" lang="en-AT" sz="1500" b="0" i="0" u="none" strike="noStrike" kern="1200" cap="none" spc="0" normalizeH="0" baseline="0" noProof="0" dirty="0">
                 <a:ln>

</xml_diff>

<commit_message>
update diagrams in pptx
</commit_message>
<xml_diff>
--- a/docs/Sequence_Diagrams_Drafts.pptx
+++ b/docs/Sequence_Diagrams_Drafts.pptx
@@ -205,7 +205,7 @@
           <a:p>
             <a:fld id="{B55B58EC-A23A-7A46-8D96-AF627B341743}" type="datetimeFigureOut">
               <a:rPr lang="en-AT" smtClean="0"/>
-              <a:t>30.09.24</a:t>
+              <a:t>12.12.24</a:t>
             </a:fld>
             <a:endParaRPr lang="en-AT"/>
           </a:p>
@@ -17623,7 +17623,7 @@
           <a:p>
             <a:fld id="{12410864-9ED6-9F4B-86D6-36C367AD8FCE}" type="datetimeFigureOut">
               <a:rPr lang="en-AT" smtClean="0"/>
-              <a:t>30.09.24</a:t>
+              <a:t>12.12.24</a:t>
             </a:fld>
             <a:endParaRPr lang="en-AT"/>
           </a:p>
@@ -17823,7 +17823,7 @@
           <a:p>
             <a:fld id="{12410864-9ED6-9F4B-86D6-36C367AD8FCE}" type="datetimeFigureOut">
               <a:rPr lang="en-AT" smtClean="0"/>
-              <a:t>30.09.24</a:t>
+              <a:t>12.12.24</a:t>
             </a:fld>
             <a:endParaRPr lang="en-AT"/>
           </a:p>
@@ -18033,7 +18033,7 @@
           <a:p>
             <a:fld id="{12410864-9ED6-9F4B-86D6-36C367AD8FCE}" type="datetimeFigureOut">
               <a:rPr lang="en-AT" smtClean="0"/>
-              <a:t>30.09.24</a:t>
+              <a:t>12.12.24</a:t>
             </a:fld>
             <a:endParaRPr lang="en-AT"/>
           </a:p>
@@ -18330,7 +18330,7 @@
           <a:p>
             <a:fld id="{EED63164-EF39-0B4A-9007-67453961FB19}" type="datetimeFigureOut">
               <a:rPr lang="en-AT" smtClean="0"/>
-              <a:t>30.09.24</a:t>
+              <a:t>12.12.24</a:t>
             </a:fld>
             <a:endParaRPr lang="en-AT"/>
           </a:p>
@@ -18500,7 +18500,7 @@
           <a:p>
             <a:fld id="{EED63164-EF39-0B4A-9007-67453961FB19}" type="datetimeFigureOut">
               <a:rPr lang="en-AT" smtClean="0"/>
-              <a:t>30.09.24</a:t>
+              <a:t>12.12.24</a:t>
             </a:fld>
             <a:endParaRPr lang="en-AT"/>
           </a:p>
@@ -18758,7 +18758,7 @@
           <a:p>
             <a:fld id="{EED63164-EF39-0B4A-9007-67453961FB19}" type="datetimeFigureOut">
               <a:rPr lang="en-AT" smtClean="0"/>
-              <a:t>30.09.24</a:t>
+              <a:t>12.12.24</a:t>
             </a:fld>
             <a:endParaRPr lang="en-AT"/>
           </a:p>
@@ -19046,7 +19046,7 @@
           <a:p>
             <a:fld id="{EED63164-EF39-0B4A-9007-67453961FB19}" type="datetimeFigureOut">
               <a:rPr lang="en-AT" smtClean="0"/>
-              <a:t>30.09.24</a:t>
+              <a:t>12.12.24</a:t>
             </a:fld>
             <a:endParaRPr lang="en-AT"/>
           </a:p>
@@ -19488,7 +19488,7 @@
           <a:p>
             <a:fld id="{EED63164-EF39-0B4A-9007-67453961FB19}" type="datetimeFigureOut">
               <a:rPr lang="en-AT" smtClean="0"/>
-              <a:t>30.09.24</a:t>
+              <a:t>12.12.24</a:t>
             </a:fld>
             <a:endParaRPr lang="en-AT"/>
           </a:p>
@@ -19606,7 +19606,7 @@
           <a:p>
             <a:fld id="{EED63164-EF39-0B4A-9007-67453961FB19}" type="datetimeFigureOut">
               <a:rPr lang="en-AT" smtClean="0"/>
-              <a:t>30.09.24</a:t>
+              <a:t>12.12.24</a:t>
             </a:fld>
             <a:endParaRPr lang="en-AT"/>
           </a:p>
@@ -19701,7 +19701,7 @@
           <a:p>
             <a:fld id="{EED63164-EF39-0B4A-9007-67453961FB19}" type="datetimeFigureOut">
               <a:rPr lang="en-AT" smtClean="0"/>
-              <a:t>30.09.24</a:t>
+              <a:t>12.12.24</a:t>
             </a:fld>
             <a:endParaRPr lang="en-AT"/>
           </a:p>
@@ -19989,7 +19989,7 @@
           <a:p>
             <a:fld id="{EED63164-EF39-0B4A-9007-67453961FB19}" type="datetimeFigureOut">
               <a:rPr lang="en-AT" smtClean="0"/>
-              <a:t>30.09.24</a:t>
+              <a:t>12.12.24</a:t>
             </a:fld>
             <a:endParaRPr lang="en-AT"/>
           </a:p>
@@ -20177,7 +20177,7 @@
           <a:p>
             <a:fld id="{12410864-9ED6-9F4B-86D6-36C367AD8FCE}" type="datetimeFigureOut">
               <a:rPr lang="en-AT" smtClean="0"/>
-              <a:t>30.09.24</a:t>
+              <a:t>12.12.24</a:t>
             </a:fld>
             <a:endParaRPr lang="en-AT"/>
           </a:p>
@@ -20462,7 +20462,7 @@
           <a:p>
             <a:fld id="{EED63164-EF39-0B4A-9007-67453961FB19}" type="datetimeFigureOut">
               <a:rPr lang="en-AT" smtClean="0"/>
-              <a:t>30.09.24</a:t>
+              <a:t>12.12.24</a:t>
             </a:fld>
             <a:endParaRPr lang="en-AT"/>
           </a:p>
@@ -20637,7 +20637,7 @@
           <a:p>
             <a:fld id="{EED63164-EF39-0B4A-9007-67453961FB19}" type="datetimeFigureOut">
               <a:rPr lang="en-AT" smtClean="0"/>
-              <a:t>30.09.24</a:t>
+              <a:t>12.12.24</a:t>
             </a:fld>
             <a:endParaRPr lang="en-AT"/>
           </a:p>
@@ -20817,7 +20817,7 @@
           <a:p>
             <a:fld id="{EED63164-EF39-0B4A-9007-67453961FB19}" type="datetimeFigureOut">
               <a:rPr lang="en-AT" smtClean="0"/>
-              <a:t>30.09.24</a:t>
+              <a:t>12.12.24</a:t>
             </a:fld>
             <a:endParaRPr lang="en-AT"/>
           </a:p>
@@ -21081,7 +21081,7 @@
           <a:p>
             <a:fld id="{12410864-9ED6-9F4B-86D6-36C367AD8FCE}" type="datetimeFigureOut">
               <a:rPr lang="en-AT" smtClean="0"/>
-              <a:t>30.09.24</a:t>
+              <a:t>12.12.24</a:t>
             </a:fld>
             <a:endParaRPr lang="en-AT"/>
           </a:p>
@@ -21349,7 +21349,7 @@
           <a:p>
             <a:fld id="{12410864-9ED6-9F4B-86D6-36C367AD8FCE}" type="datetimeFigureOut">
               <a:rPr lang="en-AT" smtClean="0"/>
-              <a:t>30.09.24</a:t>
+              <a:t>12.12.24</a:t>
             </a:fld>
             <a:endParaRPr lang="en-AT"/>
           </a:p>
@@ -21764,7 +21764,7 @@
           <a:p>
             <a:fld id="{12410864-9ED6-9F4B-86D6-36C367AD8FCE}" type="datetimeFigureOut">
               <a:rPr lang="en-AT" smtClean="0"/>
-              <a:t>30.09.24</a:t>
+              <a:t>12.12.24</a:t>
             </a:fld>
             <a:endParaRPr lang="en-AT"/>
           </a:p>
@@ -21906,7 +21906,7 @@
           <a:p>
             <a:fld id="{12410864-9ED6-9F4B-86D6-36C367AD8FCE}" type="datetimeFigureOut">
               <a:rPr lang="en-AT" smtClean="0"/>
-              <a:t>30.09.24</a:t>
+              <a:t>12.12.24</a:t>
             </a:fld>
             <a:endParaRPr lang="en-AT"/>
           </a:p>
@@ -22019,7 +22019,7 @@
           <a:p>
             <a:fld id="{12410864-9ED6-9F4B-86D6-36C367AD8FCE}" type="datetimeFigureOut">
               <a:rPr lang="en-AT" smtClean="0"/>
-              <a:t>30.09.24</a:t>
+              <a:t>12.12.24</a:t>
             </a:fld>
             <a:endParaRPr lang="en-AT"/>
           </a:p>
@@ -22332,7 +22332,7 @@
           <a:p>
             <a:fld id="{12410864-9ED6-9F4B-86D6-36C367AD8FCE}" type="datetimeFigureOut">
               <a:rPr lang="en-AT" smtClean="0"/>
-              <a:t>30.09.24</a:t>
+              <a:t>12.12.24</a:t>
             </a:fld>
             <a:endParaRPr lang="en-AT"/>
           </a:p>
@@ -22621,7 +22621,7 @@
           <a:p>
             <a:fld id="{12410864-9ED6-9F4B-86D6-36C367AD8FCE}" type="datetimeFigureOut">
               <a:rPr lang="en-AT" smtClean="0"/>
-              <a:t>30.09.24</a:t>
+              <a:t>12.12.24</a:t>
             </a:fld>
             <a:endParaRPr lang="en-AT"/>
           </a:p>
@@ -22864,7 +22864,7 @@
           <a:p>
             <a:fld id="{12410864-9ED6-9F4B-86D6-36C367AD8FCE}" type="datetimeFigureOut">
               <a:rPr lang="en-AT" smtClean="0"/>
-              <a:t>30.09.24</a:t>
+              <a:t>12.12.24</a:t>
             </a:fld>
             <a:endParaRPr lang="en-AT"/>
           </a:p>
@@ -23495,7 +23495,7 @@
           <a:p>
             <a:fld id="{EED63164-EF39-0B4A-9007-67453961FB19}" type="datetimeFigureOut">
               <a:rPr lang="en-AT" smtClean="0"/>
-              <a:t>30.09.24</a:t>
+              <a:t>12.12.24</a:t>
             </a:fld>
             <a:endParaRPr lang="en-AT"/>
           </a:p>
@@ -24688,8 +24688,8 @@
         </p:nvSpPr>
         <p:spPr>
           <a:xfrm>
-            <a:off x="8576" y="554522"/>
-            <a:ext cx="864000" cy="1008000"/>
+            <a:off x="8575" y="554522"/>
+            <a:ext cx="1080000" cy="1008000"/>
           </a:xfrm>
           <a:prstGeom prst="roundRect">
             <a:avLst/>
@@ -24722,7 +24722,7 @@
                 <a:ea typeface="Tahoma" panose="020B0604030504040204" pitchFamily="34" charset="0"/>
                 <a:cs typeface="Tahoma" panose="020B0604030504040204" pitchFamily="34" charset="0"/>
               </a:rPr>
-              <a:t>geplant</a:t>
+              <a:t>Aufnahme in Arbeit</a:t>
             </a:r>
           </a:p>
         </p:txBody>
@@ -24792,70 +24792,7 @@
         </p:nvSpPr>
         <p:spPr>
           <a:xfrm>
-            <a:off x="937492" y="558080"/>
-            <a:ext cx="720000" cy="1008000"/>
-          </a:xfrm>
-          <a:prstGeom prst="roundRect">
-            <a:avLst/>
-          </a:prstGeom>
-        </p:spPr>
-        <p:style>
-          <a:lnRef idx="2">
-            <a:schemeClr val="accent1">
-              <a:shade val="15000"/>
-            </a:schemeClr>
-          </a:lnRef>
-          <a:fillRef idx="1">
-            <a:schemeClr val="accent1"/>
-          </a:fillRef>
-          <a:effectRef idx="0">
-            <a:schemeClr val="accent1"/>
-          </a:effectRef>
-          <a:fontRef idx="minor">
-            <a:schemeClr val="lt1"/>
-          </a:fontRef>
-        </p:style>
-        <p:txBody>
-          <a:bodyPr rtlCol="0" anchor="ctr"/>
-          <a:lstStyle/>
-          <a:p>
-            <a:pPr algn="ctr"/>
-            <a:r>
-              <a:rPr lang="en-GB" sz="1400" dirty="0">
-                <a:latin typeface="Tahoma" panose="020B0604030504040204" pitchFamily="34" charset="0"/>
-                <a:ea typeface="Tahoma" panose="020B0604030504040204" pitchFamily="34" charset="0"/>
-                <a:cs typeface="Tahoma" panose="020B0604030504040204" pitchFamily="34" charset="0"/>
-              </a:rPr>
-              <a:t>i</a:t>
-            </a:r>
-            <a:r>
-              <a:rPr lang="en-AT" sz="1400" dirty="0">
-                <a:latin typeface="Tahoma" panose="020B0604030504040204" pitchFamily="34" charset="0"/>
-                <a:ea typeface="Tahoma" panose="020B0604030504040204" pitchFamily="34" charset="0"/>
-                <a:cs typeface="Tahoma" panose="020B0604030504040204" pitchFamily="34" charset="0"/>
-              </a:rPr>
-              <a:t>n Arbeit</a:t>
-            </a:r>
-          </a:p>
-        </p:txBody>
-      </p:sp>
-      <p:sp>
-        <p:nvSpPr>
-          <p:cNvPr id="15" name="Rounded Rectangle 14">
-            <a:extLst>
-              <a:ext uri="{FF2B5EF4-FFF2-40B4-BE49-F238E27FC236}">
-                <a16:creationId xmlns:a16="http://schemas.microsoft.com/office/drawing/2014/main" id="{DA438EEF-D73F-C648-B867-E2450CFE079A}"/>
-              </a:ext>
-            </a:extLst>
-          </p:cNvPr>
-          <p:cNvSpPr>
-            <a:spLocks/>
-          </p:cNvSpPr>
-          <p:nvPr/>
-        </p:nvSpPr>
-        <p:spPr>
-          <a:xfrm>
-            <a:off x="1726570" y="572099"/>
+            <a:off x="1161795" y="559496"/>
             <a:ext cx="1224000" cy="1008000"/>
           </a:xfrm>
           <a:prstGeom prst="roundRect">
@@ -24889,7 +24826,7 @@
                 <a:ea typeface="Tahoma" panose="020B0604030504040204" pitchFamily="34" charset="0"/>
                 <a:cs typeface="Tahoma" panose="020B0604030504040204" pitchFamily="34" charset="0"/>
               </a:rPr>
-              <a:t>freigegeben</a:t>
+              <a:t>Aufnahme freigegeben</a:t>
             </a:r>
             <a:endParaRPr lang="en-AT" sz="1400" dirty="0">
               <a:latin typeface="Tahoma" panose="020B0604030504040204" pitchFamily="34" charset="0"/>
@@ -24915,7 +24852,7 @@
         </p:nvSpPr>
         <p:spPr>
           <a:xfrm>
-            <a:off x="3011419" y="593600"/>
+            <a:off x="2459015" y="564418"/>
             <a:ext cx="1152000" cy="1008000"/>
           </a:xfrm>
           <a:prstGeom prst="roundRect">
@@ -24975,7 +24912,7 @@
         </p:nvSpPr>
         <p:spPr>
           <a:xfrm>
-            <a:off x="4227662" y="596488"/>
+            <a:off x="3684235" y="556520"/>
             <a:ext cx="1152000" cy="1007999"/>
           </a:xfrm>
           <a:prstGeom prst="roundRect">
@@ -25035,7 +24972,7 @@
         </p:nvSpPr>
         <p:spPr>
           <a:xfrm>
-            <a:off x="5443905" y="592639"/>
+            <a:off x="4909455" y="553172"/>
             <a:ext cx="1152000" cy="1007998"/>
           </a:xfrm>
           <a:prstGeom prst="roundRect">
@@ -25095,8 +25032,8 @@
         </p:nvSpPr>
         <p:spPr>
           <a:xfrm>
-            <a:off x="6656754" y="597416"/>
-            <a:ext cx="1008000" cy="1008000"/>
+            <a:off x="6134675" y="559496"/>
+            <a:ext cx="1080000" cy="1008000"/>
           </a:xfrm>
           <a:prstGeom prst="roundRect">
             <a:avLst/>
@@ -25129,15 +25066,7 @@
                 <a:ea typeface="Tahoma" panose="020B0604030504040204" pitchFamily="34" charset="0"/>
                 <a:cs typeface="Tahoma" panose="020B0604030504040204" pitchFamily="34" charset="0"/>
               </a:rPr>
-              <a:t>KH vorläufig </a:t>
-            </a:r>
-            <a:r>
-              <a:rPr lang="de-AT" sz="1400" dirty="0" err="1">
-                <a:latin typeface="Tahoma" panose="020B0604030504040204" pitchFamily="34" charset="0"/>
-                <a:ea typeface="Tahoma" panose="020B0604030504040204" pitchFamily="34" charset="0"/>
-                <a:cs typeface="Tahoma" panose="020B0604030504040204" pitchFamily="34" charset="0"/>
-              </a:rPr>
-              <a:t>gescored</a:t>
+              <a:t>Vorläufige Meldung</a:t>
             </a:r>
             <a:endParaRPr lang="en-AT" sz="1400" dirty="0">
               <a:latin typeface="Tahoma" panose="020B0604030504040204" pitchFamily="34" charset="0"/>
@@ -25163,8 +25092,8 @@
         </p:nvSpPr>
         <p:spPr>
           <a:xfrm>
-            <a:off x="7725603" y="596475"/>
-            <a:ext cx="1224000" cy="1007995"/>
+            <a:off x="7287895" y="558623"/>
+            <a:ext cx="1332000" cy="1007995"/>
           </a:xfrm>
           <a:prstGeom prst="roundRect">
             <a:avLst/>
@@ -25197,7 +25126,7 @@
                 <a:ea typeface="Tahoma" panose="020B0604030504040204" pitchFamily="34" charset="0"/>
                 <a:cs typeface="Tahoma" panose="020B0604030504040204" pitchFamily="34" charset="0"/>
               </a:rPr>
-              <a:t>Für Bund vorläufig freigegeben</a:t>
+              <a:t>LGF Korrektur-Aufforderung</a:t>
             </a:r>
             <a:endParaRPr lang="en-AT" sz="1400" dirty="0">
               <a:latin typeface="Tahoma" panose="020B0604030504040204" pitchFamily="34" charset="0"/>
@@ -25223,8 +25152,8 @@
         </p:nvSpPr>
         <p:spPr>
           <a:xfrm>
-            <a:off x="11460481" y="609432"/>
-            <a:ext cx="720000" cy="1007994"/>
+            <a:off x="11035558" y="558624"/>
+            <a:ext cx="1116000" cy="1007994"/>
           </a:xfrm>
           <a:prstGeom prst="roundRect">
             <a:avLst/>
@@ -25257,7 +25186,7 @@
                 <a:ea typeface="Tahoma" panose="020B0604030504040204" pitchFamily="34" charset="0"/>
                 <a:cs typeface="Tahoma" panose="020B0604030504040204" pitchFamily="34" charset="0"/>
               </a:rPr>
-              <a:t>LGF Siegel</a:t>
+              <a:t>Endgültige Freigabe</a:t>
             </a:r>
             <a:endParaRPr lang="en-AT" sz="1400" dirty="0">
               <a:latin typeface="Tahoma" panose="020B0604030504040204" pitchFamily="34" charset="0"/>
@@ -25283,8 +25212,8 @@
         </p:nvSpPr>
         <p:spPr>
           <a:xfrm>
-            <a:off x="10141705" y="607341"/>
-            <a:ext cx="1260000" cy="999111"/>
+            <a:off x="9846335" y="568862"/>
+            <a:ext cx="1116000" cy="999111"/>
           </a:xfrm>
           <a:prstGeom prst="roundRect">
             <a:avLst/>
@@ -25317,23 +25246,7 @@
                 <a:ea typeface="Tahoma" panose="020B0604030504040204" pitchFamily="34" charset="0"/>
                 <a:cs typeface="Tahoma" panose="020B0604030504040204" pitchFamily="34" charset="0"/>
               </a:rPr>
-              <a:t>LGF </a:t>
-            </a:r>
-            <a:r>
-              <a:rPr lang="de-AT" sz="1400" dirty="0" err="1">
-                <a:latin typeface="Tahoma" panose="020B0604030504040204" pitchFamily="34" charset="0"/>
-                <a:ea typeface="Tahoma" panose="020B0604030504040204" pitchFamily="34" charset="0"/>
-                <a:cs typeface="Tahoma" panose="020B0604030504040204" pitchFamily="34" charset="0"/>
-              </a:rPr>
-              <a:t>Korrekturauf</a:t>
-            </a:r>
-            <a:r>
-              <a:rPr lang="de-AT" sz="1400" dirty="0">
-                <a:latin typeface="Tahoma" panose="020B0604030504040204" pitchFamily="34" charset="0"/>
-                <a:ea typeface="Tahoma" panose="020B0604030504040204" pitchFamily="34" charset="0"/>
-                <a:cs typeface="Tahoma" panose="020B0604030504040204" pitchFamily="34" charset="0"/>
-              </a:rPr>
-              <a:t>-forderung</a:t>
+              <a:t>Endgültige Meldung </a:t>
             </a:r>
             <a:endParaRPr lang="en-AT" sz="1400" dirty="0">
               <a:latin typeface="Tahoma" panose="020B0604030504040204" pitchFamily="34" charset="0"/>
@@ -25638,7 +25551,7 @@
           <a:p>
             <a:r>
               <a:rPr lang="en-AT" dirty="0"/>
-              <a:t>Andere verfügbare Statusoptionen: on-hold (für Urlaub relevant), discontinued, entered-in-error, cancelled   </a:t>
+              <a:t>Andere verfügbare Statusoptionen: on-hold, discontinued, entered-in-error, cancelled   </a:t>
             </a:r>
           </a:p>
         </p:txBody>
@@ -25826,41 +25739,6 @@
               <a:t>cancelled, entered-in-error</a:t>
             </a:r>
             <a:endParaRPr lang="en-AT" dirty="0"/>
-          </a:p>
-        </p:txBody>
-      </p:sp>
-      <p:sp>
-        <p:nvSpPr>
-          <p:cNvPr id="38" name="TextBox 37">
-            <a:extLst>
-              <a:ext uri="{FF2B5EF4-FFF2-40B4-BE49-F238E27FC236}">
-                <a16:creationId xmlns:a16="http://schemas.microsoft.com/office/drawing/2014/main" id="{D22A1FF2-4279-EF73-7732-6649FC798E38}"/>
-              </a:ext>
-            </a:extLst>
-          </p:cNvPr>
-          <p:cNvSpPr txBox="1"/>
-          <p:nvPr/>
-        </p:nvSpPr>
-        <p:spPr>
-          <a:xfrm>
-            <a:off x="45749" y="1654986"/>
-            <a:ext cx="11990598" cy="369332"/>
-          </a:xfrm>
-          <a:prstGeom prst="rect">
-            <a:avLst/>
-          </a:prstGeom>
-          <a:noFill/>
-        </p:spPr>
-        <p:txBody>
-          <a:bodyPr wrap="square" rtlCol="0">
-            <a:spAutoFit/>
-          </a:bodyPr>
-          <a:lstStyle/>
-          <a:p>
-            <a:r>
-              <a:rPr lang="en-AT" dirty="0"/>
-              <a:t>Andere verfügbare Statusoptionen: je nach Bedarf – bereits Extension für oben beschriebene</a:t>
-            </a:r>
           </a:p>
         </p:txBody>
       </p:sp>
@@ -25997,8 +25875,8 @@
         </p:nvSpPr>
         <p:spPr>
           <a:xfrm>
-            <a:off x="9008379" y="594462"/>
-            <a:ext cx="1074550" cy="1008000"/>
+            <a:off x="8693115" y="564418"/>
+            <a:ext cx="1080000" cy="1008000"/>
           </a:xfrm>
           <a:prstGeom prst="roundRect">
             <a:avLst/>
@@ -26031,15 +25909,7 @@
                 <a:ea typeface="Tahoma" panose="020B0604030504040204" pitchFamily="34" charset="0"/>
                 <a:cs typeface="Tahoma" panose="020B0604030504040204" pitchFamily="34" charset="0"/>
               </a:rPr>
-              <a:t>KH endgültig </a:t>
-            </a:r>
-            <a:r>
-              <a:rPr lang="de-AT" sz="1400" dirty="0" err="1">
-                <a:latin typeface="Tahoma" panose="020B0604030504040204" pitchFamily="34" charset="0"/>
-                <a:ea typeface="Tahoma" panose="020B0604030504040204" pitchFamily="34" charset="0"/>
-                <a:cs typeface="Tahoma" panose="020B0604030504040204" pitchFamily="34" charset="0"/>
-              </a:rPr>
-              <a:t>gescored</a:t>
+              <a:t>Vorläufige Freigabe</a:t>
             </a:r>
             <a:endParaRPr lang="en-AT" sz="1400" dirty="0">
               <a:latin typeface="Tahoma" panose="020B0604030504040204" pitchFamily="34" charset="0"/>

</xml_diff>